<commit_message>
Updated presentation. Updated gitignore.
</commit_message>
<xml_diff>
--- a/Presentation.pptx
+++ b/Presentation.pptx
@@ -2,22 +2,22 @@
 <file path=ppt/presentation.xml><?xml version="1.0" encoding="utf-8"?>
 <p:presentation xmlns:a="http://schemas.openxmlformats.org/drawingml/2006/main" xmlns:r="http://schemas.openxmlformats.org/officeDocument/2006/relationships" xmlns:p="http://schemas.openxmlformats.org/presentationml/2006/main" saveSubsetFonts="1">
   <p:sldMasterIdLst>
-    <p:sldMasterId id="2147483648" r:id="rId4"/>
+    <p:sldMasterId id="2147483648" r:id="rId5"/>
   </p:sldMasterIdLst>
   <p:sldIdLst>
-    <p:sldId id="256" r:id="rId5"/>
     <p:sldId id="268" r:id="rId6"/>
-    <p:sldId id="257" r:id="rId7"/>
-    <p:sldId id="259" r:id="rId8"/>
-    <p:sldId id="258" r:id="rId9"/>
-    <p:sldId id="260" r:id="rId10"/>
-    <p:sldId id="261" r:id="rId11"/>
-    <p:sldId id="262" r:id="rId12"/>
-    <p:sldId id="264" r:id="rId13"/>
-    <p:sldId id="263" r:id="rId14"/>
-    <p:sldId id="266" r:id="rId15"/>
-    <p:sldId id="269" r:id="rId16"/>
-    <p:sldId id="270" r:id="rId17"/>
+    <p:sldId id="256" r:id="rId7"/>
+    <p:sldId id="257" r:id="rId8"/>
+    <p:sldId id="259" r:id="rId9"/>
+    <p:sldId id="258" r:id="rId10"/>
+    <p:sldId id="260" r:id="rId11"/>
+    <p:sldId id="261" r:id="rId12"/>
+    <p:sldId id="262" r:id="rId13"/>
+    <p:sldId id="264" r:id="rId14"/>
+    <p:sldId id="263" r:id="rId15"/>
+    <p:sldId id="266" r:id="rId16"/>
+    <p:sldId id="269" r:id="rId17"/>
+    <p:sldId id="270" r:id="rId18"/>
   </p:sldIdLst>
   <p:sldSz cx="12192000" cy="6858000"/>
   <p:notesSz cx="6858000" cy="9144000"/>
@@ -253,7 +253,7 @@
           <a:p>
             <a:fld id="{C706582F-A7DF-4EE7-AB3D-B13882602CD1}" type="datetimeFigureOut">
               <a:rPr lang="sv-SE" smtClean="0"/>
-              <a:t>2016-09-19</a:t>
+              <a:t>2017-01-18</a:t>
             </a:fld>
             <a:endParaRPr lang="sv-SE"/>
           </a:p>
@@ -311,13 +311,13 @@
   <p:clrMapOvr>
     <a:masterClrMapping/>
   </p:clrMapOvr>
-  <mc:AlternateContent xmlns:mc="http://schemas.openxmlformats.org/markup-compatibility/2006">
-    <mc:Choice xmlns:p14="http://schemas.microsoft.com/office/powerpoint/2010/main" Requires="p14">
+  <mc:AlternateContent xmlns:mc="http://schemas.openxmlformats.org/markup-compatibility/2006" xmlns:p14="http://schemas.microsoft.com/office/powerpoint/2010/main">
+    <mc:Choice Requires="p14">
       <p:transition spd="slow" p14:dur="1500">
         <p:push dir="u"/>
       </p:transition>
     </mc:Choice>
-    <mc:Fallback>
+    <mc:Fallback xmlns="">
       <p:transition spd="slow">
         <p:push dir="u"/>
       </p:transition>
@@ -433,7 +433,7 @@
           <a:p>
             <a:fld id="{C706582F-A7DF-4EE7-AB3D-B13882602CD1}" type="datetimeFigureOut">
               <a:rPr lang="sv-SE" smtClean="0"/>
-              <a:t>2016-09-19</a:t>
+              <a:t>2017-01-18</a:t>
             </a:fld>
             <a:endParaRPr lang="sv-SE"/>
           </a:p>
@@ -491,13 +491,13 @@
   <p:clrMapOvr>
     <a:masterClrMapping/>
   </p:clrMapOvr>
-  <mc:AlternateContent xmlns:mc="http://schemas.openxmlformats.org/markup-compatibility/2006">
-    <mc:Choice xmlns:p14="http://schemas.microsoft.com/office/powerpoint/2010/main" Requires="p14">
+  <mc:AlternateContent xmlns:mc="http://schemas.openxmlformats.org/markup-compatibility/2006" xmlns:p14="http://schemas.microsoft.com/office/powerpoint/2010/main">
+    <mc:Choice Requires="p14">
       <p:transition spd="slow" p14:dur="1500">
         <p:push dir="u"/>
       </p:transition>
     </mc:Choice>
-    <mc:Fallback>
+    <mc:Fallback xmlns="">
       <p:transition spd="slow">
         <p:push dir="u"/>
       </p:transition>
@@ -623,7 +623,7 @@
           <a:p>
             <a:fld id="{C706582F-A7DF-4EE7-AB3D-B13882602CD1}" type="datetimeFigureOut">
               <a:rPr lang="sv-SE" smtClean="0"/>
-              <a:t>2016-09-19</a:t>
+              <a:t>2017-01-18</a:t>
             </a:fld>
             <a:endParaRPr lang="sv-SE"/>
           </a:p>
@@ -681,13 +681,13 @@
   <p:clrMapOvr>
     <a:masterClrMapping/>
   </p:clrMapOvr>
-  <mc:AlternateContent xmlns:mc="http://schemas.openxmlformats.org/markup-compatibility/2006">
-    <mc:Choice xmlns:p14="http://schemas.microsoft.com/office/powerpoint/2010/main" Requires="p14">
+  <mc:AlternateContent xmlns:mc="http://schemas.openxmlformats.org/markup-compatibility/2006" xmlns:p14="http://schemas.microsoft.com/office/powerpoint/2010/main">
+    <mc:Choice Requires="p14">
       <p:transition spd="slow" p14:dur="1500">
         <p:push dir="u"/>
       </p:transition>
     </mc:Choice>
-    <mc:Fallback>
+    <mc:Fallback xmlns="">
       <p:transition spd="slow">
         <p:push dir="u"/>
       </p:transition>
@@ -803,7 +803,7 @@
           <a:p>
             <a:fld id="{C706582F-A7DF-4EE7-AB3D-B13882602CD1}" type="datetimeFigureOut">
               <a:rPr lang="sv-SE" smtClean="0"/>
-              <a:t>2016-09-19</a:t>
+              <a:t>2017-01-18</a:t>
             </a:fld>
             <a:endParaRPr lang="sv-SE"/>
           </a:p>
@@ -861,13 +861,13 @@
   <p:clrMapOvr>
     <a:masterClrMapping/>
   </p:clrMapOvr>
-  <mc:AlternateContent xmlns:mc="http://schemas.openxmlformats.org/markup-compatibility/2006">
-    <mc:Choice xmlns:p14="http://schemas.microsoft.com/office/powerpoint/2010/main" Requires="p14">
+  <mc:AlternateContent xmlns:mc="http://schemas.openxmlformats.org/markup-compatibility/2006" xmlns:p14="http://schemas.microsoft.com/office/powerpoint/2010/main">
+    <mc:Choice Requires="p14">
       <p:transition spd="slow" p14:dur="1500">
         <p:push dir="u"/>
       </p:transition>
     </mc:Choice>
-    <mc:Fallback>
+    <mc:Fallback xmlns="">
       <p:transition spd="slow">
         <p:push dir="u"/>
       </p:transition>
@@ -1060,7 +1060,7 @@
           <a:p>
             <a:fld id="{C706582F-A7DF-4EE7-AB3D-B13882602CD1}" type="datetimeFigureOut">
               <a:rPr lang="sv-SE" smtClean="0"/>
-              <a:t>2016-09-19</a:t>
+              <a:t>2017-01-18</a:t>
             </a:fld>
             <a:endParaRPr lang="sv-SE"/>
           </a:p>
@@ -1118,13 +1118,13 @@
   <p:clrMapOvr>
     <a:masterClrMapping/>
   </p:clrMapOvr>
-  <mc:AlternateContent xmlns:mc="http://schemas.openxmlformats.org/markup-compatibility/2006">
-    <mc:Choice xmlns:p14="http://schemas.microsoft.com/office/powerpoint/2010/main" Requires="p14">
+  <mc:AlternateContent xmlns:mc="http://schemas.openxmlformats.org/markup-compatibility/2006" xmlns:p14="http://schemas.microsoft.com/office/powerpoint/2010/main">
+    <mc:Choice Requires="p14">
       <p:transition spd="slow" p14:dur="1500">
         <p:push dir="u"/>
       </p:transition>
     </mc:Choice>
-    <mc:Fallback>
+    <mc:Fallback xmlns="">
       <p:transition spd="slow">
         <p:push dir="u"/>
       </p:transition>
@@ -1301,7 +1301,7 @@
           <a:p>
             <a:fld id="{C706582F-A7DF-4EE7-AB3D-B13882602CD1}" type="datetimeFigureOut">
               <a:rPr lang="sv-SE" smtClean="0"/>
-              <a:t>2016-09-19</a:t>
+              <a:t>2017-01-18</a:t>
             </a:fld>
             <a:endParaRPr lang="sv-SE"/>
           </a:p>
@@ -1359,13 +1359,13 @@
   <p:clrMapOvr>
     <a:masterClrMapping/>
   </p:clrMapOvr>
-  <mc:AlternateContent xmlns:mc="http://schemas.openxmlformats.org/markup-compatibility/2006">
-    <mc:Choice xmlns:p14="http://schemas.microsoft.com/office/powerpoint/2010/main" Requires="p14">
+  <mc:AlternateContent xmlns:mc="http://schemas.openxmlformats.org/markup-compatibility/2006" xmlns:p14="http://schemas.microsoft.com/office/powerpoint/2010/main">
+    <mc:Choice Requires="p14">
       <p:transition spd="slow" p14:dur="1500">
         <p:push dir="u"/>
       </p:transition>
     </mc:Choice>
-    <mc:Fallback>
+    <mc:Fallback xmlns="">
       <p:transition spd="slow">
         <p:push dir="u"/>
       </p:transition>
@@ -1677,7 +1677,7 @@
           <a:p>
             <a:fld id="{C706582F-A7DF-4EE7-AB3D-B13882602CD1}" type="datetimeFigureOut">
               <a:rPr lang="sv-SE" smtClean="0"/>
-              <a:t>2016-09-19</a:t>
+              <a:t>2017-01-18</a:t>
             </a:fld>
             <a:endParaRPr lang="sv-SE"/>
           </a:p>
@@ -1735,13 +1735,13 @@
   <p:clrMapOvr>
     <a:masterClrMapping/>
   </p:clrMapOvr>
-  <mc:AlternateContent xmlns:mc="http://schemas.openxmlformats.org/markup-compatibility/2006">
-    <mc:Choice xmlns:p14="http://schemas.microsoft.com/office/powerpoint/2010/main" Requires="p14">
+  <mc:AlternateContent xmlns:mc="http://schemas.openxmlformats.org/markup-compatibility/2006" xmlns:p14="http://schemas.microsoft.com/office/powerpoint/2010/main">
+    <mc:Choice Requires="p14">
       <p:transition spd="slow" p14:dur="1500">
         <p:push dir="u"/>
       </p:transition>
     </mc:Choice>
-    <mc:Fallback>
+    <mc:Fallback xmlns="">
       <p:transition spd="slow">
         <p:push dir="u"/>
       </p:transition>
@@ -1806,7 +1806,7 @@
           <a:p>
             <a:fld id="{C706582F-A7DF-4EE7-AB3D-B13882602CD1}" type="datetimeFigureOut">
               <a:rPr lang="sv-SE" smtClean="0"/>
-              <a:t>2016-09-19</a:t>
+              <a:t>2017-01-18</a:t>
             </a:fld>
             <a:endParaRPr lang="sv-SE"/>
           </a:p>
@@ -1864,13 +1864,13 @@
   <p:clrMapOvr>
     <a:masterClrMapping/>
   </p:clrMapOvr>
-  <mc:AlternateContent xmlns:mc="http://schemas.openxmlformats.org/markup-compatibility/2006">
-    <mc:Choice xmlns:p14="http://schemas.microsoft.com/office/powerpoint/2010/main" Requires="p14">
+  <mc:AlternateContent xmlns:mc="http://schemas.openxmlformats.org/markup-compatibility/2006" xmlns:p14="http://schemas.microsoft.com/office/powerpoint/2010/main">
+    <mc:Choice Requires="p14">
       <p:transition spd="slow" p14:dur="1500">
         <p:push dir="u"/>
       </p:transition>
     </mc:Choice>
-    <mc:Fallback>
+    <mc:Fallback xmlns="">
       <p:transition spd="slow">
         <p:push dir="u"/>
       </p:transition>
@@ -1913,7 +1913,7 @@
           <a:p>
             <a:fld id="{C706582F-A7DF-4EE7-AB3D-B13882602CD1}" type="datetimeFigureOut">
               <a:rPr lang="sv-SE" smtClean="0"/>
-              <a:t>2016-09-19</a:t>
+              <a:t>2017-01-18</a:t>
             </a:fld>
             <a:endParaRPr lang="sv-SE"/>
           </a:p>
@@ -1971,13 +1971,13 @@
   <p:clrMapOvr>
     <a:masterClrMapping/>
   </p:clrMapOvr>
-  <mc:AlternateContent xmlns:mc="http://schemas.openxmlformats.org/markup-compatibility/2006">
-    <mc:Choice xmlns:p14="http://schemas.microsoft.com/office/powerpoint/2010/main" Requires="p14">
+  <mc:AlternateContent xmlns:mc="http://schemas.openxmlformats.org/markup-compatibility/2006" xmlns:p14="http://schemas.microsoft.com/office/powerpoint/2010/main">
+    <mc:Choice Requires="p14">
       <p:transition spd="slow" p14:dur="1500">
         <p:push dir="u"/>
       </p:transition>
     </mc:Choice>
-    <mc:Fallback>
+    <mc:Fallback xmlns="">
       <p:transition spd="slow">
         <p:push dir="u"/>
       </p:transition>
@@ -2200,7 +2200,7 @@
           <a:p>
             <a:fld id="{C706582F-A7DF-4EE7-AB3D-B13882602CD1}" type="datetimeFigureOut">
               <a:rPr lang="sv-SE" smtClean="0"/>
-              <a:t>2016-09-19</a:t>
+              <a:t>2017-01-18</a:t>
             </a:fld>
             <a:endParaRPr lang="sv-SE"/>
           </a:p>
@@ -2258,13 +2258,13 @@
   <p:clrMapOvr>
     <a:masterClrMapping/>
   </p:clrMapOvr>
-  <mc:AlternateContent xmlns:mc="http://schemas.openxmlformats.org/markup-compatibility/2006">
-    <mc:Choice xmlns:p14="http://schemas.microsoft.com/office/powerpoint/2010/main" Requires="p14">
+  <mc:AlternateContent xmlns:mc="http://schemas.openxmlformats.org/markup-compatibility/2006" xmlns:p14="http://schemas.microsoft.com/office/powerpoint/2010/main">
+    <mc:Choice Requires="p14">
       <p:transition spd="slow" p14:dur="1500">
         <p:push dir="u"/>
       </p:transition>
     </mc:Choice>
-    <mc:Fallback>
+    <mc:Fallback xmlns="">
       <p:transition spd="slow">
         <p:push dir="u"/>
       </p:transition>
@@ -2464,7 +2464,7 @@
           <a:p>
             <a:fld id="{C706582F-A7DF-4EE7-AB3D-B13882602CD1}" type="datetimeFigureOut">
               <a:rPr lang="sv-SE" smtClean="0"/>
-              <a:t>2016-09-19</a:t>
+              <a:t>2017-01-18</a:t>
             </a:fld>
             <a:endParaRPr lang="sv-SE"/>
           </a:p>
@@ -2522,13 +2522,13 @@
   <p:clrMapOvr>
     <a:masterClrMapping/>
   </p:clrMapOvr>
-  <mc:AlternateContent xmlns:mc="http://schemas.openxmlformats.org/markup-compatibility/2006">
-    <mc:Choice xmlns:p14="http://schemas.microsoft.com/office/powerpoint/2010/main" Requires="p14">
+  <mc:AlternateContent xmlns:mc="http://schemas.openxmlformats.org/markup-compatibility/2006" xmlns:p14="http://schemas.microsoft.com/office/powerpoint/2010/main">
+    <mc:Choice Requires="p14">
       <p:transition spd="slow" p14:dur="1500">
         <p:push dir="u"/>
       </p:transition>
     </mc:Choice>
-    <mc:Fallback>
+    <mc:Fallback xmlns="">
       <p:transition spd="slow">
         <p:push dir="u"/>
       </p:transition>
@@ -2687,7 +2687,7 @@
           <a:p>
             <a:fld id="{C706582F-A7DF-4EE7-AB3D-B13882602CD1}" type="datetimeFigureOut">
               <a:rPr lang="sv-SE" smtClean="0"/>
-              <a:t>2016-09-19</a:t>
+              <a:t>2017-01-18</a:t>
             </a:fld>
             <a:endParaRPr lang="sv-SE"/>
           </a:p>
@@ -2792,13 +2792,13 @@
     <p:sldLayoutId id="2147483658" r:id="rId10"/>
     <p:sldLayoutId id="2147483659" r:id="rId11"/>
   </p:sldLayoutIdLst>
-  <mc:AlternateContent xmlns:mc="http://schemas.openxmlformats.org/markup-compatibility/2006">
-    <mc:Choice xmlns:p14="http://schemas.microsoft.com/office/powerpoint/2010/main" Requires="p14">
+  <mc:AlternateContent xmlns:mc="http://schemas.openxmlformats.org/markup-compatibility/2006" xmlns:p14="http://schemas.microsoft.com/office/powerpoint/2010/main">
+    <mc:Choice Requires="p14">
       <p:transition spd="slow" p14:dur="1500">
         <p:push dir="u"/>
       </p:transition>
     </mc:Choice>
-    <mc:Fallback>
+    <mc:Fallback xmlns="">
       <p:transition spd="slow">
         <p:push dir="u"/>
       </p:transition>
@@ -3106,70 +3106,57 @@
       </p:grpSpPr>
       <p:sp>
         <p:nvSpPr>
-          <p:cNvPr id="2" name="Rubrik 1"/>
-          <p:cNvSpPr>
-            <a:spLocks noGrp="1"/>
+          <p:cNvPr id="9" name="Rubrik 1"/>
+          <p:cNvSpPr txBox="1">
+            <a:spLocks/>
           </p:cNvSpPr>
-          <p:nvPr>
-            <p:ph type="ctrTitle"/>
-          </p:nvPr>
+          <p:nvPr/>
         </p:nvSpPr>
         <p:spPr>
           <a:xfrm>
-            <a:off x="5706374" y="3595083"/>
-            <a:ext cx="779253" cy="884341"/>
+            <a:off x="1344890" y="821635"/>
+            <a:ext cx="9502219" cy="1499801"/>
           </a:xfrm>
+          <a:prstGeom prst="rect">
+            <a:avLst/>
+          </a:prstGeom>
         </p:spPr>
         <p:txBody>
-          <a:bodyPr anchor="b">
-            <a:normAutofit fontScale="90000"/>
+          <a:bodyPr vert="horz" lIns="91440" tIns="45720" rIns="91440" bIns="45720" rtlCol="0" anchor="b">
+            <a:noAutofit/>
           </a:bodyPr>
-          <a:lstStyle/>
-          <a:p>
-            <a:r>
-              <a:rPr lang="sv-SE" sz="7200" dirty="0">
+          <a:lstStyle>
+            <a:lvl1pPr algn="ctr" defTabSz="914400" rtl="0" eaLnBrk="1" latinLnBrk="0" hangingPunct="1">
+              <a:lnSpc>
+                <a:spcPct val="90000"/>
+              </a:lnSpc>
+              <a:spcBef>
+                <a:spcPct val="0"/>
+              </a:spcBef>
+              <a:buNone/>
+              <a:defRPr sz="6000" kern="1200">
+                <a:solidFill>
+                  <a:schemeClr val="tx1"/>
+                </a:solidFill>
+                <a:latin typeface="+mj-lt"/>
+                <a:ea typeface="+mj-ea"/>
+                <a:cs typeface="+mj-cs"/>
+              </a:defRPr>
+            </a:lvl1pPr>
+          </a:lstStyle>
+          <a:p>
+            <a:r>
+              <a:rPr lang="en-US" sz="5400" dirty="0">
                 <a:latin typeface="HelveticaRounded LT Std Bd" panose="020F0804030503020204" pitchFamily="34" charset="0"/>
               </a:rPr>
-              <a:t>&amp;</a:t>
-            </a:r>
-          </a:p>
-        </p:txBody>
-      </p:sp>
-      <p:sp>
-        <p:nvSpPr>
-          <p:cNvPr id="3" name="Underrubrik 2"/>
-          <p:cNvSpPr>
-            <a:spLocks noGrp="1"/>
-          </p:cNvSpPr>
-          <p:nvPr>
-            <p:ph type="subTitle" idx="1"/>
-          </p:nvPr>
-        </p:nvSpPr>
-        <p:spPr>
-          <a:xfrm>
-            <a:off x="2668168" y="4418049"/>
-            <a:ext cx="3038206" cy="413683"/>
-          </a:xfrm>
-        </p:spPr>
-        <p:txBody>
-          <a:bodyPr anchor="b">
-            <a:normAutofit/>
-          </a:bodyPr>
-          <a:lstStyle/>
-          <a:p>
-            <a:r>
-              <a:rPr lang="en-US" sz="2200" dirty="0">
-                <a:latin typeface="Helvetica World" panose="020B0500040000020004" pitchFamily="34" charset="0"/>
-                <a:cs typeface="Helvetica World" panose="020B0500040000020004" pitchFamily="34" charset="0"/>
-              </a:rPr>
-              <a:t>LESS is more</a:t>
+              <a:t>Anybody who doesn’t understand Swedish?</a:t>
             </a:r>
           </a:p>
         </p:txBody>
       </p:sp>
       <p:pic>
         <p:nvPicPr>
-          <p:cNvPr id="6" name="Bildobjekt 5"/>
+          <p:cNvPr id="11" name="Bildobjekt 10"/>
           <p:cNvPicPr>
             <a:picLocks noChangeAspect="1"/>
           </p:cNvPicPr>
@@ -3189,391 +3176,31 @@
         </p:blipFill>
         <p:spPr>
           <a:xfrm>
-            <a:off x="6676836" y="1998248"/>
-            <a:ext cx="3032306" cy="2274230"/>
+            <a:off x="3804267" y="2924174"/>
+            <a:ext cx="4583467" cy="2867025"/>
           </a:xfrm>
           <a:prstGeom prst="rect">
             <a:avLst/>
           </a:prstGeom>
         </p:spPr>
       </p:pic>
-      <p:pic>
-        <p:nvPicPr>
-          <p:cNvPr id="7" name="Bildobjekt 6"/>
-          <p:cNvPicPr>
-            <a:picLocks noChangeAspect="1"/>
-          </p:cNvPicPr>
-          <p:nvPr/>
-        </p:nvPicPr>
-        <p:blipFill>
-          <a:blip r:embed="rId3">
-            <a:extLst>
-              <a:ext uri="{28A0092B-C50C-407E-A947-70E740481C1C}">
-                <a14:useLocalDpi xmlns:a14="http://schemas.microsoft.com/office/drawing/2010/main" val="0"/>
-              </a:ext>
-            </a:extLst>
-          </a:blip>
-          <a:stretch>
-            <a:fillRect/>
-          </a:stretch>
-        </p:blipFill>
-        <p:spPr>
-          <a:xfrm>
-            <a:off x="2668168" y="3181400"/>
-            <a:ext cx="3038206" cy="1236657"/>
-          </a:xfrm>
-          <a:prstGeom prst="rect">
-            <a:avLst/>
-          </a:prstGeom>
-        </p:spPr>
-      </p:pic>
-      <p:sp>
-        <p:nvSpPr>
-          <p:cNvPr id="8" name="Underrubrik 2"/>
-          <p:cNvSpPr txBox="1">
-            <a:spLocks/>
-          </p:cNvSpPr>
-          <p:nvPr/>
-        </p:nvSpPr>
-        <p:spPr>
-          <a:xfrm>
-            <a:off x="6673886" y="4418050"/>
-            <a:ext cx="3038206" cy="413683"/>
-          </a:xfrm>
-          <a:prstGeom prst="rect">
-            <a:avLst/>
-          </a:prstGeom>
-        </p:spPr>
-        <p:txBody>
-          <a:bodyPr vert="horz" lIns="91440" tIns="45720" rIns="91440" bIns="45720" rtlCol="0" anchor="b">
-            <a:normAutofit lnSpcReduction="10000"/>
-          </a:bodyPr>
-          <a:lstStyle>
-            <a:lvl1pPr marL="0" indent="0" algn="ctr" defTabSz="914400" rtl="0" eaLnBrk="1" latinLnBrk="0" hangingPunct="1">
-              <a:lnSpc>
-                <a:spcPct val="90000"/>
-              </a:lnSpc>
-              <a:spcBef>
-                <a:spcPts val="1000"/>
-              </a:spcBef>
-              <a:buFont typeface="Arial" panose="020B0604020202020204" pitchFamily="34" charset="0"/>
-              <a:buNone/>
-              <a:defRPr sz="2400" kern="1200">
-                <a:solidFill>
-                  <a:schemeClr val="tx1"/>
-                </a:solidFill>
-                <a:latin typeface="+mn-lt"/>
-                <a:ea typeface="+mn-ea"/>
-                <a:cs typeface="+mn-cs"/>
-              </a:defRPr>
-            </a:lvl1pPr>
-            <a:lvl2pPr marL="457200" indent="0" algn="ctr" defTabSz="914400" rtl="0" eaLnBrk="1" latinLnBrk="0" hangingPunct="1">
-              <a:lnSpc>
-                <a:spcPct val="90000"/>
-              </a:lnSpc>
-              <a:spcBef>
-                <a:spcPts val="500"/>
-              </a:spcBef>
-              <a:buFont typeface="Arial" panose="020B0604020202020204" pitchFamily="34" charset="0"/>
-              <a:buNone/>
-              <a:defRPr sz="2000" kern="1200">
-                <a:solidFill>
-                  <a:schemeClr val="tx1"/>
-                </a:solidFill>
-                <a:latin typeface="+mn-lt"/>
-                <a:ea typeface="+mn-ea"/>
-                <a:cs typeface="+mn-cs"/>
-              </a:defRPr>
-            </a:lvl2pPr>
-            <a:lvl3pPr marL="914400" indent="0" algn="ctr" defTabSz="914400" rtl="0" eaLnBrk="1" latinLnBrk="0" hangingPunct="1">
-              <a:lnSpc>
-                <a:spcPct val="90000"/>
-              </a:lnSpc>
-              <a:spcBef>
-                <a:spcPts val="500"/>
-              </a:spcBef>
-              <a:buFont typeface="Arial" panose="020B0604020202020204" pitchFamily="34" charset="0"/>
-              <a:buNone/>
-              <a:defRPr sz="1800" kern="1200">
-                <a:solidFill>
-                  <a:schemeClr val="tx1"/>
-                </a:solidFill>
-                <a:latin typeface="+mn-lt"/>
-                <a:ea typeface="+mn-ea"/>
-                <a:cs typeface="+mn-cs"/>
-              </a:defRPr>
-            </a:lvl3pPr>
-            <a:lvl4pPr marL="1371600" indent="0" algn="ctr" defTabSz="914400" rtl="0" eaLnBrk="1" latinLnBrk="0" hangingPunct="1">
-              <a:lnSpc>
-                <a:spcPct val="90000"/>
-              </a:lnSpc>
-              <a:spcBef>
-                <a:spcPts val="500"/>
-              </a:spcBef>
-              <a:buFont typeface="Arial" panose="020B0604020202020204" pitchFamily="34" charset="0"/>
-              <a:buNone/>
-              <a:defRPr sz="1600" kern="1200">
-                <a:solidFill>
-                  <a:schemeClr val="tx1"/>
-                </a:solidFill>
-                <a:latin typeface="+mn-lt"/>
-                <a:ea typeface="+mn-ea"/>
-                <a:cs typeface="+mn-cs"/>
-              </a:defRPr>
-            </a:lvl4pPr>
-            <a:lvl5pPr marL="1828800" indent="0" algn="ctr" defTabSz="914400" rtl="0" eaLnBrk="1" latinLnBrk="0" hangingPunct="1">
-              <a:lnSpc>
-                <a:spcPct val="90000"/>
-              </a:lnSpc>
-              <a:spcBef>
-                <a:spcPts val="500"/>
-              </a:spcBef>
-              <a:buFont typeface="Arial" panose="020B0604020202020204" pitchFamily="34" charset="0"/>
-              <a:buNone/>
-              <a:defRPr sz="1600" kern="1200">
-                <a:solidFill>
-                  <a:schemeClr val="tx1"/>
-                </a:solidFill>
-                <a:latin typeface="+mn-lt"/>
-                <a:ea typeface="+mn-ea"/>
-                <a:cs typeface="+mn-cs"/>
-              </a:defRPr>
-            </a:lvl5pPr>
-            <a:lvl6pPr marL="2286000" indent="0" algn="ctr" defTabSz="914400" rtl="0" eaLnBrk="1" latinLnBrk="0" hangingPunct="1">
-              <a:lnSpc>
-                <a:spcPct val="90000"/>
-              </a:lnSpc>
-              <a:spcBef>
-                <a:spcPts val="500"/>
-              </a:spcBef>
-              <a:buFont typeface="Arial" panose="020B0604020202020204" pitchFamily="34" charset="0"/>
-              <a:buNone/>
-              <a:defRPr sz="1600" kern="1200">
-                <a:solidFill>
-                  <a:schemeClr val="tx1"/>
-                </a:solidFill>
-                <a:latin typeface="+mn-lt"/>
-                <a:ea typeface="+mn-ea"/>
-                <a:cs typeface="+mn-cs"/>
-              </a:defRPr>
-            </a:lvl6pPr>
-            <a:lvl7pPr marL="2743200" indent="0" algn="ctr" defTabSz="914400" rtl="0" eaLnBrk="1" latinLnBrk="0" hangingPunct="1">
-              <a:lnSpc>
-                <a:spcPct val="90000"/>
-              </a:lnSpc>
-              <a:spcBef>
-                <a:spcPts val="500"/>
-              </a:spcBef>
-              <a:buFont typeface="Arial" panose="020B0604020202020204" pitchFamily="34" charset="0"/>
-              <a:buNone/>
-              <a:defRPr sz="1600" kern="1200">
-                <a:solidFill>
-                  <a:schemeClr val="tx1"/>
-                </a:solidFill>
-                <a:latin typeface="+mn-lt"/>
-                <a:ea typeface="+mn-ea"/>
-                <a:cs typeface="+mn-cs"/>
-              </a:defRPr>
-            </a:lvl7pPr>
-            <a:lvl8pPr marL="3200400" indent="0" algn="ctr" defTabSz="914400" rtl="0" eaLnBrk="1" latinLnBrk="0" hangingPunct="1">
-              <a:lnSpc>
-                <a:spcPct val="90000"/>
-              </a:lnSpc>
-              <a:spcBef>
-                <a:spcPts val="500"/>
-              </a:spcBef>
-              <a:buFont typeface="Arial" panose="020B0604020202020204" pitchFamily="34" charset="0"/>
-              <a:buNone/>
-              <a:defRPr sz="1600" kern="1200">
-                <a:solidFill>
-                  <a:schemeClr val="tx1"/>
-                </a:solidFill>
-                <a:latin typeface="+mn-lt"/>
-                <a:ea typeface="+mn-ea"/>
-                <a:cs typeface="+mn-cs"/>
-              </a:defRPr>
-            </a:lvl8pPr>
-            <a:lvl9pPr marL="3657600" indent="0" algn="ctr" defTabSz="914400" rtl="0" eaLnBrk="1" latinLnBrk="0" hangingPunct="1">
-              <a:lnSpc>
-                <a:spcPct val="90000"/>
-              </a:lnSpc>
-              <a:spcBef>
-                <a:spcPts val="500"/>
-              </a:spcBef>
-              <a:buFont typeface="Arial" panose="020B0604020202020204" pitchFamily="34" charset="0"/>
-              <a:buNone/>
-              <a:defRPr sz="1600" kern="1200">
-                <a:solidFill>
-                  <a:schemeClr val="tx1"/>
-                </a:solidFill>
-                <a:latin typeface="+mn-lt"/>
-                <a:ea typeface="+mn-ea"/>
-                <a:cs typeface="+mn-cs"/>
-              </a:defRPr>
-            </a:lvl9pPr>
-          </a:lstStyle>
-          <a:p>
-            <a:r>
-              <a:rPr lang="en-US" dirty="0">
-                <a:latin typeface="Helvetica World" panose="020B0500040000020004" pitchFamily="34" charset="0"/>
-                <a:cs typeface="Helvetica World" panose="020B0500040000020004" pitchFamily="34" charset="0"/>
-              </a:rPr>
-              <a:t>CSS with superpowers</a:t>
-            </a:r>
-          </a:p>
-        </p:txBody>
-      </p:sp>
-      <p:sp>
-        <p:nvSpPr>
-          <p:cNvPr id="9" name="Rubrik 1"/>
-          <p:cNvSpPr txBox="1">
-            <a:spLocks/>
-          </p:cNvSpPr>
-          <p:nvPr/>
-        </p:nvSpPr>
-        <p:spPr>
-          <a:xfrm>
-            <a:off x="2685038" y="365125"/>
-            <a:ext cx="7024103" cy="1305509"/>
-          </a:xfrm>
-          <a:prstGeom prst="rect">
-            <a:avLst/>
-          </a:prstGeom>
-        </p:spPr>
-        <p:txBody>
-          <a:bodyPr vert="horz" lIns="91440" tIns="45720" rIns="91440" bIns="45720" rtlCol="0" anchor="b">
-            <a:normAutofit fontScale="70000" lnSpcReduction="20000"/>
-          </a:bodyPr>
-          <a:lstStyle>
-            <a:lvl1pPr algn="ctr" defTabSz="914400" rtl="0" eaLnBrk="1" latinLnBrk="0" hangingPunct="1">
-              <a:lnSpc>
-                <a:spcPct val="90000"/>
-              </a:lnSpc>
-              <a:spcBef>
-                <a:spcPct val="0"/>
-              </a:spcBef>
-              <a:buNone/>
-              <a:defRPr sz="6000" kern="1200">
-                <a:solidFill>
-                  <a:schemeClr val="tx1"/>
-                </a:solidFill>
-                <a:latin typeface="+mj-lt"/>
-                <a:ea typeface="+mj-ea"/>
-                <a:cs typeface="+mj-cs"/>
-              </a:defRPr>
-            </a:lvl1pPr>
-          </a:lstStyle>
-          <a:p>
-            <a:r>
-              <a:rPr lang="en-US" dirty="0">
-                <a:latin typeface="HelveticaRounded LT Std Bd" panose="020F0804030503020204" pitchFamily="34" charset="0"/>
-              </a:rPr>
-              <a:t>Pre-processing languages for dynamic stylesheets</a:t>
-            </a:r>
-          </a:p>
-        </p:txBody>
-      </p:sp>
-      <p:pic>
-        <p:nvPicPr>
-          <p:cNvPr id="11" name="Bildobjekt 10"/>
-          <p:cNvPicPr>
-            <a:picLocks noChangeAspect="1"/>
-          </p:cNvPicPr>
-          <p:nvPr/>
-        </p:nvPicPr>
-        <p:blipFill>
-          <a:blip r:embed="rId4">
-            <a:extLst>
-              <a:ext uri="{28A0092B-C50C-407E-A947-70E740481C1C}">
-                <a14:useLocalDpi xmlns:a14="http://schemas.microsoft.com/office/drawing/2010/main" val="0"/>
-              </a:ext>
-            </a:extLst>
-          </a:blip>
-          <a:stretch>
-            <a:fillRect/>
-          </a:stretch>
-        </p:blipFill>
-        <p:spPr>
-          <a:xfrm>
-            <a:off x="2668168" y="5233094"/>
-            <a:ext cx="7040974" cy="1273684"/>
-          </a:xfrm>
-          <a:prstGeom prst="rect">
-            <a:avLst/>
-          </a:prstGeom>
-        </p:spPr>
-      </p:pic>
-      <p:sp>
-        <p:nvSpPr>
-          <p:cNvPr id="12" name="Rubrik 1"/>
-          <p:cNvSpPr txBox="1">
-            <a:spLocks/>
-          </p:cNvSpPr>
-          <p:nvPr/>
-        </p:nvSpPr>
-        <p:spPr>
-          <a:xfrm>
-            <a:off x="2685039" y="5237936"/>
-            <a:ext cx="3513648" cy="632377"/>
-          </a:xfrm>
-          <a:prstGeom prst="rect">
-            <a:avLst/>
-          </a:prstGeom>
-        </p:spPr>
-        <p:txBody>
-          <a:bodyPr vert="horz" lIns="91440" tIns="45720" rIns="91440" bIns="45720" rtlCol="0" anchor="b">
-            <a:normAutofit fontScale="85000" lnSpcReduction="10000"/>
-          </a:bodyPr>
-          <a:lstStyle>
-            <a:lvl1pPr algn="ctr" defTabSz="914400" rtl="0" eaLnBrk="1" latinLnBrk="0" hangingPunct="1">
-              <a:lnSpc>
-                <a:spcPct val="90000"/>
-              </a:lnSpc>
-              <a:spcBef>
-                <a:spcPct val="0"/>
-              </a:spcBef>
-              <a:buNone/>
-              <a:defRPr sz="6000" kern="1200">
-                <a:solidFill>
-                  <a:schemeClr val="tx1"/>
-                </a:solidFill>
-                <a:latin typeface="+mj-lt"/>
-                <a:ea typeface="+mj-ea"/>
-                <a:cs typeface="+mj-cs"/>
-              </a:defRPr>
-            </a:lvl1pPr>
-          </a:lstStyle>
-          <a:p>
-            <a:r>
-              <a:rPr lang="en-US" sz="4200" b="1" dirty="0">
-                <a:solidFill>
-                  <a:srgbClr val="CD6329"/>
-                </a:solidFill>
-                <a:latin typeface="Arial" panose="020B0604020202020204" pitchFamily="34" charset="0"/>
-                <a:cs typeface="Arial" panose="020B0604020202020204" pitchFamily="34" charset="0"/>
-              </a:rPr>
-              <a:t>Stellan Lindell</a:t>
-            </a:r>
-          </a:p>
-        </p:txBody>
-      </p:sp>
     </p:spTree>
     <p:extLst>
       <p:ext uri="{BB962C8B-B14F-4D97-AF65-F5344CB8AC3E}">
-        <p14:creationId xmlns:p14="http://schemas.microsoft.com/office/powerpoint/2010/main" val="1095336902"/>
+        <p14:creationId xmlns:p14="http://schemas.microsoft.com/office/powerpoint/2010/main" val="568533035"/>
       </p:ext>
     </p:extLst>
   </p:cSld>
   <p:clrMapOvr>
     <a:masterClrMapping/>
   </p:clrMapOvr>
-  <mc:AlternateContent xmlns:mc="http://schemas.openxmlformats.org/markup-compatibility/2006">
-    <mc:Choice xmlns:p14="http://schemas.microsoft.com/office/powerpoint/2010/main" Requires="p14">
+  <mc:AlternateContent xmlns:mc="http://schemas.openxmlformats.org/markup-compatibility/2006" xmlns:p14="http://schemas.microsoft.com/office/powerpoint/2010/main">
+    <mc:Choice Requires="p14">
       <p:transition spd="slow" p14:dur="1500">
         <p:push dir="u"/>
       </p:transition>
     </mc:Choice>
-    <mc:Fallback>
+    <mc:Fallback xmlns="">
       <p:transition spd="slow">
         <p:push dir="u"/>
       </p:transition>
@@ -3625,7 +3252,7 @@
                                     </p:set>
                                     <p:animEffect transition="in" filter="fade">
                                       <p:cBhvr>
-                                        <p:cTn id="7" dur="500"/>
+                                        <p:cTn id="7" dur="1000"/>
                                         <p:tgtEl>
                                           <p:spTgt spid="9"/>
                                         </p:tgtEl>
@@ -3634,34 +3261,21 @@
                                   </p:childTnLst>
                                 </p:cTn>
                               </p:par>
-                            </p:childTnLst>
-                          </p:cTn>
-                        </p:par>
-                        <p:par>
-                          <p:cTn id="8" fill="hold">
-                            <p:stCondLst>
-                              <p:cond delay="500"/>
-                            </p:stCondLst>
-                            <p:childTnLst>
                               <p:par>
-                                <p:cTn id="9" presetID="10" presetClass="entr" presetSubtype="0" fill="hold" grpId="0" nodeType="afterEffect">
+                                <p:cTn id="8" presetID="10" presetClass="entr" presetSubtype="0" fill="hold" nodeType="withEffect">
                                   <p:stCondLst>
-                                    <p:cond delay="500"/>
+                                    <p:cond delay="0"/>
                                   </p:stCondLst>
                                   <p:childTnLst>
                                     <p:set>
                                       <p:cBhvr>
-                                        <p:cTn id="10" dur="1" fill="hold">
+                                        <p:cTn id="9" dur="1" fill="hold">
                                           <p:stCondLst>
                                             <p:cond delay="0"/>
                                           </p:stCondLst>
                                         </p:cTn>
                                         <p:tgtEl>
-                                          <p:spTgt spid="3">
-                                            <p:txEl>
-                                              <p:pRg st="0" end="0"/>
-                                            </p:txEl>
-                                          </p:spTgt>
+                                          <p:spTgt spid="11"/>
                                         </p:tgtEl>
                                         <p:attrNameLst>
                                           <p:attrName>style.visibility</p:attrName>
@@ -3673,250 +3287,9 @@
                                     </p:set>
                                     <p:animEffect transition="in" filter="fade">
                                       <p:cBhvr>
-                                        <p:cTn id="11" dur="1000"/>
-                                        <p:tgtEl>
-                                          <p:spTgt spid="3">
-                                            <p:txEl>
-                                              <p:pRg st="0" end="0"/>
-                                            </p:txEl>
-                                          </p:spTgt>
-                                        </p:tgtEl>
-                                      </p:cBhvr>
-                                    </p:animEffect>
-                                  </p:childTnLst>
-                                </p:cTn>
-                              </p:par>
-                              <p:par>
-                                <p:cTn id="12" presetID="10" presetClass="entr" presetSubtype="0" fill="hold" nodeType="withEffect">
-                                  <p:stCondLst>
-                                    <p:cond delay="500"/>
-                                  </p:stCondLst>
-                                  <p:childTnLst>
-                                    <p:set>
-                                      <p:cBhvr>
-                                        <p:cTn id="13" dur="1" fill="hold">
-                                          <p:stCondLst>
-                                            <p:cond delay="0"/>
-                                          </p:stCondLst>
-                                        </p:cTn>
-                                        <p:tgtEl>
-                                          <p:spTgt spid="7"/>
-                                        </p:tgtEl>
-                                        <p:attrNameLst>
-                                          <p:attrName>style.visibility</p:attrName>
-                                        </p:attrNameLst>
-                                      </p:cBhvr>
-                                      <p:to>
-                                        <p:strVal val="visible"/>
-                                      </p:to>
-                                    </p:set>
-                                    <p:animEffect transition="in" filter="fade">
-                                      <p:cBhvr>
-                                        <p:cTn id="14" dur="1000"/>
-                                        <p:tgtEl>
-                                          <p:spTgt spid="7"/>
-                                        </p:tgtEl>
-                                      </p:cBhvr>
-                                    </p:animEffect>
-                                  </p:childTnLst>
-                                </p:cTn>
-                              </p:par>
-                            </p:childTnLst>
-                          </p:cTn>
-                        </p:par>
-                        <p:par>
-                          <p:cTn id="15" fill="hold">
-                            <p:stCondLst>
-                              <p:cond delay="2000"/>
-                            </p:stCondLst>
-                            <p:childTnLst>
-                              <p:par>
-                                <p:cTn id="16" presetID="10" presetClass="entr" presetSubtype="0" fill="hold" grpId="0" nodeType="afterEffect">
-                                  <p:stCondLst>
-                                    <p:cond delay="500"/>
-                                  </p:stCondLst>
-                                  <p:childTnLst>
-                                    <p:set>
-                                      <p:cBhvr>
-                                        <p:cTn id="17" dur="1" fill="hold">
-                                          <p:stCondLst>
-                                            <p:cond delay="0"/>
-                                          </p:stCondLst>
-                                        </p:cTn>
-                                        <p:tgtEl>
-                                          <p:spTgt spid="2"/>
-                                        </p:tgtEl>
-                                        <p:attrNameLst>
-                                          <p:attrName>style.visibility</p:attrName>
-                                        </p:attrNameLst>
-                                      </p:cBhvr>
-                                      <p:to>
-                                        <p:strVal val="visible"/>
-                                      </p:to>
-                                    </p:set>
-                                    <p:animEffect transition="in" filter="fade">
-                                      <p:cBhvr>
-                                        <p:cTn id="18" dur="1000"/>
-                                        <p:tgtEl>
-                                          <p:spTgt spid="2"/>
-                                        </p:tgtEl>
-                                      </p:cBhvr>
-                                    </p:animEffect>
-                                  </p:childTnLst>
-                                </p:cTn>
-                              </p:par>
-                            </p:childTnLst>
-                          </p:cTn>
-                        </p:par>
-                        <p:par>
-                          <p:cTn id="19" fill="hold">
-                            <p:stCondLst>
-                              <p:cond delay="3500"/>
-                            </p:stCondLst>
-                            <p:childTnLst>
-                              <p:par>
-                                <p:cTn id="20" presetID="10" presetClass="entr" presetSubtype="0" fill="hold" grpId="0" nodeType="afterEffect">
-                                  <p:stCondLst>
-                                    <p:cond delay="500"/>
-                                  </p:stCondLst>
-                                  <p:childTnLst>
-                                    <p:set>
-                                      <p:cBhvr>
-                                        <p:cTn id="21" dur="1" fill="hold">
-                                          <p:stCondLst>
-                                            <p:cond delay="0"/>
-                                          </p:stCondLst>
-                                        </p:cTn>
-                                        <p:tgtEl>
-                                          <p:spTgt spid="8"/>
-                                        </p:tgtEl>
-                                        <p:attrNameLst>
-                                          <p:attrName>style.visibility</p:attrName>
-                                        </p:attrNameLst>
-                                      </p:cBhvr>
-                                      <p:to>
-                                        <p:strVal val="visible"/>
-                                      </p:to>
-                                    </p:set>
-                                    <p:animEffect transition="in" filter="fade">
-                                      <p:cBhvr>
-                                        <p:cTn id="22" dur="1000"/>
-                                        <p:tgtEl>
-                                          <p:spTgt spid="8"/>
-                                        </p:tgtEl>
-                                      </p:cBhvr>
-                                    </p:animEffect>
-                                  </p:childTnLst>
-                                </p:cTn>
-                              </p:par>
-                              <p:par>
-                                <p:cTn id="23" presetID="10" presetClass="entr" presetSubtype="0" fill="hold" nodeType="withEffect">
-                                  <p:stCondLst>
-                                    <p:cond delay="500"/>
-                                  </p:stCondLst>
-                                  <p:childTnLst>
-                                    <p:set>
-                                      <p:cBhvr>
-                                        <p:cTn id="24" dur="1" fill="hold">
-                                          <p:stCondLst>
-                                            <p:cond delay="0"/>
-                                          </p:stCondLst>
-                                        </p:cTn>
-                                        <p:tgtEl>
-                                          <p:spTgt spid="6"/>
-                                        </p:tgtEl>
-                                        <p:attrNameLst>
-                                          <p:attrName>style.visibility</p:attrName>
-                                        </p:attrNameLst>
-                                      </p:cBhvr>
-                                      <p:to>
-                                        <p:strVal val="visible"/>
-                                      </p:to>
-                                    </p:set>
-                                    <p:animEffect transition="in" filter="fade">
-                                      <p:cBhvr>
-                                        <p:cTn id="25" dur="1000"/>
-                                        <p:tgtEl>
-                                          <p:spTgt spid="6"/>
-                                        </p:tgtEl>
-                                      </p:cBhvr>
-                                    </p:animEffect>
-                                  </p:childTnLst>
-                                </p:cTn>
-                              </p:par>
-                            </p:childTnLst>
-                          </p:cTn>
-                        </p:par>
-                        <p:par>
-                          <p:cTn id="26" fill="hold">
-                            <p:stCondLst>
-                              <p:cond delay="5000"/>
-                            </p:stCondLst>
-                            <p:childTnLst>
-                              <p:par>
-                                <p:cTn id="27" presetID="10" presetClass="entr" presetSubtype="0" fill="hold" nodeType="afterEffect">
-                                  <p:stCondLst>
-                                    <p:cond delay="250"/>
-                                  </p:stCondLst>
-                                  <p:childTnLst>
-                                    <p:set>
-                                      <p:cBhvr>
-                                        <p:cTn id="28" dur="1" fill="hold">
-                                          <p:stCondLst>
-                                            <p:cond delay="0"/>
-                                          </p:stCondLst>
-                                        </p:cTn>
+                                        <p:cTn id="10" dur="1000"/>
                                         <p:tgtEl>
                                           <p:spTgt spid="11"/>
-                                        </p:tgtEl>
-                                        <p:attrNameLst>
-                                          <p:attrName>style.visibility</p:attrName>
-                                        </p:attrNameLst>
-                                      </p:cBhvr>
-                                      <p:to>
-                                        <p:strVal val="visible"/>
-                                      </p:to>
-                                    </p:set>
-                                    <p:animEffect transition="in" filter="fade">
-                                      <p:cBhvr>
-                                        <p:cTn id="29" dur="500"/>
-                                        <p:tgtEl>
-                                          <p:spTgt spid="11"/>
-                                        </p:tgtEl>
-                                      </p:cBhvr>
-                                    </p:animEffect>
-                                  </p:childTnLst>
-                                </p:cTn>
-                              </p:par>
-                              <p:par>
-                                <p:cTn id="30" presetID="10" presetClass="entr" presetSubtype="0" fill="hold" grpId="0" nodeType="withEffect">
-                                  <p:stCondLst>
-                                    <p:cond delay="250"/>
-                                  </p:stCondLst>
-                                  <p:childTnLst>
-                                    <p:set>
-                                      <p:cBhvr>
-                                        <p:cTn id="31" dur="1" fill="hold">
-                                          <p:stCondLst>
-                                            <p:cond delay="0"/>
-                                          </p:stCondLst>
-                                        </p:cTn>
-                                        <p:tgtEl>
-                                          <p:spTgt spid="12"/>
-                                        </p:tgtEl>
-                                        <p:attrNameLst>
-                                          <p:attrName>style.visibility</p:attrName>
-                                        </p:attrNameLst>
-                                      </p:cBhvr>
-                                      <p:to>
-                                        <p:strVal val="visible"/>
-                                      </p:to>
-                                    </p:set>
-                                    <p:animEffect transition="in" filter="fade">
-                                      <p:cBhvr>
-                                        <p:cTn id="32" dur="500"/>
-                                        <p:tgtEl>
-                                          <p:spTgt spid="12"/>
                                         </p:tgtEl>
                                       </p:cBhvr>
                                     </p:animEffect>
@@ -3951,11 +3324,7 @@
       </p:par>
     </p:tnLst>
     <p:bldLst>
-      <p:bldP spid="2" grpId="0"/>
-      <p:bldP spid="3" grpId="0" build="p"/>
-      <p:bldP spid="8" grpId="0"/>
       <p:bldP spid="9" grpId="0"/>
-      <p:bldP spid="12" grpId="0"/>
     </p:bldLst>
   </p:timing>
 </p:sld>
@@ -4671,13 +4040,13 @@
   <p:clrMapOvr>
     <a:masterClrMapping/>
   </p:clrMapOvr>
-  <mc:AlternateContent xmlns:mc="http://schemas.openxmlformats.org/markup-compatibility/2006">
-    <mc:Choice xmlns:p14="http://schemas.microsoft.com/office/powerpoint/2010/main" Requires="p14">
+  <mc:AlternateContent xmlns:mc="http://schemas.openxmlformats.org/markup-compatibility/2006" xmlns:p14="http://schemas.microsoft.com/office/powerpoint/2010/main">
+    <mc:Choice Requires="p14">
       <p:transition spd="slow" p14:dur="1500">
         <p:push dir="u"/>
       </p:transition>
     </mc:Choice>
-    <mc:Fallback>
+    <mc:Fallback xmlns="">
       <p:transition spd="slow">
         <p:push dir="u"/>
       </p:transition>
@@ -4733,7 +4102,7 @@
                                     </p:set>
                                     <p:animEffect transition="in" filter="fade">
                                       <p:cBhvr>
-                                        <p:cTn id="7" dur="500"/>
+                                        <p:cTn id="7" dur="1000"/>
                                         <p:tgtEl>
                                           <p:spTgt spid="3">
                                             <p:txEl>
@@ -4776,7 +4145,7 @@
                                     </p:set>
                                     <p:animEffect transition="in" filter="fade">
                                       <p:cBhvr>
-                                        <p:cTn id="10" dur="500"/>
+                                        <p:cTn id="10" dur="1000"/>
                                         <p:tgtEl>
                                           <p:spTgt spid="3">
                                             <p:txEl>
@@ -4819,7 +4188,7 @@
                                     </p:set>
                                     <p:animEffect transition="in" filter="fade">
                                       <p:cBhvr>
-                                        <p:cTn id="13" dur="500"/>
+                                        <p:cTn id="13" dur="1000"/>
                                         <p:tgtEl>
                                           <p:spTgt spid="3">
                                             <p:txEl>
@@ -4862,7 +4231,7 @@
                                     </p:set>
                                     <p:animEffect transition="in" filter="fade">
                                       <p:cBhvr>
-                                        <p:cTn id="16" dur="500"/>
+                                        <p:cTn id="16" dur="1000"/>
                                         <p:tgtEl>
                                           <p:spTgt spid="3">
                                             <p:txEl>
@@ -4905,7 +4274,7 @@
                                     </p:set>
                                     <p:animEffect transition="in" filter="fade">
                                       <p:cBhvr>
-                                        <p:cTn id="19" dur="500"/>
+                                        <p:cTn id="19" dur="1000"/>
                                         <p:tgtEl>
                                           <p:spTgt spid="3">
                                             <p:txEl>
@@ -4948,7 +4317,7 @@
                                     </p:set>
                                     <p:animEffect transition="in" filter="fade">
                                       <p:cBhvr>
-                                        <p:cTn id="22" dur="500"/>
+                                        <p:cTn id="22" dur="1000"/>
                                         <p:tgtEl>
                                           <p:spTgt spid="3">
                                             <p:txEl>
@@ -4991,7 +4360,7 @@
                                     </p:set>
                                     <p:animEffect transition="in" filter="fade">
                                       <p:cBhvr>
-                                        <p:cTn id="25" dur="500"/>
+                                        <p:cTn id="25" dur="1000"/>
                                         <p:tgtEl>
                                           <p:spTgt spid="3">
                                             <p:txEl>
@@ -5034,7 +4403,7 @@
                                     </p:set>
                                     <p:animEffect transition="in" filter="fade">
                                       <p:cBhvr>
-                                        <p:cTn id="28" dur="500"/>
+                                        <p:cTn id="28" dur="1000"/>
                                         <p:tgtEl>
                                           <p:spTgt spid="3">
                                             <p:txEl>
@@ -5077,7 +4446,7 @@
                                     </p:set>
                                     <p:animEffect transition="in" filter="fade">
                                       <p:cBhvr>
-                                        <p:cTn id="31" dur="500"/>
+                                        <p:cTn id="31" dur="1000"/>
                                         <p:tgtEl>
                                           <p:spTgt spid="3">
                                             <p:txEl>
@@ -5120,7 +4489,7 @@
                                     </p:set>
                                     <p:animEffect transition="in" filter="fade">
                                       <p:cBhvr>
-                                        <p:cTn id="34" dur="500"/>
+                                        <p:cTn id="34" dur="1000"/>
                                         <p:tgtEl>
                                           <p:spTgt spid="3">
                                             <p:txEl>
@@ -5163,7 +4532,7 @@
                                     </p:set>
                                     <p:animEffect transition="in" filter="fade">
                                       <p:cBhvr>
-                                        <p:cTn id="37" dur="500"/>
+                                        <p:cTn id="37" dur="1000"/>
                                         <p:tgtEl>
                                           <p:spTgt spid="3">
                                             <p:txEl>
@@ -5206,7 +4575,7 @@
                                     </p:set>
                                     <p:animEffect transition="in" filter="fade">
                                       <p:cBhvr>
-                                        <p:cTn id="40" dur="500"/>
+                                        <p:cTn id="40" dur="1000"/>
                                         <p:tgtEl>
                                           <p:spTgt spid="3">
                                             <p:txEl>
@@ -5249,7 +4618,7 @@
                                     </p:set>
                                     <p:animEffect transition="in" filter="fade">
                                       <p:cBhvr>
-                                        <p:cTn id="43" dur="500"/>
+                                        <p:cTn id="43" dur="1000"/>
                                         <p:tgtEl>
                                           <p:spTgt spid="3">
                                             <p:txEl>
@@ -5292,7 +4661,7 @@
                                     </p:set>
                                     <p:animEffect transition="in" filter="fade">
                                       <p:cBhvr>
-                                        <p:cTn id="46" dur="500"/>
+                                        <p:cTn id="46" dur="1000"/>
                                         <p:tgtEl>
                                           <p:spTgt spid="3">
                                             <p:txEl>
@@ -5335,7 +4704,7 @@
                                     </p:set>
                                     <p:animEffect transition="in" filter="fade">
                                       <p:cBhvr>
-                                        <p:cTn id="49" dur="500"/>
+                                        <p:cTn id="49" dur="1000"/>
                                         <p:tgtEl>
                                           <p:spTgt spid="3">
                                             <p:txEl>
@@ -5378,7 +4747,7 @@
                                     </p:set>
                                     <p:animEffect transition="in" filter="fade">
                                       <p:cBhvr>
-                                        <p:cTn id="52" dur="500"/>
+                                        <p:cTn id="52" dur="1000"/>
                                         <p:tgtEl>
                                           <p:spTgt spid="3">
                                             <p:txEl>
@@ -5421,7 +4790,7 @@
                                     </p:set>
                                     <p:animEffect transition="in" filter="fade">
                                       <p:cBhvr>
-                                        <p:cTn id="55" dur="500"/>
+                                        <p:cTn id="55" dur="1000"/>
                                         <p:tgtEl>
                                           <p:spTgt spid="3">
                                             <p:txEl>
@@ -5464,7 +4833,7 @@
                                     </p:set>
                                     <p:animEffect transition="in" filter="fade">
                                       <p:cBhvr>
-                                        <p:cTn id="58" dur="500"/>
+                                        <p:cTn id="58" dur="1000"/>
                                         <p:tgtEl>
                                           <p:spTgt spid="3">
                                             <p:txEl>
@@ -5521,7 +4890,7 @@
                                     </p:set>
                                     <p:animEffect transition="in" filter="fade">
                                       <p:cBhvr>
-                                        <p:cTn id="63" dur="500"/>
+                                        <p:cTn id="63" dur="1000"/>
                                         <p:tgtEl>
                                           <p:spTgt spid="5"/>
                                         </p:tgtEl>
@@ -6310,13 +5679,13 @@
   <p:clrMapOvr>
     <a:masterClrMapping/>
   </p:clrMapOvr>
-  <mc:AlternateContent xmlns:mc="http://schemas.openxmlformats.org/markup-compatibility/2006">
-    <mc:Choice xmlns:p14="http://schemas.microsoft.com/office/powerpoint/2010/main" Requires="p14">
+  <mc:AlternateContent xmlns:mc="http://schemas.openxmlformats.org/markup-compatibility/2006" xmlns:p14="http://schemas.microsoft.com/office/powerpoint/2010/main">
+    <mc:Choice Requires="p14">
       <p:transition spd="slow" p14:dur="1500">
         <p:push dir="u"/>
       </p:transition>
     </mc:Choice>
-    <mc:Fallback>
+    <mc:Fallback xmlns="">
       <p:transition spd="slow">
         <p:push dir="u"/>
       </p:transition>
@@ -6717,7 +6086,7 @@
         </p:nvSpPr>
         <p:spPr>
           <a:xfrm>
-            <a:off x="5706374" y="3595083"/>
+            <a:off x="5706373" y="3619152"/>
             <a:ext cx="779253" cy="884341"/>
           </a:xfrm>
         </p:spPr>
@@ -6748,8 +6117,8 @@
         </p:nvSpPr>
         <p:spPr>
           <a:xfrm>
-            <a:off x="2668168" y="4418049"/>
-            <a:ext cx="3038206" cy="413683"/>
+            <a:off x="2281724" y="4434619"/>
+            <a:ext cx="3027090" cy="413683"/>
           </a:xfrm>
         </p:spPr>
         <p:txBody>
@@ -6777,7 +6146,7 @@
           <p:nvPr/>
         </p:nvPicPr>
         <p:blipFill>
-          <a:blip r:embed="rId2">
+          <a:blip r:embed="rId2" cstate="print">
             <a:extLst>
               <a:ext uri="{28A0092B-C50C-407E-A947-70E740481C1C}">
                 <a14:useLocalDpi xmlns:a14="http://schemas.microsoft.com/office/drawing/2010/main" val="0"/>
@@ -6790,8 +6159,8 @@
         </p:blipFill>
         <p:spPr>
           <a:xfrm>
-            <a:off x="6676836" y="1998248"/>
-            <a:ext cx="3032306" cy="2274230"/>
+            <a:off x="6883187" y="1998397"/>
+            <a:ext cx="3032306" cy="2274229"/>
           </a:xfrm>
           <a:prstGeom prst="rect">
             <a:avLst/>
@@ -6807,7 +6176,7 @@
           <p:nvPr/>
         </p:nvPicPr>
         <p:blipFill>
-          <a:blip r:embed="rId3">
+          <a:blip r:embed="rId3" cstate="print">
             <a:extLst>
               <a:ext uri="{28A0092B-C50C-407E-A947-70E740481C1C}">
                 <a14:useLocalDpi xmlns:a14="http://schemas.microsoft.com/office/drawing/2010/main" val="0"/>
@@ -6820,8 +6189,8 @@
         </p:blipFill>
         <p:spPr>
           <a:xfrm>
-            <a:off x="2668168" y="3181400"/>
-            <a:ext cx="3038206" cy="1236657"/>
+            <a:off x="2281724" y="2921030"/>
+            <a:ext cx="3027090" cy="1351596"/>
           </a:xfrm>
           <a:prstGeom prst="rect">
             <a:avLst/>
@@ -6838,8 +6207,8 @@
         </p:nvSpPr>
         <p:spPr>
           <a:xfrm>
-            <a:off x="6673886" y="4418050"/>
-            <a:ext cx="3038206" cy="413683"/>
+            <a:off x="6883187" y="4433866"/>
+            <a:ext cx="3032306" cy="413683"/>
           </a:xfrm>
           <a:prstGeom prst="rect">
             <a:avLst/>
@@ -6847,7 +6216,7 @@
         </p:spPr>
         <p:txBody>
           <a:bodyPr vert="horz" lIns="91440" tIns="45720" rIns="91440" bIns="45720" rtlCol="0" anchor="b">
-            <a:normAutofit lnSpcReduction="10000"/>
+            <a:normAutofit fontScale="92500"/>
           </a:bodyPr>
           <a:lstStyle>
             <a:lvl1pPr marL="0" indent="0" algn="ctr" defTabSz="914400" rtl="0" eaLnBrk="1" latinLnBrk="0" hangingPunct="1">
@@ -7034,8 +6403,8 @@
         </p:nvSpPr>
         <p:spPr>
           <a:xfrm>
-            <a:off x="2577142" y="4938995"/>
-            <a:ext cx="7037717" cy="1325563"/>
+            <a:off x="2577142" y="5696160"/>
+            <a:ext cx="7037717" cy="502137"/>
           </a:xfrm>
           <a:prstGeom prst="rect">
             <a:avLst/>
@@ -7043,7 +6412,7 @@
         </p:spPr>
         <p:txBody>
           <a:bodyPr vert="horz" lIns="91440" tIns="45720" rIns="91440" bIns="45720" rtlCol="0" anchor="b">
-            <a:normAutofit/>
+            <a:normAutofit lnSpcReduction="10000"/>
           </a:bodyPr>
           <a:lstStyle>
             <a:lvl1pPr algn="ctr" defTabSz="914400" rtl="0" eaLnBrk="1" latinLnBrk="0" hangingPunct="1">
@@ -7066,26 +6435,20 @@
           </a:lstStyle>
           <a:p>
             <a:r>
-              <a:rPr lang="en-US" sz="3200" u="sng" dirty="0">
-                <a:solidFill>
-                  <a:schemeClr val="tx1">
-                    <a:lumMod val="95000"/>
-                    <a:lumOff val="5000"/>
-                  </a:schemeClr>
-                </a:solidFill>
-                <a:latin typeface="HelveticaRounded LT Std Bd" panose="020F0804030503020204" pitchFamily="34" charset="0"/>
+              <a:rPr lang="sv-SE" sz="3200" dirty="0">
+                <a:latin typeface="HelveticaRounded LT Std Bd" panose="020F0804030503020204"/>
                 <a:hlinkClick r:id="rId4"/>
               </a:rPr>
-              <a:t>http://tinyurl.com/sass-demo</a:t>
-            </a:r>
-            <a:endParaRPr lang="en-US" sz="3200" u="sng" dirty="0">
-              <a:solidFill>
-                <a:schemeClr val="tx1">
-                  <a:lumMod val="95000"/>
-                  <a:lumOff val="5000"/>
-                </a:schemeClr>
-              </a:solidFill>
-              <a:latin typeface="HelveticaRounded LT Std Bd" panose="020F0804030503020204" pitchFamily="34" charset="0"/>
+              <a:t>http://tinyurl.com/swetugg-sass</a:t>
+            </a:r>
+            <a:r>
+              <a:rPr lang="sv-SE" sz="3200" dirty="0">
+                <a:latin typeface="HelveticaRounded LT Std Bd" panose="020F0804030503020204"/>
+              </a:rPr>
+              <a:t> </a:t>
+            </a:r>
+            <a:endParaRPr lang="en-US" sz="3200" dirty="0">
+              <a:latin typeface="HelveticaRounded LT Std Bd" panose="020F0804030503020204"/>
             </a:endParaRPr>
           </a:p>
         </p:txBody>
@@ -7100,8 +6463,8 @@
         </p:nvSpPr>
         <p:spPr>
           <a:xfrm>
-            <a:off x="2577142" y="365125"/>
-            <a:ext cx="7037717" cy="1325563"/>
+            <a:off x="2577142" y="602976"/>
+            <a:ext cx="7037717" cy="828259"/>
           </a:xfrm>
           <a:prstGeom prst="rect">
             <a:avLst/>
@@ -7109,7 +6472,7 @@
         </p:spPr>
         <p:txBody>
           <a:bodyPr vert="horz" lIns="91440" tIns="45720" rIns="91440" bIns="45720" rtlCol="0" anchor="b">
-            <a:normAutofit/>
+            <a:normAutofit lnSpcReduction="10000"/>
           </a:bodyPr>
           <a:lstStyle>
             <a:lvl1pPr algn="ctr" defTabSz="914400" rtl="0" eaLnBrk="1" latinLnBrk="0" hangingPunct="1">
@@ -7150,13 +6513,13 @@
   <p:clrMapOvr>
     <a:masterClrMapping/>
   </p:clrMapOvr>
-  <mc:AlternateContent xmlns:mc="http://schemas.openxmlformats.org/markup-compatibility/2006">
-    <mc:Choice xmlns:p14="http://schemas.microsoft.com/office/powerpoint/2010/main" Requires="p14">
+  <mc:AlternateContent xmlns:mc="http://schemas.openxmlformats.org/markup-compatibility/2006" xmlns:p14="http://schemas.microsoft.com/office/powerpoint/2010/main">
+    <mc:Choice Requires="p14">
       <p:transition spd="slow" p14:dur="1500">
         <p:push dir="u"/>
       </p:transition>
     </mc:Choice>
-    <mc:Fallback>
+    <mc:Fallback xmlns="">
       <p:transition spd="slow">
         <p:push dir="u"/>
       </p:transition>
@@ -7182,166 +6545,16 @@
           <a:chExt cx="0" cy="0"/>
         </a:xfrm>
       </p:grpSpPr>
-      <p:sp>
-        <p:nvSpPr>
-          <p:cNvPr id="11" name="Rubrik 1"/>
-          <p:cNvSpPr txBox="1">
-            <a:spLocks/>
-          </p:cNvSpPr>
-          <p:nvPr/>
-        </p:nvSpPr>
-        <p:spPr>
-          <a:xfrm>
-            <a:off x="1060316" y="3064490"/>
-            <a:ext cx="9786024" cy="2898567"/>
-          </a:xfrm>
-          <a:prstGeom prst="rect">
-            <a:avLst/>
-          </a:prstGeom>
-        </p:spPr>
-        <p:txBody>
-          <a:bodyPr vert="horz" lIns="91440" tIns="45720" rIns="91440" bIns="45720" rtlCol="0" anchor="b">
-            <a:normAutofit/>
-          </a:bodyPr>
-          <a:lstStyle>
-            <a:lvl1pPr algn="ctr" defTabSz="914400" rtl="0" eaLnBrk="1" latinLnBrk="0" hangingPunct="1">
-              <a:lnSpc>
-                <a:spcPct val="90000"/>
-              </a:lnSpc>
-              <a:spcBef>
-                <a:spcPct val="0"/>
-              </a:spcBef>
-              <a:buNone/>
-              <a:defRPr sz="6000" kern="1200">
-                <a:solidFill>
-                  <a:schemeClr val="tx1"/>
-                </a:solidFill>
-                <a:latin typeface="+mj-lt"/>
-                <a:ea typeface="+mj-ea"/>
-                <a:cs typeface="+mj-cs"/>
-              </a:defRPr>
-            </a:lvl1pPr>
-          </a:lstStyle>
-          <a:p>
-            <a:pPr algn="l"/>
-            <a:r>
-              <a:rPr lang="en-US" sz="2800">
-                <a:latin typeface="HelveticaRounded LT Std Bd" panose="020F0804030503020204"/>
-              </a:rPr>
-              <a:t>Mail</a:t>
-            </a:r>
-            <a:r>
-              <a:rPr lang="en-US" sz="2800" dirty="0">
-                <a:latin typeface="HelveticaRounded LT Std Bd" panose="020F0804030503020204"/>
-              </a:rPr>
-              <a:t>: </a:t>
-            </a:r>
-            <a:r>
-              <a:rPr lang="en-US" sz="2800" dirty="0">
-                <a:latin typeface="HelveticaRounded LT Std Bd" panose="020F0804030503020204"/>
-                <a:hlinkClick r:id="rId2"/>
-              </a:rPr>
-              <a:t>stellan.Lindell@softhouse.se</a:t>
-            </a:r>
-            <a:endParaRPr lang="en-US" sz="2800" dirty="0">
-              <a:latin typeface="HelveticaRounded LT Std Bd" panose="020F0804030503020204"/>
-            </a:endParaRPr>
-          </a:p>
-          <a:p>
-            <a:pPr algn="l"/>
-            <a:endParaRPr lang="en-US" sz="2800" dirty="0">
-              <a:latin typeface="HelveticaRounded LT Std Bd" panose="020F0804030503020204"/>
-            </a:endParaRPr>
-          </a:p>
-          <a:p>
-            <a:pPr lvl="0" algn="l"/>
-            <a:r>
-              <a:rPr lang="en-US" sz="2800" dirty="0">
-                <a:latin typeface="HelveticaRounded LT Std Bd" panose="020F0804030503020204"/>
-              </a:rPr>
-              <a:t>LinkedIn: </a:t>
-            </a:r>
-            <a:r>
-              <a:rPr lang="sv-SE" altLang="sv-SE" sz="2800" dirty="0">
-                <a:latin typeface="HelveticaRounded LT Std Bd" panose="020F0804030503020204"/>
-                <a:hlinkClick r:id="rId3"/>
-              </a:rPr>
-              <a:t>https://se.linkedin.com/in/stellanlindell</a:t>
-            </a:r>
-            <a:endParaRPr lang="sv-SE" altLang="sv-SE" sz="2800" dirty="0">
-              <a:latin typeface="HelveticaRounded LT Std Bd" panose="020F0804030503020204"/>
-            </a:endParaRPr>
-          </a:p>
-          <a:p>
-            <a:pPr lvl="0" algn="l"/>
-            <a:r>
-              <a:rPr lang="sv-SE" altLang="sv-SE" sz="2800" dirty="0">
-                <a:latin typeface="HelveticaRounded LT Std Bd" panose="020F0804030503020204"/>
-              </a:rPr>
-              <a:t> </a:t>
-            </a:r>
-            <a:endParaRPr lang="en-US" sz="2800" dirty="0">
-              <a:latin typeface="HelveticaRounded LT Std Bd" panose="020F0804030503020204"/>
-            </a:endParaRPr>
-          </a:p>
-          <a:p>
-            <a:pPr algn="l"/>
-            <a:r>
-              <a:rPr lang="en-US" sz="2800" dirty="0">
-                <a:latin typeface="HelveticaRounded LT Std Bd" panose="020F0804030503020204"/>
-              </a:rPr>
-              <a:t>Twitter: @</a:t>
-            </a:r>
-            <a:r>
-              <a:rPr lang="en-US" sz="2800" dirty="0" err="1">
-                <a:latin typeface="HelveticaRounded LT Std Bd" panose="020F0804030503020204"/>
-              </a:rPr>
-              <a:t>stellanlindell</a:t>
-            </a:r>
-            <a:endParaRPr lang="en-US" sz="2800" dirty="0">
-              <a:latin typeface="HelveticaRounded LT Std Bd" panose="020F0804030503020204"/>
-            </a:endParaRPr>
-          </a:p>
-          <a:p>
-            <a:pPr algn="l"/>
-            <a:endParaRPr lang="en-US" sz="2800" dirty="0">
-              <a:latin typeface="HelveticaRounded LT Std Bd" panose="020F0804030503020204"/>
-            </a:endParaRPr>
-          </a:p>
-          <a:p>
-            <a:pPr algn="l"/>
-            <a:r>
-              <a:rPr lang="en-US" sz="2800" dirty="0">
-                <a:latin typeface="HelveticaRounded LT Std Bd" panose="020F0804030503020204"/>
-              </a:rPr>
-              <a:t>GitHub: </a:t>
-            </a:r>
-            <a:r>
-              <a:rPr lang="en-US" sz="2800" dirty="0">
-                <a:latin typeface="HelveticaRounded LT Std Bd" panose="020F0804030503020204"/>
-                <a:hlinkClick r:id="rId4"/>
-              </a:rPr>
-              <a:t>https://github.com/stiltet</a:t>
-            </a:r>
-            <a:r>
-              <a:rPr lang="en-US" sz="2800" dirty="0">
-                <a:latin typeface="HelveticaRounded LT Std Bd" panose="020F0804030503020204"/>
-              </a:rPr>
-              <a:t> </a:t>
-            </a:r>
-          </a:p>
-        </p:txBody>
-      </p:sp>
       <p:pic>
         <p:nvPicPr>
-          <p:cNvPr id="14" name="Bildobjekt 13"/>
+          <p:cNvPr id="3" name="Bildobjekt 2"/>
           <p:cNvPicPr>
             <a:picLocks noChangeAspect="1"/>
           </p:cNvPicPr>
           <p:nvPr/>
         </p:nvPicPr>
         <p:blipFill>
-          <a:blip r:embed="rId5">
+          <a:blip r:embed="rId2" cstate="print">
             <a:extLst>
               <a:ext uri="{28A0092B-C50C-407E-A947-70E740481C1C}">
                 <a14:useLocalDpi xmlns:a14="http://schemas.microsoft.com/office/drawing/2010/main" val="0"/>
@@ -7354,14 +6567,198 @@
         </p:blipFill>
         <p:spPr>
           <a:xfrm>
-            <a:off x="2277895" y="861118"/>
-            <a:ext cx="7636211" cy="1381360"/>
+            <a:off x="3139224" y="1478755"/>
+            <a:ext cx="5628208" cy="1048552"/>
           </a:xfrm>
           <a:prstGeom prst="rect">
             <a:avLst/>
           </a:prstGeom>
         </p:spPr>
       </p:pic>
+      <p:sp>
+        <p:nvSpPr>
+          <p:cNvPr id="11" name="Rubrik 1"/>
+          <p:cNvSpPr txBox="1">
+            <a:spLocks/>
+          </p:cNvSpPr>
+          <p:nvPr/>
+        </p:nvSpPr>
+        <p:spPr>
+          <a:xfrm>
+            <a:off x="1060315" y="2925342"/>
+            <a:ext cx="9786024" cy="3435701"/>
+          </a:xfrm>
+          <a:prstGeom prst="rect">
+            <a:avLst/>
+          </a:prstGeom>
+        </p:spPr>
+        <p:txBody>
+          <a:bodyPr vert="horz" lIns="91440" tIns="45720" rIns="91440" bIns="45720" rtlCol="0" anchor="b">
+            <a:normAutofit lnSpcReduction="10000"/>
+          </a:bodyPr>
+          <a:lstStyle>
+            <a:lvl1pPr algn="ctr" defTabSz="914400" rtl="0" eaLnBrk="1" latinLnBrk="0" hangingPunct="1">
+              <a:lnSpc>
+                <a:spcPct val="90000"/>
+              </a:lnSpc>
+              <a:spcBef>
+                <a:spcPct val="0"/>
+              </a:spcBef>
+              <a:buNone/>
+              <a:defRPr sz="6000" kern="1200">
+                <a:solidFill>
+                  <a:schemeClr val="tx1"/>
+                </a:solidFill>
+                <a:latin typeface="+mj-lt"/>
+                <a:ea typeface="+mj-ea"/>
+                <a:cs typeface="+mj-cs"/>
+              </a:defRPr>
+            </a:lvl1pPr>
+          </a:lstStyle>
+          <a:p>
+            <a:pPr algn="l"/>
+            <a:r>
+              <a:rPr lang="en-US" sz="2800" dirty="0">
+                <a:latin typeface="HelveticaRounded LT Std Bd" panose="020F0804030503020204"/>
+              </a:rPr>
+              <a:t>Mail: </a:t>
+            </a:r>
+            <a:r>
+              <a:rPr lang="en-US" sz="2800" dirty="0">
+                <a:latin typeface="HelveticaRounded LT Std Bd" panose="020F0804030503020204"/>
+                <a:hlinkClick r:id="rId3"/>
+              </a:rPr>
+              <a:t>jobb@stellanlindell.se</a:t>
+            </a:r>
+            <a:r>
+              <a:rPr lang="en-US" sz="2800" dirty="0">
+                <a:latin typeface="HelveticaRounded LT Std Bd" panose="020F0804030503020204"/>
+              </a:rPr>
+              <a:t> </a:t>
+            </a:r>
+          </a:p>
+          <a:p>
+            <a:pPr algn="l"/>
+            <a:endParaRPr lang="en-US" sz="2800" dirty="0">
+              <a:latin typeface="HelveticaRounded LT Std Bd" panose="020F0804030503020204"/>
+            </a:endParaRPr>
+          </a:p>
+          <a:p>
+            <a:pPr lvl="0" algn="l"/>
+            <a:r>
+              <a:rPr lang="en-US" sz="2800" dirty="0">
+                <a:latin typeface="HelveticaRounded LT Std Bd" panose="020F0804030503020204"/>
+              </a:rPr>
+              <a:t>LinkedIn: </a:t>
+            </a:r>
+            <a:r>
+              <a:rPr lang="sv-SE" altLang="sv-SE" sz="2800" dirty="0">
+                <a:latin typeface="HelveticaRounded LT Std Bd" panose="020F0804030503020204"/>
+                <a:hlinkClick r:id="rId4"/>
+              </a:rPr>
+              <a:t>https://se.linkedin.com/in/stellanlindell</a:t>
+            </a:r>
+            <a:endParaRPr lang="sv-SE" altLang="sv-SE" sz="2800" dirty="0">
+              <a:latin typeface="HelveticaRounded LT Std Bd" panose="020F0804030503020204"/>
+            </a:endParaRPr>
+          </a:p>
+          <a:p>
+            <a:pPr lvl="0" algn="l"/>
+            <a:r>
+              <a:rPr lang="sv-SE" altLang="sv-SE" sz="2800" dirty="0">
+                <a:latin typeface="HelveticaRounded LT Std Bd" panose="020F0804030503020204"/>
+              </a:rPr>
+              <a:t> </a:t>
+            </a:r>
+            <a:endParaRPr lang="en-US" sz="2800" dirty="0">
+              <a:latin typeface="HelveticaRounded LT Std Bd" panose="020F0804030503020204"/>
+            </a:endParaRPr>
+          </a:p>
+          <a:p>
+            <a:pPr algn="l"/>
+            <a:r>
+              <a:rPr lang="en-US" sz="2800" dirty="0">
+                <a:latin typeface="HelveticaRounded LT Std Bd" panose="020F0804030503020204"/>
+              </a:rPr>
+              <a:t>Twitter: @</a:t>
+            </a:r>
+            <a:r>
+              <a:rPr lang="en-US" sz="2800" dirty="0" err="1">
+                <a:latin typeface="HelveticaRounded LT Std Bd" panose="020F0804030503020204"/>
+              </a:rPr>
+              <a:t>stellanlindell</a:t>
+            </a:r>
+            <a:endParaRPr lang="en-US" sz="2800" dirty="0">
+              <a:latin typeface="HelveticaRounded LT Std Bd" panose="020F0804030503020204"/>
+            </a:endParaRPr>
+          </a:p>
+          <a:p>
+            <a:pPr algn="l"/>
+            <a:endParaRPr lang="en-US" sz="2800" dirty="0">
+              <a:latin typeface="HelveticaRounded LT Std Bd" panose="020F0804030503020204"/>
+            </a:endParaRPr>
+          </a:p>
+          <a:p>
+            <a:pPr algn="l"/>
+            <a:r>
+              <a:rPr lang="en-US" sz="2800" dirty="0">
+                <a:latin typeface="HelveticaRounded LT Std Bd" panose="020F0804030503020204"/>
+              </a:rPr>
+              <a:t>GitHub: </a:t>
+            </a:r>
+            <a:r>
+              <a:rPr lang="en-US" sz="2800" dirty="0">
+                <a:latin typeface="HelveticaRounded LT Std Bd" panose="020F0804030503020204"/>
+                <a:hlinkClick r:id="rId5"/>
+              </a:rPr>
+              <a:t>https://github.com/stiltet</a:t>
+            </a:r>
+            <a:r>
+              <a:rPr lang="en-US" sz="2800" dirty="0">
+                <a:latin typeface="HelveticaRounded LT Std Bd" panose="020F0804030503020204"/>
+              </a:rPr>
+              <a:t> </a:t>
+            </a:r>
+          </a:p>
+          <a:p>
+            <a:pPr algn="l"/>
+            <a:endParaRPr lang="en-US" sz="2800" dirty="0">
+              <a:latin typeface="HelveticaRounded LT Std Bd" panose="020F0804030503020204"/>
+            </a:endParaRPr>
+          </a:p>
+          <a:p>
+            <a:pPr algn="l"/>
+            <a:r>
+              <a:rPr lang="en-US" sz="2800" dirty="0" err="1">
+                <a:latin typeface="HelveticaRounded LT Std Bd" panose="020F0804030503020204"/>
+              </a:rPr>
+              <a:t>Länk</a:t>
+            </a:r>
+            <a:r>
+              <a:rPr lang="en-US" sz="2800" dirty="0">
+                <a:latin typeface="HelveticaRounded LT Std Bd" panose="020F0804030503020204"/>
+              </a:rPr>
+              <a:t> till DEMO: </a:t>
+            </a:r>
+            <a:r>
+              <a:rPr lang="sv-SE" sz="2800" dirty="0">
+                <a:latin typeface="HelveticaRounded LT Std Bd" panose="020F0804030503020204"/>
+                <a:hlinkClick r:id="rId6"/>
+              </a:rPr>
+              <a:t>http://tinyurl.com/swetugg-sass</a:t>
+            </a:r>
+            <a:r>
+              <a:rPr lang="sv-SE" sz="2800" dirty="0">
+                <a:latin typeface="HelveticaRounded LT Std Bd" panose="020F0804030503020204"/>
+              </a:rPr>
+              <a:t> </a:t>
+            </a:r>
+            <a:endParaRPr lang="en-US" sz="2800" dirty="0">
+              <a:latin typeface="HelveticaRounded LT Std Bd" panose="020F0804030503020204"/>
+            </a:endParaRPr>
+          </a:p>
+        </p:txBody>
+      </p:sp>
       <p:sp>
         <p:nvSpPr>
           <p:cNvPr id="10" name="Rubrik 1"/>
@@ -7372,8 +6769,8 @@
         </p:nvSpPr>
         <p:spPr>
           <a:xfrm>
-            <a:off x="2490281" y="865960"/>
-            <a:ext cx="3810689" cy="685838"/>
+            <a:off x="2905327" y="658155"/>
+            <a:ext cx="6096001" cy="820600"/>
           </a:xfrm>
           <a:prstGeom prst="rect">
             <a:avLst/>
@@ -7381,7 +6778,7 @@
         </p:spPr>
         <p:txBody>
           <a:bodyPr vert="horz" lIns="91440" tIns="45720" rIns="91440" bIns="45720" rtlCol="0" anchor="b">
-            <a:normAutofit/>
+            <a:noAutofit/>
           </a:bodyPr>
           <a:lstStyle>
             <a:lvl1pPr algn="ctr" defTabSz="914400" rtl="0" eaLnBrk="1" latinLnBrk="0" hangingPunct="1">
@@ -7404,10 +6801,7 @@
           </a:lstStyle>
           <a:p>
             <a:r>
-              <a:rPr lang="en-US" sz="4200" b="1" dirty="0">
-                <a:solidFill>
-                  <a:srgbClr val="CD6329"/>
-                </a:solidFill>
+              <a:rPr lang="en-US" b="1" cap="small" dirty="0">
                 <a:latin typeface="Arial" panose="020B0604020202020204" pitchFamily="34" charset="0"/>
                 <a:cs typeface="Arial" panose="020B0604020202020204" pitchFamily="34" charset="0"/>
               </a:rPr>
@@ -7426,13 +6820,13 @@
   <p:clrMapOvr>
     <a:masterClrMapping/>
   </p:clrMapOvr>
-  <mc:AlternateContent xmlns:mc="http://schemas.openxmlformats.org/markup-compatibility/2006">
-    <mc:Choice xmlns:p14="http://schemas.microsoft.com/office/powerpoint/2010/main" Requires="p14">
+  <mc:AlternateContent xmlns:mc="http://schemas.openxmlformats.org/markup-compatibility/2006" xmlns:p14="http://schemas.microsoft.com/office/powerpoint/2010/main">
+    <mc:Choice Requires="p14">
       <p:transition spd="slow" p14:dur="1500">
         <p:push dir="u"/>
       </p:transition>
     </mc:Choice>
-    <mc:Fallback>
+    <mc:Fallback xmlns="">
       <p:transition spd="slow">
         <p:push dir="u"/>
       </p:transition>
@@ -7468,8 +6862,8 @@
         </p:nvSpPr>
         <p:spPr>
           <a:xfrm>
-            <a:off x="1344891" y="763960"/>
-            <a:ext cx="9502219" cy="1325563"/>
+            <a:off x="2178709" y="227414"/>
+            <a:ext cx="7838660" cy="1270880"/>
           </a:xfrm>
           <a:prstGeom prst="rect">
             <a:avLst/>
@@ -7477,7 +6871,7 @@
         </p:spPr>
         <p:txBody>
           <a:bodyPr vert="horz" lIns="91440" tIns="45720" rIns="91440" bIns="45720" rtlCol="0" anchor="b">
-            <a:normAutofit fontScale="85000" lnSpcReduction="20000"/>
+            <a:noAutofit/>
           </a:bodyPr>
           <a:lstStyle>
             <a:lvl1pPr algn="ctr" defTabSz="914400" rtl="0" eaLnBrk="1" latinLnBrk="0" hangingPunct="1">
@@ -7500,24 +6894,187 @@
           </a:lstStyle>
           <a:p>
             <a:r>
-              <a:rPr lang="en-US" dirty="0">
+              <a:rPr lang="en-US" sz="4400" dirty="0">
                 <a:latin typeface="HelveticaRounded LT Std Bd" panose="020F0804030503020204" pitchFamily="34" charset="0"/>
               </a:rPr>
-              <a:t>Anybody who doesn’t understand Swedish?</a:t>
+              <a:t>Pre-processing languages for dynamic stylesheets</a:t>
+            </a:r>
+          </a:p>
+        </p:txBody>
+      </p:sp>
+      <p:grpSp>
+        <p:nvGrpSpPr>
+          <p:cNvPr id="4" name="Grupp 3"/>
+          <p:cNvGrpSpPr/>
+          <p:nvPr>
+            <p:custDataLst>
+              <p:custData r:id="rId1"/>
+            </p:custDataLst>
+          </p:nvPr>
+        </p:nvGrpSpPr>
+        <p:grpSpPr>
+          <a:xfrm>
+            <a:off x="3395956" y="4899778"/>
+            <a:ext cx="5404167" cy="1657022"/>
+            <a:chOff x="3249884" y="4883015"/>
+            <a:chExt cx="6096001" cy="1869152"/>
+          </a:xfrm>
+        </p:grpSpPr>
+        <p:pic>
+          <p:nvPicPr>
+            <p:cNvPr id="10" name="Bildobjekt 9"/>
+            <p:cNvPicPr>
+              <a:picLocks noChangeAspect="1"/>
+            </p:cNvPicPr>
+            <p:nvPr/>
+          </p:nvPicPr>
+          <p:blipFill>
+            <a:blip r:embed="rId3" cstate="print">
+              <a:extLst>
+                <a:ext uri="{28A0092B-C50C-407E-A947-70E740481C1C}">
+                  <a14:useLocalDpi xmlns:a14="http://schemas.microsoft.com/office/drawing/2010/main" val="0"/>
+                </a:ext>
+              </a:extLst>
+            </a:blip>
+            <a:stretch>
+              <a:fillRect/>
+            </a:stretch>
+          </p:blipFill>
+          <p:spPr>
+            <a:xfrm>
+              <a:off x="3483781" y="5703615"/>
+              <a:ext cx="5628208" cy="1048552"/>
+            </a:xfrm>
+            <a:prstGeom prst="rect">
+              <a:avLst/>
+            </a:prstGeom>
+          </p:spPr>
+        </p:pic>
+        <p:sp>
+          <p:nvSpPr>
+            <p:cNvPr id="13" name="Rubrik 1"/>
+            <p:cNvSpPr txBox="1">
+              <a:spLocks/>
+            </p:cNvSpPr>
+            <p:nvPr/>
+          </p:nvSpPr>
+          <p:spPr>
+            <a:xfrm>
+              <a:off x="3249884" y="4883015"/>
+              <a:ext cx="6096001" cy="820600"/>
+            </a:xfrm>
+            <a:prstGeom prst="rect">
+              <a:avLst/>
+            </a:prstGeom>
+          </p:spPr>
+          <p:txBody>
+            <a:bodyPr vert="horz" lIns="91440" tIns="45720" rIns="91440" bIns="45720" rtlCol="0" anchor="b">
+              <a:noAutofit/>
+            </a:bodyPr>
+            <a:lstStyle>
+              <a:lvl1pPr algn="ctr" defTabSz="914400" rtl="0" eaLnBrk="1" latinLnBrk="0" hangingPunct="1">
+                <a:lnSpc>
+                  <a:spcPct val="90000"/>
+                </a:lnSpc>
+                <a:spcBef>
+                  <a:spcPct val="0"/>
+                </a:spcBef>
+                <a:buNone/>
+                <a:defRPr sz="6000" kern="1200">
+                  <a:solidFill>
+                    <a:schemeClr val="tx1"/>
+                  </a:solidFill>
+                  <a:latin typeface="+mj-lt"/>
+                  <a:ea typeface="+mj-ea"/>
+                  <a:cs typeface="+mj-cs"/>
+                </a:defRPr>
+              </a:lvl1pPr>
+            </a:lstStyle>
+            <a:p>
+              <a:r>
+                <a:rPr lang="en-US" sz="5400" b="1" cap="small" dirty="0">
+                  <a:latin typeface="Arial" panose="020B0604020202020204" pitchFamily="34" charset="0"/>
+                  <a:cs typeface="Arial" panose="020B0604020202020204" pitchFamily="34" charset="0"/>
+                </a:rPr>
+                <a:t>Stellan Lindell</a:t>
+              </a:r>
+            </a:p>
+          </p:txBody>
+        </p:sp>
+      </p:grpSp>
+      <p:sp>
+        <p:nvSpPr>
+          <p:cNvPr id="15" name="Rubrik 1"/>
+          <p:cNvSpPr>
+            <a:spLocks noGrp="1"/>
+          </p:cNvSpPr>
+          <p:nvPr>
+            <p:ph type="ctrTitle"/>
+          </p:nvPr>
+        </p:nvSpPr>
+        <p:spPr>
+          <a:xfrm>
+            <a:off x="5712998" y="3377083"/>
+            <a:ext cx="779253" cy="884341"/>
+          </a:xfrm>
+        </p:spPr>
+        <p:txBody>
+          <a:bodyPr anchor="b">
+            <a:normAutofit fontScale="90000"/>
+          </a:bodyPr>
+          <a:lstStyle/>
+          <a:p>
+            <a:r>
+              <a:rPr lang="sv-SE" sz="7200" dirty="0">
+                <a:latin typeface="HelveticaRounded LT Std Bd" panose="020F0804030503020204" pitchFamily="34" charset="0"/>
+              </a:rPr>
+              <a:t>&amp;</a:t>
+            </a:r>
+          </a:p>
+        </p:txBody>
+      </p:sp>
+      <p:sp>
+        <p:nvSpPr>
+          <p:cNvPr id="16" name="Underrubrik 2"/>
+          <p:cNvSpPr>
+            <a:spLocks noGrp="1"/>
+          </p:cNvSpPr>
+          <p:nvPr>
+            <p:ph type="subTitle" idx="1"/>
+          </p:nvPr>
+        </p:nvSpPr>
+        <p:spPr>
+          <a:xfrm>
+            <a:off x="2288348" y="4209929"/>
+            <a:ext cx="3027090" cy="413683"/>
+          </a:xfrm>
+        </p:spPr>
+        <p:txBody>
+          <a:bodyPr anchor="b">
+            <a:normAutofit/>
+          </a:bodyPr>
+          <a:lstStyle/>
+          <a:p>
+            <a:r>
+              <a:rPr lang="en-US" sz="2200" dirty="0">
+                <a:latin typeface="Helvetica World" panose="020B0500040000020004" pitchFamily="34" charset="0"/>
+                <a:cs typeface="Helvetica World" panose="020B0500040000020004" pitchFamily="34" charset="0"/>
+              </a:rPr>
+              <a:t>LESS is more</a:t>
             </a:r>
           </a:p>
         </p:txBody>
       </p:sp>
       <p:pic>
         <p:nvPicPr>
-          <p:cNvPr id="11" name="Bildobjekt 10"/>
+          <p:cNvPr id="17" name="Bildobjekt 16"/>
           <p:cNvPicPr>
             <a:picLocks noChangeAspect="1"/>
           </p:cNvPicPr>
           <p:nvPr/>
         </p:nvPicPr>
         <p:blipFill>
-          <a:blip r:embed="rId2">
+          <a:blip r:embed="rId4" cstate="print">
             <a:extLst>
               <a:ext uri="{28A0092B-C50C-407E-A947-70E740481C1C}">
                 <a14:useLocalDpi xmlns:a14="http://schemas.microsoft.com/office/drawing/2010/main" val="0"/>
@@ -7530,36 +7087,626 @@
         </p:blipFill>
         <p:spPr>
           <a:xfrm>
-            <a:off x="3804267" y="2924174"/>
-            <a:ext cx="4583467" cy="2867025"/>
+            <a:off x="6896437" y="1774460"/>
+            <a:ext cx="3032306" cy="2274229"/>
           </a:xfrm>
           <a:prstGeom prst="rect">
             <a:avLst/>
           </a:prstGeom>
         </p:spPr>
       </p:pic>
+      <p:pic>
+        <p:nvPicPr>
+          <p:cNvPr id="18" name="Bildobjekt 17"/>
+          <p:cNvPicPr>
+            <a:picLocks noChangeAspect="1"/>
+          </p:cNvPicPr>
+          <p:nvPr/>
+        </p:nvPicPr>
+        <p:blipFill>
+          <a:blip r:embed="rId5" cstate="print">
+            <a:extLst>
+              <a:ext uri="{28A0092B-C50C-407E-A947-70E740481C1C}">
+                <a14:useLocalDpi xmlns:a14="http://schemas.microsoft.com/office/drawing/2010/main" val="0"/>
+              </a:ext>
+            </a:extLst>
+          </a:blip>
+          <a:stretch>
+            <a:fillRect/>
+          </a:stretch>
+        </p:blipFill>
+        <p:spPr>
+          <a:xfrm>
+            <a:off x="2308226" y="2696340"/>
+            <a:ext cx="3027090" cy="1351596"/>
+          </a:xfrm>
+          <a:prstGeom prst="rect">
+            <a:avLst/>
+          </a:prstGeom>
+        </p:spPr>
+      </p:pic>
+      <p:sp>
+        <p:nvSpPr>
+          <p:cNvPr id="19" name="Underrubrik 2"/>
+          <p:cNvSpPr txBox="1">
+            <a:spLocks/>
+          </p:cNvSpPr>
+          <p:nvPr/>
+        </p:nvSpPr>
+        <p:spPr>
+          <a:xfrm>
+            <a:off x="6896437" y="4209929"/>
+            <a:ext cx="3032306" cy="413683"/>
+          </a:xfrm>
+          <a:prstGeom prst="rect">
+            <a:avLst/>
+          </a:prstGeom>
+        </p:spPr>
+        <p:txBody>
+          <a:bodyPr vert="horz" lIns="91440" tIns="45720" rIns="91440" bIns="45720" rtlCol="0" anchor="b">
+            <a:normAutofit fontScale="92500"/>
+          </a:bodyPr>
+          <a:lstStyle>
+            <a:lvl1pPr marL="0" indent="0" algn="ctr" defTabSz="914400" rtl="0" eaLnBrk="1" latinLnBrk="0" hangingPunct="1">
+              <a:lnSpc>
+                <a:spcPct val="90000"/>
+              </a:lnSpc>
+              <a:spcBef>
+                <a:spcPts val="1000"/>
+              </a:spcBef>
+              <a:buFont typeface="Arial" panose="020B0604020202020204" pitchFamily="34" charset="0"/>
+              <a:buNone/>
+              <a:defRPr sz="2400" kern="1200">
+                <a:solidFill>
+                  <a:schemeClr val="tx1"/>
+                </a:solidFill>
+                <a:latin typeface="+mn-lt"/>
+                <a:ea typeface="+mn-ea"/>
+                <a:cs typeface="+mn-cs"/>
+              </a:defRPr>
+            </a:lvl1pPr>
+            <a:lvl2pPr marL="457200" indent="0" algn="ctr" defTabSz="914400" rtl="0" eaLnBrk="1" latinLnBrk="0" hangingPunct="1">
+              <a:lnSpc>
+                <a:spcPct val="90000"/>
+              </a:lnSpc>
+              <a:spcBef>
+                <a:spcPts val="500"/>
+              </a:spcBef>
+              <a:buFont typeface="Arial" panose="020B0604020202020204" pitchFamily="34" charset="0"/>
+              <a:buNone/>
+              <a:defRPr sz="2000" kern="1200">
+                <a:solidFill>
+                  <a:schemeClr val="tx1"/>
+                </a:solidFill>
+                <a:latin typeface="+mn-lt"/>
+                <a:ea typeface="+mn-ea"/>
+                <a:cs typeface="+mn-cs"/>
+              </a:defRPr>
+            </a:lvl2pPr>
+            <a:lvl3pPr marL="914400" indent="0" algn="ctr" defTabSz="914400" rtl="0" eaLnBrk="1" latinLnBrk="0" hangingPunct="1">
+              <a:lnSpc>
+                <a:spcPct val="90000"/>
+              </a:lnSpc>
+              <a:spcBef>
+                <a:spcPts val="500"/>
+              </a:spcBef>
+              <a:buFont typeface="Arial" panose="020B0604020202020204" pitchFamily="34" charset="0"/>
+              <a:buNone/>
+              <a:defRPr sz="1800" kern="1200">
+                <a:solidFill>
+                  <a:schemeClr val="tx1"/>
+                </a:solidFill>
+                <a:latin typeface="+mn-lt"/>
+                <a:ea typeface="+mn-ea"/>
+                <a:cs typeface="+mn-cs"/>
+              </a:defRPr>
+            </a:lvl3pPr>
+            <a:lvl4pPr marL="1371600" indent="0" algn="ctr" defTabSz="914400" rtl="0" eaLnBrk="1" latinLnBrk="0" hangingPunct="1">
+              <a:lnSpc>
+                <a:spcPct val="90000"/>
+              </a:lnSpc>
+              <a:spcBef>
+                <a:spcPts val="500"/>
+              </a:spcBef>
+              <a:buFont typeface="Arial" panose="020B0604020202020204" pitchFamily="34" charset="0"/>
+              <a:buNone/>
+              <a:defRPr sz="1600" kern="1200">
+                <a:solidFill>
+                  <a:schemeClr val="tx1"/>
+                </a:solidFill>
+                <a:latin typeface="+mn-lt"/>
+                <a:ea typeface="+mn-ea"/>
+                <a:cs typeface="+mn-cs"/>
+              </a:defRPr>
+            </a:lvl4pPr>
+            <a:lvl5pPr marL="1828800" indent="0" algn="ctr" defTabSz="914400" rtl="0" eaLnBrk="1" latinLnBrk="0" hangingPunct="1">
+              <a:lnSpc>
+                <a:spcPct val="90000"/>
+              </a:lnSpc>
+              <a:spcBef>
+                <a:spcPts val="500"/>
+              </a:spcBef>
+              <a:buFont typeface="Arial" panose="020B0604020202020204" pitchFamily="34" charset="0"/>
+              <a:buNone/>
+              <a:defRPr sz="1600" kern="1200">
+                <a:solidFill>
+                  <a:schemeClr val="tx1"/>
+                </a:solidFill>
+                <a:latin typeface="+mn-lt"/>
+                <a:ea typeface="+mn-ea"/>
+                <a:cs typeface="+mn-cs"/>
+              </a:defRPr>
+            </a:lvl5pPr>
+            <a:lvl6pPr marL="2286000" indent="0" algn="ctr" defTabSz="914400" rtl="0" eaLnBrk="1" latinLnBrk="0" hangingPunct="1">
+              <a:lnSpc>
+                <a:spcPct val="90000"/>
+              </a:lnSpc>
+              <a:spcBef>
+                <a:spcPts val="500"/>
+              </a:spcBef>
+              <a:buFont typeface="Arial" panose="020B0604020202020204" pitchFamily="34" charset="0"/>
+              <a:buNone/>
+              <a:defRPr sz="1600" kern="1200">
+                <a:solidFill>
+                  <a:schemeClr val="tx1"/>
+                </a:solidFill>
+                <a:latin typeface="+mn-lt"/>
+                <a:ea typeface="+mn-ea"/>
+                <a:cs typeface="+mn-cs"/>
+              </a:defRPr>
+            </a:lvl6pPr>
+            <a:lvl7pPr marL="2743200" indent="0" algn="ctr" defTabSz="914400" rtl="0" eaLnBrk="1" latinLnBrk="0" hangingPunct="1">
+              <a:lnSpc>
+                <a:spcPct val="90000"/>
+              </a:lnSpc>
+              <a:spcBef>
+                <a:spcPts val="500"/>
+              </a:spcBef>
+              <a:buFont typeface="Arial" panose="020B0604020202020204" pitchFamily="34" charset="0"/>
+              <a:buNone/>
+              <a:defRPr sz="1600" kern="1200">
+                <a:solidFill>
+                  <a:schemeClr val="tx1"/>
+                </a:solidFill>
+                <a:latin typeface="+mn-lt"/>
+                <a:ea typeface="+mn-ea"/>
+                <a:cs typeface="+mn-cs"/>
+              </a:defRPr>
+            </a:lvl7pPr>
+            <a:lvl8pPr marL="3200400" indent="0" algn="ctr" defTabSz="914400" rtl="0" eaLnBrk="1" latinLnBrk="0" hangingPunct="1">
+              <a:lnSpc>
+                <a:spcPct val="90000"/>
+              </a:lnSpc>
+              <a:spcBef>
+                <a:spcPts val="500"/>
+              </a:spcBef>
+              <a:buFont typeface="Arial" panose="020B0604020202020204" pitchFamily="34" charset="0"/>
+              <a:buNone/>
+              <a:defRPr sz="1600" kern="1200">
+                <a:solidFill>
+                  <a:schemeClr val="tx1"/>
+                </a:solidFill>
+                <a:latin typeface="+mn-lt"/>
+                <a:ea typeface="+mn-ea"/>
+                <a:cs typeface="+mn-cs"/>
+              </a:defRPr>
+            </a:lvl8pPr>
+            <a:lvl9pPr marL="3657600" indent="0" algn="ctr" defTabSz="914400" rtl="0" eaLnBrk="1" latinLnBrk="0" hangingPunct="1">
+              <a:lnSpc>
+                <a:spcPct val="90000"/>
+              </a:lnSpc>
+              <a:spcBef>
+                <a:spcPts val="500"/>
+              </a:spcBef>
+              <a:buFont typeface="Arial" panose="020B0604020202020204" pitchFamily="34" charset="0"/>
+              <a:buNone/>
+              <a:defRPr sz="1600" kern="1200">
+                <a:solidFill>
+                  <a:schemeClr val="tx1"/>
+                </a:solidFill>
+                <a:latin typeface="+mn-lt"/>
+                <a:ea typeface="+mn-ea"/>
+                <a:cs typeface="+mn-cs"/>
+              </a:defRPr>
+            </a:lvl9pPr>
+          </a:lstStyle>
+          <a:p>
+            <a:r>
+              <a:rPr lang="en-US" dirty="0">
+                <a:latin typeface="Helvetica World" panose="020B0500040000020004" pitchFamily="34" charset="0"/>
+                <a:cs typeface="Helvetica World" panose="020B0500040000020004" pitchFamily="34" charset="0"/>
+              </a:rPr>
+              <a:t>CSS with superpowers</a:t>
+            </a:r>
+          </a:p>
+        </p:txBody>
+      </p:sp>
     </p:spTree>
     <p:extLst>
       <p:ext uri="{BB962C8B-B14F-4D97-AF65-F5344CB8AC3E}">
-        <p14:creationId xmlns:p14="http://schemas.microsoft.com/office/powerpoint/2010/main" val="568533035"/>
+        <p14:creationId xmlns:p14="http://schemas.microsoft.com/office/powerpoint/2010/main" val="1095336902"/>
       </p:ext>
     </p:extLst>
   </p:cSld>
   <p:clrMapOvr>
     <a:masterClrMapping/>
   </p:clrMapOvr>
-  <mc:AlternateContent xmlns:mc="http://schemas.openxmlformats.org/markup-compatibility/2006">
-    <mc:Choice xmlns:p14="http://schemas.microsoft.com/office/powerpoint/2010/main" Requires="p14">
+  <mc:AlternateContent xmlns:mc="http://schemas.openxmlformats.org/markup-compatibility/2006" xmlns:p14="http://schemas.microsoft.com/office/powerpoint/2010/main">
+    <mc:Choice Requires="p14">
       <p:transition spd="slow" p14:dur="1500">
         <p:push dir="u"/>
       </p:transition>
     </mc:Choice>
-    <mc:Fallback>
+    <mc:Fallback xmlns="">
       <p:transition spd="slow">
         <p:push dir="u"/>
       </p:transition>
     </mc:Fallback>
   </mc:AlternateContent>
+  <p:timing>
+    <p:tnLst>
+      <p:par>
+        <p:cTn id="1" dur="indefinite" restart="never" nodeType="tmRoot">
+          <p:childTnLst>
+            <p:seq concurrent="1" nextAc="seek">
+              <p:cTn id="2" dur="indefinite" nodeType="mainSeq">
+                <p:childTnLst>
+                  <p:par>
+                    <p:cTn id="3" fill="hold">
+                      <p:stCondLst>
+                        <p:cond delay="indefinite"/>
+                        <p:cond evt="onBegin" delay="0">
+                          <p:tn val="2"/>
+                        </p:cond>
+                      </p:stCondLst>
+                      <p:childTnLst>
+                        <p:par>
+                          <p:cTn id="4" fill="hold">
+                            <p:stCondLst>
+                              <p:cond delay="0"/>
+                            </p:stCondLst>
+                            <p:childTnLst>
+                              <p:par>
+                                <p:cTn id="5" presetID="10" presetClass="entr" presetSubtype="0" fill="hold" nodeType="afterEffect">
+                                  <p:stCondLst>
+                                    <p:cond delay="0"/>
+                                  </p:stCondLst>
+                                  <p:childTnLst>
+                                    <p:set>
+                                      <p:cBhvr>
+                                        <p:cTn id="6" dur="1" fill="hold">
+                                          <p:stCondLst>
+                                            <p:cond delay="0"/>
+                                          </p:stCondLst>
+                                        </p:cTn>
+                                        <p:tgtEl>
+                                          <p:spTgt spid="4"/>
+                                        </p:tgtEl>
+                                        <p:attrNameLst>
+                                          <p:attrName>style.visibility</p:attrName>
+                                        </p:attrNameLst>
+                                      </p:cBhvr>
+                                      <p:to>
+                                        <p:strVal val="visible"/>
+                                      </p:to>
+                                    </p:set>
+                                    <p:animEffect transition="in" filter="fade">
+                                      <p:cBhvr>
+                                        <p:cTn id="7" dur="1000"/>
+                                        <p:tgtEl>
+                                          <p:spTgt spid="4"/>
+                                        </p:tgtEl>
+                                      </p:cBhvr>
+                                    </p:animEffect>
+                                  </p:childTnLst>
+                                </p:cTn>
+                              </p:par>
+                            </p:childTnLst>
+                          </p:cTn>
+                        </p:par>
+                      </p:childTnLst>
+                    </p:cTn>
+                  </p:par>
+                  <p:par>
+                    <p:cTn id="8" fill="hold">
+                      <p:stCondLst>
+                        <p:cond delay="indefinite"/>
+                      </p:stCondLst>
+                      <p:childTnLst>
+                        <p:par>
+                          <p:cTn id="9" fill="hold">
+                            <p:stCondLst>
+                              <p:cond delay="0"/>
+                            </p:stCondLst>
+                            <p:childTnLst>
+                              <p:par>
+                                <p:cTn id="10" presetID="10" presetClass="entr" presetSubtype="0" fill="hold" grpId="0" nodeType="clickEffect">
+                                  <p:stCondLst>
+                                    <p:cond delay="0"/>
+                                  </p:stCondLst>
+                                  <p:childTnLst>
+                                    <p:set>
+                                      <p:cBhvr>
+                                        <p:cTn id="11" dur="1" fill="hold">
+                                          <p:stCondLst>
+                                            <p:cond delay="0"/>
+                                          </p:stCondLst>
+                                        </p:cTn>
+                                        <p:tgtEl>
+                                          <p:spTgt spid="9"/>
+                                        </p:tgtEl>
+                                        <p:attrNameLst>
+                                          <p:attrName>style.visibility</p:attrName>
+                                        </p:attrNameLst>
+                                      </p:cBhvr>
+                                      <p:to>
+                                        <p:strVal val="visible"/>
+                                      </p:to>
+                                    </p:set>
+                                    <p:animEffect transition="in" filter="fade">
+                                      <p:cBhvr>
+                                        <p:cTn id="12" dur="1000"/>
+                                        <p:tgtEl>
+                                          <p:spTgt spid="9"/>
+                                        </p:tgtEl>
+                                      </p:cBhvr>
+                                    </p:animEffect>
+                                  </p:childTnLst>
+                                </p:cTn>
+                              </p:par>
+                            </p:childTnLst>
+                          </p:cTn>
+                        </p:par>
+                      </p:childTnLst>
+                    </p:cTn>
+                  </p:par>
+                  <p:par>
+                    <p:cTn id="13" fill="hold">
+                      <p:stCondLst>
+                        <p:cond delay="indefinite"/>
+                      </p:stCondLst>
+                      <p:childTnLst>
+                        <p:par>
+                          <p:cTn id="14" fill="hold">
+                            <p:stCondLst>
+                              <p:cond delay="0"/>
+                            </p:stCondLst>
+                            <p:childTnLst>
+                              <p:par>
+                                <p:cTn id="15" presetID="10" presetClass="entr" presetSubtype="0" fill="hold" nodeType="clickEffect">
+                                  <p:stCondLst>
+                                    <p:cond delay="0"/>
+                                  </p:stCondLst>
+                                  <p:childTnLst>
+                                    <p:set>
+                                      <p:cBhvr>
+                                        <p:cTn id="16" dur="1" fill="hold">
+                                          <p:stCondLst>
+                                            <p:cond delay="0"/>
+                                          </p:stCondLst>
+                                        </p:cTn>
+                                        <p:tgtEl>
+                                          <p:spTgt spid="18"/>
+                                        </p:tgtEl>
+                                        <p:attrNameLst>
+                                          <p:attrName>style.visibility</p:attrName>
+                                        </p:attrNameLst>
+                                      </p:cBhvr>
+                                      <p:to>
+                                        <p:strVal val="visible"/>
+                                      </p:to>
+                                    </p:set>
+                                    <p:animEffect transition="in" filter="fade">
+                                      <p:cBhvr>
+                                        <p:cTn id="17" dur="1000"/>
+                                        <p:tgtEl>
+                                          <p:spTgt spid="18"/>
+                                        </p:tgtEl>
+                                      </p:cBhvr>
+                                    </p:animEffect>
+                                  </p:childTnLst>
+                                </p:cTn>
+                              </p:par>
+                              <p:par>
+                                <p:cTn id="18" presetID="10" presetClass="entr" presetSubtype="0" fill="hold" grpId="0" nodeType="withEffect">
+                                  <p:stCondLst>
+                                    <p:cond delay="0"/>
+                                  </p:stCondLst>
+                                  <p:childTnLst>
+                                    <p:set>
+                                      <p:cBhvr>
+                                        <p:cTn id="19" dur="1" fill="hold">
+                                          <p:stCondLst>
+                                            <p:cond delay="0"/>
+                                          </p:stCondLst>
+                                        </p:cTn>
+                                        <p:tgtEl>
+                                          <p:spTgt spid="16">
+                                            <p:txEl>
+                                              <p:pRg st="0" end="0"/>
+                                            </p:txEl>
+                                          </p:spTgt>
+                                        </p:tgtEl>
+                                        <p:attrNameLst>
+                                          <p:attrName>style.visibility</p:attrName>
+                                        </p:attrNameLst>
+                                      </p:cBhvr>
+                                      <p:to>
+                                        <p:strVal val="visible"/>
+                                      </p:to>
+                                    </p:set>
+                                    <p:animEffect transition="in" filter="fade">
+                                      <p:cBhvr>
+                                        <p:cTn id="20" dur="1000"/>
+                                        <p:tgtEl>
+                                          <p:spTgt spid="16">
+                                            <p:txEl>
+                                              <p:pRg st="0" end="0"/>
+                                            </p:txEl>
+                                          </p:spTgt>
+                                        </p:tgtEl>
+                                      </p:cBhvr>
+                                    </p:animEffect>
+                                  </p:childTnLst>
+                                </p:cTn>
+                              </p:par>
+                            </p:childTnLst>
+                          </p:cTn>
+                        </p:par>
+                        <p:par>
+                          <p:cTn id="21" fill="hold">
+                            <p:stCondLst>
+                              <p:cond delay="1000"/>
+                            </p:stCondLst>
+                            <p:childTnLst>
+                              <p:par>
+                                <p:cTn id="22" presetID="10" presetClass="entr" presetSubtype="0" fill="hold" grpId="0" nodeType="afterEffect">
+                                  <p:stCondLst>
+                                    <p:cond delay="0"/>
+                                  </p:stCondLst>
+                                  <p:childTnLst>
+                                    <p:set>
+                                      <p:cBhvr>
+                                        <p:cTn id="23" dur="1" fill="hold">
+                                          <p:stCondLst>
+                                            <p:cond delay="0"/>
+                                          </p:stCondLst>
+                                        </p:cTn>
+                                        <p:tgtEl>
+                                          <p:spTgt spid="15"/>
+                                        </p:tgtEl>
+                                        <p:attrNameLst>
+                                          <p:attrName>style.visibility</p:attrName>
+                                        </p:attrNameLst>
+                                      </p:cBhvr>
+                                      <p:to>
+                                        <p:strVal val="visible"/>
+                                      </p:to>
+                                    </p:set>
+                                    <p:animEffect transition="in" filter="fade">
+                                      <p:cBhvr>
+                                        <p:cTn id="24" dur="1000"/>
+                                        <p:tgtEl>
+                                          <p:spTgt spid="15"/>
+                                        </p:tgtEl>
+                                      </p:cBhvr>
+                                    </p:animEffect>
+                                  </p:childTnLst>
+                                </p:cTn>
+                              </p:par>
+                            </p:childTnLst>
+                          </p:cTn>
+                        </p:par>
+                        <p:par>
+                          <p:cTn id="25" fill="hold">
+                            <p:stCondLst>
+                              <p:cond delay="2000"/>
+                            </p:stCondLst>
+                            <p:childTnLst>
+                              <p:par>
+                                <p:cTn id="26" presetID="10" presetClass="entr" presetSubtype="0" fill="hold" nodeType="afterEffect">
+                                  <p:stCondLst>
+                                    <p:cond delay="0"/>
+                                  </p:stCondLst>
+                                  <p:childTnLst>
+                                    <p:set>
+                                      <p:cBhvr>
+                                        <p:cTn id="27" dur="1" fill="hold">
+                                          <p:stCondLst>
+                                            <p:cond delay="0"/>
+                                          </p:stCondLst>
+                                        </p:cTn>
+                                        <p:tgtEl>
+                                          <p:spTgt spid="17"/>
+                                        </p:tgtEl>
+                                        <p:attrNameLst>
+                                          <p:attrName>style.visibility</p:attrName>
+                                        </p:attrNameLst>
+                                      </p:cBhvr>
+                                      <p:to>
+                                        <p:strVal val="visible"/>
+                                      </p:to>
+                                    </p:set>
+                                    <p:animEffect transition="in" filter="fade">
+                                      <p:cBhvr>
+                                        <p:cTn id="28" dur="1000"/>
+                                        <p:tgtEl>
+                                          <p:spTgt spid="17"/>
+                                        </p:tgtEl>
+                                      </p:cBhvr>
+                                    </p:animEffect>
+                                  </p:childTnLst>
+                                </p:cTn>
+                              </p:par>
+                              <p:par>
+                                <p:cTn id="29" presetID="10" presetClass="entr" presetSubtype="0" fill="hold" grpId="0" nodeType="withEffect">
+                                  <p:stCondLst>
+                                    <p:cond delay="0"/>
+                                  </p:stCondLst>
+                                  <p:childTnLst>
+                                    <p:set>
+                                      <p:cBhvr>
+                                        <p:cTn id="30" dur="1" fill="hold">
+                                          <p:stCondLst>
+                                            <p:cond delay="0"/>
+                                          </p:stCondLst>
+                                        </p:cTn>
+                                        <p:tgtEl>
+                                          <p:spTgt spid="19"/>
+                                        </p:tgtEl>
+                                        <p:attrNameLst>
+                                          <p:attrName>style.visibility</p:attrName>
+                                        </p:attrNameLst>
+                                      </p:cBhvr>
+                                      <p:to>
+                                        <p:strVal val="visible"/>
+                                      </p:to>
+                                    </p:set>
+                                    <p:animEffect transition="in" filter="fade">
+                                      <p:cBhvr>
+                                        <p:cTn id="31" dur="1000"/>
+                                        <p:tgtEl>
+                                          <p:spTgt spid="19"/>
+                                        </p:tgtEl>
+                                      </p:cBhvr>
+                                    </p:animEffect>
+                                  </p:childTnLst>
+                                </p:cTn>
+                              </p:par>
+                            </p:childTnLst>
+                          </p:cTn>
+                        </p:par>
+                      </p:childTnLst>
+                    </p:cTn>
+                  </p:par>
+                </p:childTnLst>
+              </p:cTn>
+              <p:prevCondLst>
+                <p:cond evt="onPrev" delay="0">
+                  <p:tgtEl>
+                    <p:sldTgt/>
+                  </p:tgtEl>
+                </p:cond>
+              </p:prevCondLst>
+              <p:nextCondLst>
+                <p:cond evt="onNext" delay="0">
+                  <p:tgtEl>
+                    <p:sldTgt/>
+                  </p:tgtEl>
+                </p:cond>
+              </p:nextCondLst>
+            </p:seq>
+          </p:childTnLst>
+        </p:cTn>
+      </p:par>
+    </p:tnLst>
+    <p:bldLst>
+      <p:bldP spid="9" grpId="0"/>
+      <p:bldP spid="15" grpId="0"/>
+      <p:bldP spid="16" grpId="0" build="p"/>
+      <p:bldP spid="19" grpId="0"/>
+    </p:bldLst>
+  </p:timing>
 </p:sld>
 </file>
 
@@ -7617,7 +7764,7 @@
         <p:spPr/>
         <p:txBody>
           <a:bodyPr>
-            <a:normAutofit fontScale="92500" lnSpcReduction="10000"/>
+            <a:normAutofit fontScale="85000" lnSpcReduction="10000"/>
           </a:bodyPr>
           <a:lstStyle/>
           <a:p>
@@ -7757,13 +7904,13 @@
   <p:clrMapOvr>
     <a:masterClrMapping/>
   </p:clrMapOvr>
-  <mc:AlternateContent xmlns:mc="http://schemas.openxmlformats.org/markup-compatibility/2006">
-    <mc:Choice xmlns:p14="http://schemas.microsoft.com/office/powerpoint/2010/main" Requires="p14">
+  <mc:AlternateContent xmlns:mc="http://schemas.openxmlformats.org/markup-compatibility/2006" xmlns:p14="http://schemas.microsoft.com/office/powerpoint/2010/main">
+    <mc:Choice Requires="p14">
       <p:transition spd="slow" p14:dur="1500">
         <p:push dir="u"/>
       </p:transition>
     </mc:Choice>
-    <mc:Fallback>
+    <mc:Fallback xmlns="">
       <p:transition spd="slow">
         <p:push dir="u"/>
       </p:transition>
@@ -8669,11 +8816,18 @@
           </a:p>
           <a:p>
             <a:r>
+              <a:rPr lang="en-US" sz="2400" dirty="0" err="1">
+                <a:latin typeface="Helvetica World" panose="020B0500040000020004" pitchFamily="34" charset="0"/>
+                <a:cs typeface="Helvetica World" panose="020B0500040000020004" pitchFamily="34" charset="0"/>
+              </a:rPr>
+              <a:t>Mixins</a:t>
+            </a:r>
+            <a:r>
               <a:rPr lang="en-US" sz="2400" dirty="0">
                 <a:latin typeface="Helvetica World" panose="020B0500040000020004" pitchFamily="34" charset="0"/>
                 <a:cs typeface="Helvetica World" panose="020B0500040000020004" pitchFamily="34" charset="0"/>
               </a:rPr>
-              <a:t>Mixins (a class that contains functionality that can be included multiple times)</a:t>
+              <a:t> (similar to a function – should always be used to include functionality)</a:t>
             </a:r>
           </a:p>
           <a:p>
@@ -8700,7 +8854,7 @@
                 <a:latin typeface="Helvetica World" panose="020B0500040000020004" pitchFamily="34" charset="0"/>
                 <a:cs typeface="Helvetica World" panose="020B0500040000020004" pitchFamily="34" charset="0"/>
               </a:rPr>
-              <a:t>Functions (both own and language specific)</a:t>
+              <a:t>Functions (both own and language specific – should always return a value)</a:t>
             </a:r>
           </a:p>
           <a:p>
@@ -8733,13 +8887,13 @@
   <p:clrMapOvr>
     <a:masterClrMapping/>
   </p:clrMapOvr>
-  <mc:AlternateContent xmlns:mc="http://schemas.openxmlformats.org/markup-compatibility/2006">
-    <mc:Choice xmlns:p14="http://schemas.microsoft.com/office/powerpoint/2010/main" Requires="p14">
+  <mc:AlternateContent xmlns:mc="http://schemas.openxmlformats.org/markup-compatibility/2006" xmlns:p14="http://schemas.microsoft.com/office/powerpoint/2010/main">
+    <mc:Choice Requires="p14">
       <p:transition spd="slow" p14:dur="1500">
         <p:push dir="u"/>
       </p:transition>
     </mc:Choice>
-    <mc:Fallback>
+    <mc:Fallback xmlns="">
       <p:transition spd="slow">
         <p:push dir="u"/>
       </p:transition>
@@ -9846,13 +10000,13 @@
   <p:clrMapOvr>
     <a:masterClrMapping/>
   </p:clrMapOvr>
-  <mc:AlternateContent xmlns:mc="http://schemas.openxmlformats.org/markup-compatibility/2006">
-    <mc:Choice xmlns:p14="http://schemas.microsoft.com/office/powerpoint/2010/main" Requires="p14">
+  <mc:AlternateContent xmlns:mc="http://schemas.openxmlformats.org/markup-compatibility/2006" xmlns:p14="http://schemas.microsoft.com/office/powerpoint/2010/main">
+    <mc:Choice Requires="p14">
       <p:transition spd="slow" p14:dur="1500">
         <p:push dir="u"/>
       </p:transition>
     </mc:Choice>
-    <mc:Fallback>
+    <mc:Fallback xmlns="">
       <p:transition spd="slow">
         <p:push dir="u"/>
       </p:transition>
@@ -9908,7 +10062,7 @@
                                     </p:set>
                                     <p:animEffect transition="in" filter="fade">
                                       <p:cBhvr>
-                                        <p:cTn id="7" dur="500"/>
+                                        <p:cTn id="7" dur="1000"/>
                                         <p:tgtEl>
                                           <p:spTgt spid="3">
                                             <p:txEl>
@@ -9951,7 +10105,7 @@
                                     </p:set>
                                     <p:animEffect transition="in" filter="fade">
                                       <p:cBhvr>
-                                        <p:cTn id="10" dur="500"/>
+                                        <p:cTn id="10" dur="1000"/>
                                         <p:tgtEl>
                                           <p:spTgt spid="3">
                                             <p:txEl>
@@ -9994,7 +10148,7 @@
                                     </p:set>
                                     <p:animEffect transition="in" filter="fade">
                                       <p:cBhvr>
-                                        <p:cTn id="13" dur="500"/>
+                                        <p:cTn id="13" dur="1000"/>
                                         <p:tgtEl>
                                           <p:spTgt spid="3">
                                             <p:txEl>
@@ -10037,7 +10191,7 @@
                                     </p:set>
                                     <p:animEffect transition="in" filter="fade">
                                       <p:cBhvr>
-                                        <p:cTn id="16" dur="500"/>
+                                        <p:cTn id="16" dur="1000"/>
                                         <p:tgtEl>
                                           <p:spTgt spid="3">
                                             <p:txEl>
@@ -10080,7 +10234,7 @@
                                     </p:set>
                                     <p:animEffect transition="in" filter="fade">
                                       <p:cBhvr>
-                                        <p:cTn id="19" dur="500"/>
+                                        <p:cTn id="19" dur="1000"/>
                                         <p:tgtEl>
                                           <p:spTgt spid="3">
                                             <p:txEl>
@@ -10123,7 +10277,7 @@
                                     </p:set>
                                     <p:animEffect transition="in" filter="fade">
                                       <p:cBhvr>
-                                        <p:cTn id="22" dur="500"/>
+                                        <p:cTn id="22" dur="1000"/>
                                         <p:tgtEl>
                                           <p:spTgt spid="3">
                                             <p:txEl>
@@ -10166,7 +10320,7 @@
                                     </p:set>
                                     <p:animEffect transition="in" filter="fade">
                                       <p:cBhvr>
-                                        <p:cTn id="25" dur="500"/>
+                                        <p:cTn id="25" dur="1000"/>
                                         <p:tgtEl>
                                           <p:spTgt spid="3">
                                             <p:txEl>
@@ -10209,7 +10363,7 @@
                                     </p:set>
                                     <p:animEffect transition="in" filter="fade">
                                       <p:cBhvr>
-                                        <p:cTn id="28" dur="500"/>
+                                        <p:cTn id="28" dur="1000"/>
                                         <p:tgtEl>
                                           <p:spTgt spid="3">
                                             <p:txEl>
@@ -10252,7 +10406,7 @@
                                     </p:set>
                                     <p:animEffect transition="in" filter="fade">
                                       <p:cBhvr>
-                                        <p:cTn id="31" dur="500"/>
+                                        <p:cTn id="31" dur="1000"/>
                                         <p:tgtEl>
                                           <p:spTgt spid="3">
                                             <p:txEl>
@@ -10295,7 +10449,7 @@
                                     </p:set>
                                     <p:animEffect transition="in" filter="fade">
                                       <p:cBhvr>
-                                        <p:cTn id="34" dur="500"/>
+                                        <p:cTn id="34" dur="1000"/>
                                         <p:tgtEl>
                                           <p:spTgt spid="3">
                                             <p:txEl>
@@ -10338,7 +10492,7 @@
                                     </p:set>
                                     <p:animEffect transition="in" filter="fade">
                                       <p:cBhvr>
-                                        <p:cTn id="37" dur="500"/>
+                                        <p:cTn id="37" dur="1000"/>
                                         <p:tgtEl>
                                           <p:spTgt spid="3">
                                             <p:txEl>
@@ -10381,7 +10535,7 @@
                                     </p:set>
                                     <p:animEffect transition="in" filter="fade">
                                       <p:cBhvr>
-                                        <p:cTn id="40" dur="500"/>
+                                        <p:cTn id="40" dur="1000"/>
                                         <p:tgtEl>
                                           <p:spTgt spid="3">
                                             <p:txEl>
@@ -10424,7 +10578,7 @@
                                     </p:set>
                                     <p:animEffect transition="in" filter="fade">
                                       <p:cBhvr>
-                                        <p:cTn id="43" dur="500"/>
+                                        <p:cTn id="43" dur="1000"/>
                                         <p:tgtEl>
                                           <p:spTgt spid="3">
                                             <p:txEl>
@@ -10481,7 +10635,7 @@
                                     </p:set>
                                     <p:animEffect transition="in" filter="fade">
                                       <p:cBhvr>
-                                        <p:cTn id="48" dur="500"/>
+                                        <p:cTn id="48" dur="1000"/>
                                         <p:tgtEl>
                                           <p:spTgt spid="5"/>
                                         </p:tgtEl>
@@ -11251,13 +11405,13 @@
   <p:clrMapOvr>
     <a:masterClrMapping/>
   </p:clrMapOvr>
-  <mc:AlternateContent xmlns:mc="http://schemas.openxmlformats.org/markup-compatibility/2006">
-    <mc:Choice xmlns:p14="http://schemas.microsoft.com/office/powerpoint/2010/main" Requires="p14">
+  <mc:AlternateContent xmlns:mc="http://schemas.openxmlformats.org/markup-compatibility/2006" xmlns:p14="http://schemas.microsoft.com/office/powerpoint/2010/main">
+    <mc:Choice Requires="p14">
       <p:transition spd="slow" p14:dur="1500">
         <p:push dir="u"/>
       </p:transition>
     </mc:Choice>
-    <mc:Fallback>
+    <mc:Fallback xmlns="">
       <p:transition spd="slow">
         <p:push dir="u"/>
       </p:transition>
@@ -11313,7 +11467,7 @@
                                     </p:set>
                                     <p:animEffect transition="in" filter="fade">
                                       <p:cBhvr>
-                                        <p:cTn id="7" dur="500"/>
+                                        <p:cTn id="7" dur="1000"/>
                                         <p:tgtEl>
                                           <p:spTgt spid="3">
                                             <p:txEl>
@@ -11356,7 +11510,7 @@
                                     </p:set>
                                     <p:animEffect transition="in" filter="fade">
                                       <p:cBhvr>
-                                        <p:cTn id="10" dur="500"/>
+                                        <p:cTn id="10" dur="1000"/>
                                         <p:tgtEl>
                                           <p:spTgt spid="3">
                                             <p:txEl>
@@ -11399,7 +11553,7 @@
                                     </p:set>
                                     <p:animEffect transition="in" filter="fade">
                                       <p:cBhvr>
-                                        <p:cTn id="13" dur="500"/>
+                                        <p:cTn id="13" dur="1000"/>
                                         <p:tgtEl>
                                           <p:spTgt spid="3">
                                             <p:txEl>
@@ -11442,7 +11596,7 @@
                                     </p:set>
                                     <p:animEffect transition="in" filter="fade">
                                       <p:cBhvr>
-                                        <p:cTn id="16" dur="500"/>
+                                        <p:cTn id="16" dur="1000"/>
                                         <p:tgtEl>
                                           <p:spTgt spid="3">
                                             <p:txEl>
@@ -11485,7 +11639,7 @@
                                     </p:set>
                                     <p:animEffect transition="in" filter="fade">
                                       <p:cBhvr>
-                                        <p:cTn id="19" dur="500"/>
+                                        <p:cTn id="19" dur="1000"/>
                                         <p:tgtEl>
                                           <p:spTgt spid="3">
                                             <p:txEl>
@@ -11528,7 +11682,7 @@
                                     </p:set>
                                     <p:animEffect transition="in" filter="fade">
                                       <p:cBhvr>
-                                        <p:cTn id="22" dur="500"/>
+                                        <p:cTn id="22" dur="1000"/>
                                         <p:tgtEl>
                                           <p:spTgt spid="3">
                                             <p:txEl>
@@ -11571,7 +11725,7 @@
                                     </p:set>
                                     <p:animEffect transition="in" filter="fade">
                                       <p:cBhvr>
-                                        <p:cTn id="25" dur="500"/>
+                                        <p:cTn id="25" dur="1000"/>
                                         <p:tgtEl>
                                           <p:spTgt spid="3">
                                             <p:txEl>
@@ -11614,7 +11768,7 @@
                                     </p:set>
                                     <p:animEffect transition="in" filter="fade">
                                       <p:cBhvr>
-                                        <p:cTn id="28" dur="500"/>
+                                        <p:cTn id="28" dur="1000"/>
                                         <p:tgtEl>
                                           <p:spTgt spid="3">
                                             <p:txEl>
@@ -11657,7 +11811,7 @@
                                     </p:set>
                                     <p:animEffect transition="in" filter="fade">
                                       <p:cBhvr>
-                                        <p:cTn id="31" dur="500"/>
+                                        <p:cTn id="31" dur="1000"/>
                                         <p:tgtEl>
                                           <p:spTgt spid="3">
                                             <p:txEl>
@@ -11700,7 +11854,7 @@
                                     </p:set>
                                     <p:animEffect transition="in" filter="fade">
                                       <p:cBhvr>
-                                        <p:cTn id="34" dur="500"/>
+                                        <p:cTn id="34" dur="1000"/>
                                         <p:tgtEl>
                                           <p:spTgt spid="3">
                                             <p:txEl>
@@ -11743,7 +11897,7 @@
                                     </p:set>
                                     <p:animEffect transition="in" filter="fade">
                                       <p:cBhvr>
-                                        <p:cTn id="37" dur="500"/>
+                                        <p:cTn id="37" dur="1000"/>
                                         <p:tgtEl>
                                           <p:spTgt spid="3">
                                             <p:txEl>
@@ -11786,7 +11940,7 @@
                                     </p:set>
                                     <p:animEffect transition="in" filter="fade">
                                       <p:cBhvr>
-                                        <p:cTn id="40" dur="500"/>
+                                        <p:cTn id="40" dur="1000"/>
                                         <p:tgtEl>
                                           <p:spTgt spid="3">
                                             <p:txEl>
@@ -11829,7 +11983,7 @@
                                     </p:set>
                                     <p:animEffect transition="in" filter="fade">
                                       <p:cBhvr>
-                                        <p:cTn id="43" dur="500"/>
+                                        <p:cTn id="43" dur="1000"/>
                                         <p:tgtEl>
                                           <p:spTgt spid="3">
                                             <p:txEl>
@@ -11872,7 +12026,7 @@
                                     </p:set>
                                     <p:animEffect transition="in" filter="fade">
                                       <p:cBhvr>
-                                        <p:cTn id="46" dur="500"/>
+                                        <p:cTn id="46" dur="1000"/>
                                         <p:tgtEl>
                                           <p:spTgt spid="3">
                                             <p:txEl>
@@ -11915,7 +12069,7 @@
                                     </p:set>
                                     <p:animEffect transition="in" filter="fade">
                                       <p:cBhvr>
-                                        <p:cTn id="49" dur="500"/>
+                                        <p:cTn id="49" dur="1000"/>
                                         <p:tgtEl>
                                           <p:spTgt spid="3">
                                             <p:txEl>
@@ -11958,7 +12112,7 @@
                                     </p:set>
                                     <p:animEffect transition="in" filter="fade">
                                       <p:cBhvr>
-                                        <p:cTn id="52" dur="500"/>
+                                        <p:cTn id="52" dur="1000"/>
                                         <p:tgtEl>
                                           <p:spTgt spid="3">
                                             <p:txEl>
@@ -12001,7 +12155,7 @@
                                     </p:set>
                                     <p:animEffect transition="in" filter="fade">
                                       <p:cBhvr>
-                                        <p:cTn id="55" dur="500"/>
+                                        <p:cTn id="55" dur="1000"/>
                                         <p:tgtEl>
                                           <p:spTgt spid="3">
                                             <p:txEl>
@@ -12058,7 +12212,7 @@
                                     </p:set>
                                     <p:animEffect transition="in" filter="fade">
                                       <p:cBhvr>
-                                        <p:cTn id="60" dur="500"/>
+                                        <p:cTn id="60" dur="1000"/>
                                         <p:tgtEl>
                                           <p:spTgt spid="5"/>
                                         </p:tgtEl>
@@ -12771,13 +12925,13 @@
   <p:clrMapOvr>
     <a:masterClrMapping/>
   </p:clrMapOvr>
-  <mc:AlternateContent xmlns:mc="http://schemas.openxmlformats.org/markup-compatibility/2006">
-    <mc:Choice xmlns:p14="http://schemas.microsoft.com/office/powerpoint/2010/main" Requires="p14">
+  <mc:AlternateContent xmlns:mc="http://schemas.openxmlformats.org/markup-compatibility/2006" xmlns:p14="http://schemas.microsoft.com/office/powerpoint/2010/main">
+    <mc:Choice Requires="p14">
       <p:transition spd="slow" p14:dur="1500">
         <p:push dir="u"/>
       </p:transition>
     </mc:Choice>
-    <mc:Fallback>
+    <mc:Fallback xmlns="">
       <p:transition spd="slow">
         <p:push dir="u"/>
       </p:transition>
@@ -12833,7 +12987,7 @@
                                     </p:set>
                                     <p:animEffect transition="in" filter="fade">
                                       <p:cBhvr>
-                                        <p:cTn id="7" dur="500"/>
+                                        <p:cTn id="7" dur="1000"/>
                                         <p:tgtEl>
                                           <p:spTgt spid="3">
                                             <p:txEl>
@@ -12876,7 +13030,7 @@
                                     </p:set>
                                     <p:animEffect transition="in" filter="fade">
                                       <p:cBhvr>
-                                        <p:cTn id="10" dur="500"/>
+                                        <p:cTn id="10" dur="1000"/>
                                         <p:tgtEl>
                                           <p:spTgt spid="3">
                                             <p:txEl>
@@ -12919,7 +13073,7 @@
                                     </p:set>
                                     <p:animEffect transition="in" filter="fade">
                                       <p:cBhvr>
-                                        <p:cTn id="13" dur="500"/>
+                                        <p:cTn id="13" dur="1000"/>
                                         <p:tgtEl>
                                           <p:spTgt spid="3">
                                             <p:txEl>
@@ -12962,7 +13116,7 @@
                                     </p:set>
                                     <p:animEffect transition="in" filter="fade">
                                       <p:cBhvr>
-                                        <p:cTn id="16" dur="500"/>
+                                        <p:cTn id="16" dur="1000"/>
                                         <p:tgtEl>
                                           <p:spTgt spid="3">
                                             <p:txEl>
@@ -13005,7 +13159,7 @@
                                     </p:set>
                                     <p:animEffect transition="in" filter="fade">
                                       <p:cBhvr>
-                                        <p:cTn id="19" dur="500"/>
+                                        <p:cTn id="19" dur="1000"/>
                                         <p:tgtEl>
                                           <p:spTgt spid="3">
                                             <p:txEl>
@@ -13048,7 +13202,7 @@
                                     </p:set>
                                     <p:animEffect transition="in" filter="fade">
                                       <p:cBhvr>
-                                        <p:cTn id="22" dur="500"/>
+                                        <p:cTn id="22" dur="1000"/>
                                         <p:tgtEl>
                                           <p:spTgt spid="3">
                                             <p:txEl>
@@ -13091,7 +13245,7 @@
                                     </p:set>
                                     <p:animEffect transition="in" filter="fade">
                                       <p:cBhvr>
-                                        <p:cTn id="25" dur="500"/>
+                                        <p:cTn id="25" dur="1000"/>
                                         <p:tgtEl>
                                           <p:spTgt spid="3">
                                             <p:txEl>
@@ -13134,7 +13288,7 @@
                                     </p:set>
                                     <p:animEffect transition="in" filter="fade">
                                       <p:cBhvr>
-                                        <p:cTn id="28" dur="500"/>
+                                        <p:cTn id="28" dur="1000"/>
                                         <p:tgtEl>
                                           <p:spTgt spid="3">
                                             <p:txEl>
@@ -13177,7 +13331,7 @@
                                     </p:set>
                                     <p:animEffect transition="in" filter="fade">
                                       <p:cBhvr>
-                                        <p:cTn id="31" dur="500"/>
+                                        <p:cTn id="31" dur="1000"/>
                                         <p:tgtEl>
                                           <p:spTgt spid="3">
                                             <p:txEl>
@@ -13220,7 +13374,7 @@
                                     </p:set>
                                     <p:animEffect transition="in" filter="fade">
                                       <p:cBhvr>
-                                        <p:cTn id="34" dur="500"/>
+                                        <p:cTn id="34" dur="1000"/>
                                         <p:tgtEl>
                                           <p:spTgt spid="3">
                                             <p:txEl>
@@ -13263,7 +13417,7 @@
                                     </p:set>
                                     <p:animEffect transition="in" filter="fade">
                                       <p:cBhvr>
-                                        <p:cTn id="37" dur="500"/>
+                                        <p:cTn id="37" dur="1000"/>
                                         <p:tgtEl>
                                           <p:spTgt spid="3">
                                             <p:txEl>
@@ -13306,7 +13460,7 @@
                                     </p:set>
                                     <p:animEffect transition="in" filter="fade">
                                       <p:cBhvr>
-                                        <p:cTn id="40" dur="500"/>
+                                        <p:cTn id="40" dur="1000"/>
                                         <p:tgtEl>
                                           <p:spTgt spid="3">
                                             <p:txEl>
@@ -13349,7 +13503,7 @@
                                     </p:set>
                                     <p:animEffect transition="in" filter="fade">
                                       <p:cBhvr>
-                                        <p:cTn id="43" dur="500"/>
+                                        <p:cTn id="43" dur="1000"/>
                                         <p:tgtEl>
                                           <p:spTgt spid="3">
                                             <p:txEl>
@@ -13392,7 +13546,7 @@
                                     </p:set>
                                     <p:animEffect transition="in" filter="fade">
                                       <p:cBhvr>
-                                        <p:cTn id="46" dur="500"/>
+                                        <p:cTn id="46" dur="1000"/>
                                         <p:tgtEl>
                                           <p:spTgt spid="3">
                                             <p:txEl>
@@ -13435,7 +13589,7 @@
                                     </p:set>
                                     <p:animEffect transition="in" filter="fade">
                                       <p:cBhvr>
-                                        <p:cTn id="49" dur="500"/>
+                                        <p:cTn id="49" dur="1000"/>
                                         <p:tgtEl>
                                           <p:spTgt spid="3">
                                             <p:txEl>
@@ -13478,7 +13632,7 @@
                                     </p:set>
                                     <p:animEffect transition="in" filter="fade">
                                       <p:cBhvr>
-                                        <p:cTn id="52" dur="500"/>
+                                        <p:cTn id="52" dur="1000"/>
                                         <p:tgtEl>
                                           <p:spTgt spid="3">
                                             <p:txEl>
@@ -13535,7 +13689,7 @@
                                     </p:set>
                                     <p:animEffect transition="in" filter="fade">
                                       <p:cBhvr>
-                                        <p:cTn id="57" dur="500"/>
+                                        <p:cTn id="57" dur="1000"/>
                                         <p:tgtEl>
                                           <p:spTgt spid="5"/>
                                         </p:tgtEl>
@@ -14253,13 +14407,13 @@
   <p:clrMapOvr>
     <a:masterClrMapping/>
   </p:clrMapOvr>
-  <mc:AlternateContent xmlns:mc="http://schemas.openxmlformats.org/markup-compatibility/2006">
-    <mc:Choice xmlns:p14="http://schemas.microsoft.com/office/powerpoint/2010/main" Requires="p14">
+  <mc:AlternateContent xmlns:mc="http://schemas.openxmlformats.org/markup-compatibility/2006" xmlns:p14="http://schemas.microsoft.com/office/powerpoint/2010/main">
+    <mc:Choice Requires="p14">
       <p:transition spd="slow" p14:dur="1500">
         <p:push dir="u"/>
       </p:transition>
     </mc:Choice>
-    <mc:Fallback>
+    <mc:Fallback xmlns="">
       <p:transition spd="slow">
         <p:push dir="u"/>
       </p:transition>
@@ -14315,7 +14469,7 @@
                                     </p:set>
                                     <p:animEffect transition="in" filter="fade">
                                       <p:cBhvr>
-                                        <p:cTn id="7" dur="500"/>
+                                        <p:cTn id="7" dur="1000"/>
                                         <p:tgtEl>
                                           <p:spTgt spid="3">
                                             <p:txEl>
@@ -14358,7 +14512,7 @@
                                     </p:set>
                                     <p:animEffect transition="in" filter="fade">
                                       <p:cBhvr>
-                                        <p:cTn id="10" dur="500"/>
+                                        <p:cTn id="10" dur="1000"/>
                                         <p:tgtEl>
                                           <p:spTgt spid="3">
                                             <p:txEl>
@@ -14401,7 +14555,7 @@
                                     </p:set>
                                     <p:animEffect transition="in" filter="fade">
                                       <p:cBhvr>
-                                        <p:cTn id="13" dur="500"/>
+                                        <p:cTn id="13" dur="1000"/>
                                         <p:tgtEl>
                                           <p:spTgt spid="3">
                                             <p:txEl>
@@ -14444,7 +14598,7 @@
                                     </p:set>
                                     <p:animEffect transition="in" filter="fade">
                                       <p:cBhvr>
-                                        <p:cTn id="16" dur="500"/>
+                                        <p:cTn id="16" dur="1000"/>
                                         <p:tgtEl>
                                           <p:spTgt spid="3">
                                             <p:txEl>
@@ -14487,7 +14641,7 @@
                                     </p:set>
                                     <p:animEffect transition="in" filter="fade">
                                       <p:cBhvr>
-                                        <p:cTn id="19" dur="500"/>
+                                        <p:cTn id="19" dur="1000"/>
                                         <p:tgtEl>
                                           <p:spTgt spid="3">
                                             <p:txEl>
@@ -14530,7 +14684,7 @@
                                     </p:set>
                                     <p:animEffect transition="in" filter="fade">
                                       <p:cBhvr>
-                                        <p:cTn id="22" dur="500"/>
+                                        <p:cTn id="22" dur="1000"/>
                                         <p:tgtEl>
                                           <p:spTgt spid="3">
                                             <p:txEl>
@@ -14573,7 +14727,7 @@
                                     </p:set>
                                     <p:animEffect transition="in" filter="fade">
                                       <p:cBhvr>
-                                        <p:cTn id="25" dur="500"/>
+                                        <p:cTn id="25" dur="1000"/>
                                         <p:tgtEl>
                                           <p:spTgt spid="3">
                                             <p:txEl>
@@ -14616,7 +14770,7 @@
                                     </p:set>
                                     <p:animEffect transition="in" filter="fade">
                                       <p:cBhvr>
-                                        <p:cTn id="28" dur="500"/>
+                                        <p:cTn id="28" dur="1000"/>
                                         <p:tgtEl>
                                           <p:spTgt spid="3">
                                             <p:txEl>
@@ -14659,7 +14813,7 @@
                                     </p:set>
                                     <p:animEffect transition="in" filter="fade">
                                       <p:cBhvr>
-                                        <p:cTn id="31" dur="500"/>
+                                        <p:cTn id="31" dur="1000"/>
                                         <p:tgtEl>
                                           <p:spTgt spid="3">
                                             <p:txEl>
@@ -14702,7 +14856,7 @@
                                     </p:set>
                                     <p:animEffect transition="in" filter="fade">
                                       <p:cBhvr>
-                                        <p:cTn id="34" dur="500"/>
+                                        <p:cTn id="34" dur="1000"/>
                                         <p:tgtEl>
                                           <p:spTgt spid="3">
                                             <p:txEl>
@@ -14745,7 +14899,7 @@
                                     </p:set>
                                     <p:animEffect transition="in" filter="fade">
                                       <p:cBhvr>
-                                        <p:cTn id="37" dur="500"/>
+                                        <p:cTn id="37" dur="1000"/>
                                         <p:tgtEl>
                                           <p:spTgt spid="3">
                                             <p:txEl>
@@ -14788,7 +14942,7 @@
                                     </p:set>
                                     <p:animEffect transition="in" filter="fade">
                                       <p:cBhvr>
-                                        <p:cTn id="40" dur="500"/>
+                                        <p:cTn id="40" dur="1000"/>
                                         <p:tgtEl>
                                           <p:spTgt spid="3">
                                             <p:txEl>
@@ -14831,7 +14985,7 @@
                                     </p:set>
                                     <p:animEffect transition="in" filter="fade">
                                       <p:cBhvr>
-                                        <p:cTn id="43" dur="500"/>
+                                        <p:cTn id="43" dur="1000"/>
                                         <p:tgtEl>
                                           <p:spTgt spid="3">
                                             <p:txEl>
@@ -14874,7 +15028,7 @@
                                     </p:set>
                                     <p:animEffect transition="in" filter="fade">
                                       <p:cBhvr>
-                                        <p:cTn id="46" dur="500"/>
+                                        <p:cTn id="46" dur="1000"/>
                                         <p:tgtEl>
                                           <p:spTgt spid="3">
                                             <p:txEl>
@@ -14917,7 +15071,7 @@
                                     </p:set>
                                     <p:animEffect transition="in" filter="fade">
                                       <p:cBhvr>
-                                        <p:cTn id="49" dur="500"/>
+                                        <p:cTn id="49" dur="1000"/>
                                         <p:tgtEl>
                                           <p:spTgt spid="3">
                                             <p:txEl>
@@ -14960,7 +15114,7 @@
                                     </p:set>
                                     <p:animEffect transition="in" filter="fade">
                                       <p:cBhvr>
-                                        <p:cTn id="52" dur="500"/>
+                                        <p:cTn id="52" dur="1000"/>
                                         <p:tgtEl>
                                           <p:spTgt spid="3">
                                             <p:txEl>
@@ -15017,7 +15171,7 @@
                                     </p:set>
                                     <p:animEffect transition="in" filter="fade">
                                       <p:cBhvr>
-                                        <p:cTn id="57" dur="500"/>
+                                        <p:cTn id="57" dur="1000"/>
                                         <p:tgtEl>
                                           <p:spTgt spid="5"/>
                                         </p:tgtEl>
@@ -15929,13 +16083,13 @@
   <p:clrMapOvr>
     <a:masterClrMapping/>
   </p:clrMapOvr>
-  <mc:AlternateContent xmlns:mc="http://schemas.openxmlformats.org/markup-compatibility/2006">
-    <mc:Choice xmlns:p14="http://schemas.microsoft.com/office/powerpoint/2010/main" Requires="p14">
+  <mc:AlternateContent xmlns:mc="http://schemas.openxmlformats.org/markup-compatibility/2006" xmlns:p14="http://schemas.microsoft.com/office/powerpoint/2010/main">
+    <mc:Choice Requires="p14">
       <p:transition spd="slow" p14:dur="1500">
         <p:push dir="u"/>
       </p:transition>
     </mc:Choice>
-    <mc:Fallback>
+    <mc:Fallback xmlns="">
       <p:transition spd="slow">
         <p:push dir="u"/>
       </p:transition>
@@ -15991,7 +16145,7 @@
                                     </p:set>
                                     <p:animEffect transition="in" filter="fade">
                                       <p:cBhvr>
-                                        <p:cTn id="7" dur="500"/>
+                                        <p:cTn id="7" dur="1000"/>
                                         <p:tgtEl>
                                           <p:spTgt spid="3">
                                             <p:txEl>
@@ -16034,7 +16188,7 @@
                                     </p:set>
                                     <p:animEffect transition="in" filter="fade">
                                       <p:cBhvr>
-                                        <p:cTn id="10" dur="500"/>
+                                        <p:cTn id="10" dur="1000"/>
                                         <p:tgtEl>
                                           <p:spTgt spid="3">
                                             <p:txEl>
@@ -16077,7 +16231,7 @@
                                     </p:set>
                                     <p:animEffect transition="in" filter="fade">
                                       <p:cBhvr>
-                                        <p:cTn id="13" dur="500"/>
+                                        <p:cTn id="13" dur="1000"/>
                                         <p:tgtEl>
                                           <p:spTgt spid="3">
                                             <p:txEl>
@@ -16120,7 +16274,7 @@
                                     </p:set>
                                     <p:animEffect transition="in" filter="fade">
                                       <p:cBhvr>
-                                        <p:cTn id="16" dur="500"/>
+                                        <p:cTn id="16" dur="1000"/>
                                         <p:tgtEl>
                                           <p:spTgt spid="3">
                                             <p:txEl>
@@ -16163,7 +16317,7 @@
                                     </p:set>
                                     <p:animEffect transition="in" filter="fade">
                                       <p:cBhvr>
-                                        <p:cTn id="19" dur="500"/>
+                                        <p:cTn id="19" dur="1000"/>
                                         <p:tgtEl>
                                           <p:spTgt spid="3">
                                             <p:txEl>
@@ -16206,7 +16360,7 @@
                                     </p:set>
                                     <p:animEffect transition="in" filter="fade">
                                       <p:cBhvr>
-                                        <p:cTn id="22" dur="500"/>
+                                        <p:cTn id="22" dur="1000"/>
                                         <p:tgtEl>
                                           <p:spTgt spid="3">
                                             <p:txEl>
@@ -16249,7 +16403,7 @@
                                     </p:set>
                                     <p:animEffect transition="in" filter="fade">
                                       <p:cBhvr>
-                                        <p:cTn id="25" dur="500"/>
+                                        <p:cTn id="25" dur="1000"/>
                                         <p:tgtEl>
                                           <p:spTgt spid="3">
                                             <p:txEl>
@@ -16292,7 +16446,7 @@
                                     </p:set>
                                     <p:animEffect transition="in" filter="fade">
                                       <p:cBhvr>
-                                        <p:cTn id="28" dur="500"/>
+                                        <p:cTn id="28" dur="1000"/>
                                         <p:tgtEl>
                                           <p:spTgt spid="3">
                                             <p:txEl>
@@ -16335,7 +16489,7 @@
                                     </p:set>
                                     <p:animEffect transition="in" filter="fade">
                                       <p:cBhvr>
-                                        <p:cTn id="31" dur="500"/>
+                                        <p:cTn id="31" dur="1000"/>
                                         <p:tgtEl>
                                           <p:spTgt spid="3">
                                             <p:txEl>
@@ -16378,7 +16532,7 @@
                                     </p:set>
                                     <p:animEffect transition="in" filter="fade">
                                       <p:cBhvr>
-                                        <p:cTn id="34" dur="500"/>
+                                        <p:cTn id="34" dur="1000"/>
                                         <p:tgtEl>
                                           <p:spTgt spid="3">
                                             <p:txEl>
@@ -16421,7 +16575,7 @@
                                     </p:set>
                                     <p:animEffect transition="in" filter="fade">
                                       <p:cBhvr>
-                                        <p:cTn id="37" dur="500"/>
+                                        <p:cTn id="37" dur="1000"/>
                                         <p:tgtEl>
                                           <p:spTgt spid="3">
                                             <p:txEl>
@@ -16464,7 +16618,7 @@
                                     </p:set>
                                     <p:animEffect transition="in" filter="fade">
                                       <p:cBhvr>
-                                        <p:cTn id="40" dur="500"/>
+                                        <p:cTn id="40" dur="1000"/>
                                         <p:tgtEl>
                                           <p:spTgt spid="3">
                                             <p:txEl>
@@ -16507,7 +16661,7 @@
                                     </p:set>
                                     <p:animEffect transition="in" filter="fade">
                                       <p:cBhvr>
-                                        <p:cTn id="43" dur="500"/>
+                                        <p:cTn id="43" dur="1000"/>
                                         <p:tgtEl>
                                           <p:spTgt spid="3">
                                             <p:txEl>
@@ -16550,7 +16704,7 @@
                                     </p:set>
                                     <p:animEffect transition="in" filter="fade">
                                       <p:cBhvr>
-                                        <p:cTn id="46" dur="500"/>
+                                        <p:cTn id="46" dur="1000"/>
                                         <p:tgtEl>
                                           <p:spTgt spid="3">
                                             <p:txEl>
@@ -16593,7 +16747,7 @@
                                     </p:set>
                                     <p:animEffect transition="in" filter="fade">
                                       <p:cBhvr>
-                                        <p:cTn id="49" dur="500"/>
+                                        <p:cTn id="49" dur="1000"/>
                                         <p:tgtEl>
                                           <p:spTgt spid="3">
                                             <p:txEl>
@@ -16636,7 +16790,7 @@
                                     </p:set>
                                     <p:animEffect transition="in" filter="fade">
                                       <p:cBhvr>
-                                        <p:cTn id="52" dur="500"/>
+                                        <p:cTn id="52" dur="1000"/>
                                         <p:tgtEl>
                                           <p:spTgt spid="3">
                                             <p:txEl>
@@ -16679,7 +16833,7 @@
                                     </p:set>
                                     <p:animEffect transition="in" filter="fade">
                                       <p:cBhvr>
-                                        <p:cTn id="55" dur="500"/>
+                                        <p:cTn id="55" dur="1000"/>
                                         <p:tgtEl>
                                           <p:spTgt spid="3">
                                             <p:txEl>
@@ -16722,7 +16876,7 @@
                                     </p:set>
                                     <p:animEffect transition="in" filter="fade">
                                       <p:cBhvr>
-                                        <p:cTn id="58" dur="500"/>
+                                        <p:cTn id="58" dur="1000"/>
                                         <p:tgtEl>
                                           <p:spTgt spid="3">
                                             <p:txEl>
@@ -16765,7 +16919,7 @@
                                     </p:set>
                                     <p:animEffect transition="in" filter="fade">
                                       <p:cBhvr>
-                                        <p:cTn id="61" dur="500"/>
+                                        <p:cTn id="61" dur="1000"/>
                                         <p:tgtEl>
                                           <p:spTgt spid="3">
                                             <p:txEl>
@@ -16822,7 +16976,7 @@
                                     </p:set>
                                     <p:animEffect transition="in" filter="fade">
                                       <p:cBhvr>
-                                        <p:cTn id="66" dur="500"/>
+                                        <p:cTn id="66" dur="1000"/>
                                         <p:tgtEl>
                                           <p:spTgt spid="5"/>
                                         </p:tgtEl>
@@ -17256,6 +17410,12 @@
 </ct:contentTypeSchema>
 </file>
 
+<file path=customXml/item4.xml><?xml version="1.0" encoding="utf-8"?>
+<Control xmlns="http://schemas.microsoft.com/VisualStudio/2011/storyboarding/control">
+  <Id Name="c3dcc9d7-e839-4c41-b311-c9546161c8f2" Revision="1" Stencil="System.MyShapes" StencilVersion="1.0"/>
+</Control>
+</file>
+
 <file path=customXml/itemProps1.xml><?xml version="1.0" encoding="utf-8"?>
 <ds:datastoreItem xmlns:ds="http://schemas.openxmlformats.org/officeDocument/2006/customXml" ds:itemID="{434FA947-7C31-410D-8361-56745DB88B49}">
   <ds:schemaRefs>
@@ -17293,4 +17453,12 @@
     <ds:schemaRef ds:uri="http://schemas.microsoft.com/office/infopath/2007/PartnerControls"/>
   </ds:schemaRefs>
 </ds:datastoreItem>
+</file>
+
+<file path=customXml/itemProps4.xml><?xml version="1.0" encoding="utf-8"?>
+<ds:datastoreItem xmlns:ds="http://schemas.openxmlformats.org/officeDocument/2006/customXml" ds:itemID="{013B6157-3244-4A9D-93EF-51F309D2255A}">
+  <ds:schemaRefs>
+    <ds:schemaRef ds:uri="http://schemas.microsoft.com/VisualStudio/2011/storyboarding/control"/>
+  </ds:schemaRefs>
+</ds:datastoreItem>
 </file>
</xml_diff>

<commit_message>
Updated presentation, fixed some indentation problems. Added download link for presentation. Fixed fonts.
</commit_message>
<xml_diff>
--- a/Presentation.pptx
+++ b/Presentation.pptx
@@ -19235,7 +19235,7 @@
         <p:spPr>
           <a:xfrm>
             <a:off x="569343" y="1328468"/>
-            <a:ext cx="10966165" cy="1874277"/>
+            <a:ext cx="10966165" cy="4162482"/>
           </a:xfrm>
         </p:spPr>
         <p:txBody>
@@ -19277,7 +19277,7 @@
                 <a:latin typeface="Helvetica World" panose="020B0500040000020004" pitchFamily="34" charset="0"/>
                 <a:cs typeface="Helvetica World" panose="020B0500040000020004" pitchFamily="34" charset="0"/>
               </a:rPr>
-              <a:t>sourcemaps</a:t>
+              <a:t>Sourcemaps</a:t>
             </a:r>
             <a:r>
               <a:rPr lang="en-US" sz="2400" dirty="0">
@@ -19291,7 +19291,7 @@
                 <a:latin typeface="Helvetica World" panose="020B0500040000020004" pitchFamily="34" charset="0"/>
                 <a:cs typeface="Helvetica World" panose="020B0500040000020004" pitchFamily="34" charset="0"/>
               </a:rPr>
-              <a:t>autoprefixer</a:t>
+              <a:t>Autoprefixer</a:t>
             </a:r>
             <a:r>
               <a:rPr lang="en-US" sz="2400" dirty="0">
@@ -19299,6 +19299,26 @@
                 <a:cs typeface="Helvetica World" panose="020B0500040000020004" pitchFamily="34" charset="0"/>
               </a:rPr>
               <a:t>.</a:t>
+            </a:r>
+          </a:p>
+          <a:p>
+            <a:pPr marL="342900" indent="-342900"/>
+            <a:r>
+              <a:rPr lang="en-US" sz="2400" dirty="0">
+                <a:latin typeface="Helvetica World" panose="020B0500040000020004" pitchFamily="34" charset="0"/>
+                <a:cs typeface="Helvetica World" panose="020B0500040000020004" pitchFamily="34" charset="0"/>
+              </a:rPr>
+              <a:t>Uses live-reload for SASS, JavaScript and HTML.</a:t>
+            </a:r>
+          </a:p>
+          <a:p>
+            <a:pPr marL="342900" indent="-342900"/>
+            <a:r>
+              <a:rPr lang="en-US" sz="2400" dirty="0">
+                <a:latin typeface="Helvetica World" panose="020B0500040000020004" pitchFamily="34" charset="0"/>
+                <a:cs typeface="Helvetica World" panose="020B0500040000020004" pitchFamily="34" charset="0"/>
+              </a:rPr>
+              <a:t>Also contains GULP-structure for JavaScript with TDD (Karma/Jasmine).</a:t>
             </a:r>
           </a:p>
           <a:p>
@@ -19697,6 +19717,168 @@
                                           <p:spTgt spid="3">
                                             <p:txEl>
                                               <p:pRg st="3" end="3"/>
+                                            </p:txEl>
+                                          </p:spTgt>
+                                        </p:tgtEl>
+                                      </p:cBhvr>
+                                    </p:animEffect>
+                                  </p:childTnLst>
+                                  <p:subTnLst>
+                                    <p:animClr clrSpc="rgb" dir="cw">
+                                      <p:cBhvr override="childStyle">
+                                        <p:cTn dur="1" fill="hold" display="0" masterRel="nextClick" afterEffect="1"/>
+                                        <p:tgtEl>
+                                          <p:spTgt spid="3">
+                                            <p:txEl>
+                                              <p:pRg st="3" end="3"/>
+                                            </p:txEl>
+                                          </p:spTgt>
+                                        </p:tgtEl>
+                                        <p:attrNameLst>
+                                          <p:attrName>ppt_c</p:attrName>
+                                        </p:attrNameLst>
+                                      </p:cBhvr>
+                                      <p:to>
+                                        <a:srgbClr val="DDDDDD"/>
+                                      </p:to>
+                                    </p:animClr>
+                                  </p:subTnLst>
+                                </p:cTn>
+                              </p:par>
+                            </p:childTnLst>
+                          </p:cTn>
+                        </p:par>
+                      </p:childTnLst>
+                    </p:cTn>
+                  </p:par>
+                  <p:par>
+                    <p:cTn id="23" fill="hold">
+                      <p:stCondLst>
+                        <p:cond delay="indefinite"/>
+                      </p:stCondLst>
+                      <p:childTnLst>
+                        <p:par>
+                          <p:cTn id="24" fill="hold">
+                            <p:stCondLst>
+                              <p:cond delay="0"/>
+                            </p:stCondLst>
+                            <p:childTnLst>
+                              <p:par>
+                                <p:cTn id="25" presetID="10" presetClass="entr" presetSubtype="0" fill="hold" grpId="0" nodeType="clickEffect">
+                                  <p:stCondLst>
+                                    <p:cond delay="0"/>
+                                  </p:stCondLst>
+                                  <p:childTnLst>
+                                    <p:set>
+                                      <p:cBhvr>
+                                        <p:cTn id="26" dur="1" fill="hold">
+                                          <p:stCondLst>
+                                            <p:cond delay="0"/>
+                                          </p:stCondLst>
+                                        </p:cTn>
+                                        <p:tgtEl>
+                                          <p:spTgt spid="3">
+                                            <p:txEl>
+                                              <p:pRg st="4" end="4"/>
+                                            </p:txEl>
+                                          </p:spTgt>
+                                        </p:tgtEl>
+                                        <p:attrNameLst>
+                                          <p:attrName>style.visibility</p:attrName>
+                                        </p:attrNameLst>
+                                      </p:cBhvr>
+                                      <p:to>
+                                        <p:strVal val="visible"/>
+                                      </p:to>
+                                    </p:set>
+                                    <p:animEffect transition="in" filter="fade">
+                                      <p:cBhvr>
+                                        <p:cTn id="27" dur="500"/>
+                                        <p:tgtEl>
+                                          <p:spTgt spid="3">
+                                            <p:txEl>
+                                              <p:pRg st="4" end="4"/>
+                                            </p:txEl>
+                                          </p:spTgt>
+                                        </p:tgtEl>
+                                      </p:cBhvr>
+                                    </p:animEffect>
+                                  </p:childTnLst>
+                                  <p:subTnLst>
+                                    <p:animClr clrSpc="rgb" dir="cw">
+                                      <p:cBhvr override="childStyle">
+                                        <p:cTn dur="1" fill="hold" display="0" masterRel="nextClick" afterEffect="1"/>
+                                        <p:tgtEl>
+                                          <p:spTgt spid="3">
+                                            <p:txEl>
+                                              <p:pRg st="4" end="4"/>
+                                            </p:txEl>
+                                          </p:spTgt>
+                                        </p:tgtEl>
+                                        <p:attrNameLst>
+                                          <p:attrName>ppt_c</p:attrName>
+                                        </p:attrNameLst>
+                                      </p:cBhvr>
+                                      <p:to>
+                                        <a:srgbClr val="DDDDDD"/>
+                                      </p:to>
+                                    </p:animClr>
+                                  </p:subTnLst>
+                                </p:cTn>
+                              </p:par>
+                            </p:childTnLst>
+                          </p:cTn>
+                        </p:par>
+                      </p:childTnLst>
+                    </p:cTn>
+                  </p:par>
+                  <p:par>
+                    <p:cTn id="28" fill="hold">
+                      <p:stCondLst>
+                        <p:cond delay="indefinite"/>
+                      </p:stCondLst>
+                      <p:childTnLst>
+                        <p:par>
+                          <p:cTn id="29" fill="hold">
+                            <p:stCondLst>
+                              <p:cond delay="0"/>
+                            </p:stCondLst>
+                            <p:childTnLst>
+                              <p:par>
+                                <p:cTn id="30" presetID="10" presetClass="entr" presetSubtype="0" fill="hold" grpId="0" nodeType="clickEffect">
+                                  <p:stCondLst>
+                                    <p:cond delay="0"/>
+                                  </p:stCondLst>
+                                  <p:childTnLst>
+                                    <p:set>
+                                      <p:cBhvr>
+                                        <p:cTn id="31" dur="1" fill="hold">
+                                          <p:stCondLst>
+                                            <p:cond delay="0"/>
+                                          </p:stCondLst>
+                                        </p:cTn>
+                                        <p:tgtEl>
+                                          <p:spTgt spid="3">
+                                            <p:txEl>
+                                              <p:pRg st="5" end="5"/>
+                                            </p:txEl>
+                                          </p:spTgt>
+                                        </p:tgtEl>
+                                        <p:attrNameLst>
+                                          <p:attrName>style.visibility</p:attrName>
+                                        </p:attrNameLst>
+                                      </p:cBhvr>
+                                      <p:to>
+                                        <p:strVal val="visible"/>
+                                      </p:to>
+                                    </p:set>
+                                    <p:animEffect transition="in" filter="fade">
+                                      <p:cBhvr>
+                                        <p:cTn id="32" dur="500"/>
+                                        <p:tgtEl>
+                                          <p:spTgt spid="3">
+                                            <p:txEl>
+                                              <p:pRg st="5" end="5"/>
                                             </p:txEl>
                                           </p:spTgt>
                                         </p:tgtEl>

</xml_diff>

<commit_message>
Updated presentation. Removed a WebStorm file.  Removed some commented code from SASS-code.
</commit_message>
<xml_diff>
--- a/Presentation.pptx
+++ b/Presentation.pptx
@@ -244,7 +244,7 @@
           <a:p>
             <a:fld id="{F1E7F302-49C3-4BD7-94C0-CFE016F79F0F}" type="datetimeFigureOut">
               <a:rPr lang="sv-SE" smtClean="0"/>
-              <a:t>2017-02-21</a:t>
+              <a:t>2017-02-22</a:t>
             </a:fld>
             <a:endParaRPr lang="sv-SE"/>
           </a:p>
@@ -1429,7 +1429,7 @@
           <a:p>
             <a:fld id="{C706582F-A7DF-4EE7-AB3D-B13882602CD1}" type="datetimeFigureOut">
               <a:rPr lang="sv-SE" smtClean="0"/>
-              <a:t>2017-02-21</a:t>
+              <a:t>2017-02-22</a:t>
             </a:fld>
             <a:endParaRPr lang="sv-SE"/>
           </a:p>
@@ -1609,7 +1609,7 @@
           <a:p>
             <a:fld id="{C706582F-A7DF-4EE7-AB3D-B13882602CD1}" type="datetimeFigureOut">
               <a:rPr lang="sv-SE" smtClean="0"/>
-              <a:t>2017-02-21</a:t>
+              <a:t>2017-02-22</a:t>
             </a:fld>
             <a:endParaRPr lang="sv-SE"/>
           </a:p>
@@ -1799,7 +1799,7 @@
           <a:p>
             <a:fld id="{C706582F-A7DF-4EE7-AB3D-B13882602CD1}" type="datetimeFigureOut">
               <a:rPr lang="sv-SE" smtClean="0"/>
-              <a:t>2017-02-21</a:t>
+              <a:t>2017-02-22</a:t>
             </a:fld>
             <a:endParaRPr lang="sv-SE"/>
           </a:p>
@@ -1979,7 +1979,7 @@
           <a:p>
             <a:fld id="{C706582F-A7DF-4EE7-AB3D-B13882602CD1}" type="datetimeFigureOut">
               <a:rPr lang="sv-SE" smtClean="0"/>
-              <a:t>2017-02-21</a:t>
+              <a:t>2017-02-22</a:t>
             </a:fld>
             <a:endParaRPr lang="sv-SE"/>
           </a:p>
@@ -2236,7 +2236,7 @@
           <a:p>
             <a:fld id="{C706582F-A7DF-4EE7-AB3D-B13882602CD1}" type="datetimeFigureOut">
               <a:rPr lang="sv-SE" smtClean="0"/>
-              <a:t>2017-02-21</a:t>
+              <a:t>2017-02-22</a:t>
             </a:fld>
             <a:endParaRPr lang="sv-SE"/>
           </a:p>
@@ -2477,7 +2477,7 @@
           <a:p>
             <a:fld id="{C706582F-A7DF-4EE7-AB3D-B13882602CD1}" type="datetimeFigureOut">
               <a:rPr lang="sv-SE" smtClean="0"/>
-              <a:t>2017-02-21</a:t>
+              <a:t>2017-02-22</a:t>
             </a:fld>
             <a:endParaRPr lang="sv-SE"/>
           </a:p>
@@ -2853,7 +2853,7 @@
           <a:p>
             <a:fld id="{C706582F-A7DF-4EE7-AB3D-B13882602CD1}" type="datetimeFigureOut">
               <a:rPr lang="sv-SE" smtClean="0"/>
-              <a:t>2017-02-21</a:t>
+              <a:t>2017-02-22</a:t>
             </a:fld>
             <a:endParaRPr lang="sv-SE"/>
           </a:p>
@@ -2982,7 +2982,7 @@
           <a:p>
             <a:fld id="{C706582F-A7DF-4EE7-AB3D-B13882602CD1}" type="datetimeFigureOut">
               <a:rPr lang="sv-SE" smtClean="0"/>
-              <a:t>2017-02-21</a:t>
+              <a:t>2017-02-22</a:t>
             </a:fld>
             <a:endParaRPr lang="sv-SE"/>
           </a:p>
@@ -3089,7 +3089,7 @@
           <a:p>
             <a:fld id="{C706582F-A7DF-4EE7-AB3D-B13882602CD1}" type="datetimeFigureOut">
               <a:rPr lang="sv-SE" smtClean="0"/>
-              <a:t>2017-02-21</a:t>
+              <a:t>2017-02-22</a:t>
             </a:fld>
             <a:endParaRPr lang="sv-SE"/>
           </a:p>
@@ -3376,7 +3376,7 @@
           <a:p>
             <a:fld id="{C706582F-A7DF-4EE7-AB3D-B13882602CD1}" type="datetimeFigureOut">
               <a:rPr lang="sv-SE" smtClean="0"/>
-              <a:t>2017-02-21</a:t>
+              <a:t>2017-02-22</a:t>
             </a:fld>
             <a:endParaRPr lang="sv-SE"/>
           </a:p>
@@ -3640,7 +3640,7 @@
           <a:p>
             <a:fld id="{C706582F-A7DF-4EE7-AB3D-B13882602CD1}" type="datetimeFigureOut">
               <a:rPr lang="sv-SE" smtClean="0"/>
-              <a:t>2017-02-21</a:t>
+              <a:t>2017-02-22</a:t>
             </a:fld>
             <a:endParaRPr lang="sv-SE"/>
           </a:p>
@@ -3863,7 +3863,7 @@
           <a:p>
             <a:fld id="{C706582F-A7DF-4EE7-AB3D-B13882602CD1}" type="datetimeFigureOut">
               <a:rPr lang="sv-SE" smtClean="0"/>
-              <a:t>2017-02-21</a:t>
+              <a:t>2017-02-22</a:t>
             </a:fld>
             <a:endParaRPr lang="sv-SE"/>
           </a:p>
@@ -5208,7 +5208,7 @@
                                         </p:attrNameLst>
                                       </p:cBhvr>
                                       <p:to>
-                                        <a:srgbClr val="5F5F5F"/>
+                                        <a:srgbClr val="C0C0C0"/>
                                       </p:to>
                                     </p:animClr>
                                   </p:subTnLst>
@@ -5271,7 +5271,7 @@
                                         </p:attrNameLst>
                                       </p:cBhvr>
                                       <p:to>
-                                        <a:srgbClr val="5F5F5F"/>
+                                        <a:srgbClr val="C0C0C0"/>
                                       </p:to>
                                     </p:animClr>
                                   </p:subTnLst>
@@ -5334,7 +5334,7 @@
                                         </p:attrNameLst>
                                       </p:cBhvr>
                                       <p:to>
-                                        <a:srgbClr val="5F5F5F"/>
+                                        <a:srgbClr val="C0C0C0"/>
                                       </p:to>
                                     </p:animClr>
                                   </p:subTnLst>
@@ -5397,7 +5397,7 @@
                                         </p:attrNameLst>
                                       </p:cBhvr>
                                       <p:to>
-                                        <a:srgbClr val="5F5F5F"/>
+                                        <a:srgbClr val="C0C0C0"/>
                                       </p:to>
                                     </p:animClr>
                                   </p:subTnLst>
@@ -5460,7 +5460,7 @@
                                         </p:attrNameLst>
                                       </p:cBhvr>
                                       <p:to>
-                                        <a:srgbClr val="5F5F5F"/>
+                                        <a:srgbClr val="C0C0C0"/>
                                       </p:to>
                                     </p:animClr>
                                   </p:subTnLst>
@@ -5523,7 +5523,7 @@
                                         </p:attrNameLst>
                                       </p:cBhvr>
                                       <p:to>
-                                        <a:srgbClr val="5F5F5F"/>
+                                        <a:srgbClr val="C0C0C0"/>
                                       </p:to>
                                     </p:animClr>
                                   </p:subTnLst>
@@ -5586,7 +5586,7 @@
                                         </p:attrNameLst>
                                       </p:cBhvr>
                                       <p:to>
-                                        <a:srgbClr val="5F5F5F"/>
+                                        <a:srgbClr val="C0C0C0"/>
                                       </p:to>
                                     </p:animClr>
                                   </p:subTnLst>
@@ -5649,7 +5649,7 @@
                                         </p:attrNameLst>
                                       </p:cBhvr>
                                       <p:to>
-                                        <a:srgbClr val="5F5F5F"/>
+                                        <a:srgbClr val="C0C0C0"/>
                                       </p:to>
                                     </p:animClr>
                                   </p:subTnLst>
@@ -5712,7 +5712,7 @@
                                         </p:attrNameLst>
                                       </p:cBhvr>
                                       <p:to>
-                                        <a:srgbClr val="5F5F5F"/>
+                                        <a:srgbClr val="C0C0C0"/>
                                       </p:to>
                                     </p:animClr>
                                   </p:subTnLst>
@@ -5775,7 +5775,7 @@
                                         </p:attrNameLst>
                                       </p:cBhvr>
                                       <p:to>
-                                        <a:srgbClr val="5F5F5F"/>
+                                        <a:srgbClr val="C0C0C0"/>
                                       </p:to>
                                     </p:animClr>
                                   </p:subTnLst>
@@ -5838,7 +5838,7 @@
                                         </p:attrNameLst>
                                       </p:cBhvr>
                                       <p:to>
-                                        <a:srgbClr val="5F5F5F"/>
+                                        <a:srgbClr val="C0C0C0"/>
                                       </p:to>
                                     </p:animClr>
                                   </p:subTnLst>
@@ -5901,7 +5901,7 @@
                                         </p:attrNameLst>
                                       </p:cBhvr>
                                       <p:to>
-                                        <a:srgbClr val="5F5F5F"/>
+                                        <a:srgbClr val="C0C0C0"/>
                                       </p:to>
                                     </p:animClr>
                                   </p:subTnLst>
@@ -5964,7 +5964,7 @@
                                         </p:attrNameLst>
                                       </p:cBhvr>
                                       <p:to>
-                                        <a:srgbClr val="5F5F5F"/>
+                                        <a:srgbClr val="C0C0C0"/>
                                       </p:to>
                                     </p:animClr>
                                   </p:subTnLst>
@@ -6027,7 +6027,7 @@
                                         </p:attrNameLst>
                                       </p:cBhvr>
                                       <p:to>
-                                        <a:srgbClr val="5F5F5F"/>
+                                        <a:srgbClr val="C0C0C0"/>
                                       </p:to>
                                     </p:animClr>
                                   </p:subTnLst>
@@ -6090,7 +6090,7 @@
                                         </p:attrNameLst>
                                       </p:cBhvr>
                                       <p:to>
-                                        <a:srgbClr val="5F5F5F"/>
+                                        <a:srgbClr val="C0C0C0"/>
                                       </p:to>
                                     </p:animClr>
                                   </p:subTnLst>
@@ -6153,7 +6153,7 @@
                                         </p:attrNameLst>
                                       </p:cBhvr>
                                       <p:to>
-                                        <a:srgbClr val="5F5F5F"/>
+                                        <a:srgbClr val="C0C0C0"/>
                                       </p:to>
                                     </p:animClr>
                                   </p:subTnLst>
@@ -6216,7 +6216,7 @@
                                         </p:attrNameLst>
                                       </p:cBhvr>
                                       <p:to>
-                                        <a:srgbClr val="5F5F5F"/>
+                                        <a:srgbClr val="C0C0C0"/>
                                       </p:to>
                                     </p:animClr>
                                   </p:subTnLst>
@@ -6279,7 +6279,7 @@
                                         </p:attrNameLst>
                                       </p:cBhvr>
                                       <p:to>
-                                        <a:srgbClr val="5F5F5F"/>
+                                        <a:srgbClr val="C0C0C0"/>
                                       </p:to>
                                     </p:animClr>
                                   </p:subTnLst>
@@ -7707,7 +7707,7 @@
                                         </p:attrNameLst>
                                       </p:cBhvr>
                                       <p:to>
-                                        <a:srgbClr val="5F5F5F"/>
+                                        <a:srgbClr val="C0C0C0"/>
                                       </p:to>
                                     </p:animClr>
                                   </p:subTnLst>
@@ -7770,7 +7770,7 @@
                                         </p:attrNameLst>
                                       </p:cBhvr>
                                       <p:to>
-                                        <a:srgbClr val="5F5F5F"/>
+                                        <a:srgbClr val="C0C0C0"/>
                                       </p:to>
                                     </p:animClr>
                                   </p:subTnLst>
@@ -7833,7 +7833,7 @@
                                         </p:attrNameLst>
                                       </p:cBhvr>
                                       <p:to>
-                                        <a:srgbClr val="5F5F5F"/>
+                                        <a:srgbClr val="C0C0C0"/>
                                       </p:to>
                                     </p:animClr>
                                   </p:subTnLst>
@@ -7896,7 +7896,7 @@
                                         </p:attrNameLst>
                                       </p:cBhvr>
                                       <p:to>
-                                        <a:srgbClr val="5F5F5F"/>
+                                        <a:srgbClr val="C0C0C0"/>
                                       </p:to>
                                     </p:animClr>
                                   </p:subTnLst>
@@ -7959,7 +7959,7 @@
                                         </p:attrNameLst>
                                       </p:cBhvr>
                                       <p:to>
-                                        <a:srgbClr val="5F5F5F"/>
+                                        <a:srgbClr val="C0C0C0"/>
                                       </p:to>
                                     </p:animClr>
                                   </p:subTnLst>
@@ -8022,7 +8022,7 @@
                                         </p:attrNameLst>
                                       </p:cBhvr>
                                       <p:to>
-                                        <a:srgbClr val="5F5F5F"/>
+                                        <a:srgbClr val="C0C0C0"/>
                                       </p:to>
                                     </p:animClr>
                                   </p:subTnLst>
@@ -8085,7 +8085,7 @@
                                         </p:attrNameLst>
                                       </p:cBhvr>
                                       <p:to>
-                                        <a:srgbClr val="5F5F5F"/>
+                                        <a:srgbClr val="C0C0C0"/>
                                       </p:to>
                                     </p:animClr>
                                   </p:subTnLst>
@@ -8148,7 +8148,7 @@
                                         </p:attrNameLst>
                                       </p:cBhvr>
                                       <p:to>
-                                        <a:srgbClr val="5F5F5F"/>
+                                        <a:srgbClr val="C0C0C0"/>
                                       </p:to>
                                     </p:animClr>
                                   </p:subTnLst>
@@ -8211,7 +8211,7 @@
                                         </p:attrNameLst>
                                       </p:cBhvr>
                                       <p:to>
-                                        <a:srgbClr val="5F5F5F"/>
+                                        <a:srgbClr val="C0C0C0"/>
                                       </p:to>
                                     </p:animClr>
                                   </p:subTnLst>
@@ -8274,7 +8274,7 @@
                                         </p:attrNameLst>
                                       </p:cBhvr>
                                       <p:to>
-                                        <a:srgbClr val="5F5F5F"/>
+                                        <a:srgbClr val="C0C0C0"/>
                                       </p:to>
                                     </p:animClr>
                                   </p:subTnLst>
@@ -8337,7 +8337,7 @@
                                         </p:attrNameLst>
                                       </p:cBhvr>
                                       <p:to>
-                                        <a:srgbClr val="5F5F5F"/>
+                                        <a:srgbClr val="C0C0C0"/>
                                       </p:to>
                                     </p:animClr>
                                   </p:subTnLst>
@@ -8400,7 +8400,7 @@
                                         </p:attrNameLst>
                                       </p:cBhvr>
                                       <p:to>
-                                        <a:srgbClr val="5F5F5F"/>
+                                        <a:srgbClr val="C0C0C0"/>
                                       </p:to>
                                     </p:animClr>
                                   </p:subTnLst>
@@ -8463,7 +8463,7 @@
                                         </p:attrNameLst>
                                       </p:cBhvr>
                                       <p:to>
-                                        <a:srgbClr val="5F5F5F"/>
+                                        <a:srgbClr val="C0C0C0"/>
                                       </p:to>
                                     </p:animClr>
                                   </p:subTnLst>
@@ -8526,7 +8526,7 @@
                                         </p:attrNameLst>
                                       </p:cBhvr>
                                       <p:to>
-                                        <a:srgbClr val="5F5F5F"/>
+                                        <a:srgbClr val="C0C0C0"/>
                                       </p:to>
                                     </p:animClr>
                                   </p:subTnLst>
@@ -8589,7 +8589,7 @@
                                         </p:attrNameLst>
                                       </p:cBhvr>
                                       <p:to>
-                                        <a:srgbClr val="5F5F5F"/>
+                                        <a:srgbClr val="C0C0C0"/>
                                       </p:to>
                                     </p:animClr>
                                   </p:subTnLst>
@@ -8652,7 +8652,7 @@
                                         </p:attrNameLst>
                                       </p:cBhvr>
                                       <p:to>
-                                        <a:srgbClr val="5F5F5F"/>
+                                        <a:srgbClr val="C0C0C0"/>
                                       </p:to>
                                     </p:animClr>
                                   </p:subTnLst>
@@ -8715,7 +8715,7 @@
                                         </p:attrNameLst>
                                       </p:cBhvr>
                                       <p:to>
-                                        <a:srgbClr val="5F5F5F"/>
+                                        <a:srgbClr val="C0C0C0"/>
                                       </p:to>
                                     </p:animClr>
                                   </p:subTnLst>
@@ -8778,7 +8778,7 @@
                                         </p:attrNameLst>
                                       </p:cBhvr>
                                       <p:to>
-                                        <a:srgbClr val="5F5F5F"/>
+                                        <a:srgbClr val="C0C0C0"/>
                                       </p:to>
                                     </p:animClr>
                                   </p:subTnLst>
@@ -10400,7 +10400,7 @@
                                         </p:attrNameLst>
                                       </p:cBhvr>
                                       <p:to>
-                                        <a:srgbClr val="5F5F5F"/>
+                                        <a:srgbClr val="C0C0C0"/>
                                       </p:to>
                                     </p:animClr>
                                   </p:subTnLst>
@@ -10463,7 +10463,7 @@
                                         </p:attrNameLst>
                                       </p:cBhvr>
                                       <p:to>
-                                        <a:srgbClr val="5F5F5F"/>
+                                        <a:srgbClr val="C0C0C0"/>
                                       </p:to>
                                     </p:animClr>
                                   </p:subTnLst>
@@ -10526,7 +10526,7 @@
                                         </p:attrNameLst>
                                       </p:cBhvr>
                                       <p:to>
-                                        <a:srgbClr val="5F5F5F"/>
+                                        <a:srgbClr val="C0C0C0"/>
                                       </p:to>
                                     </p:animClr>
                                   </p:subTnLst>
@@ -10589,7 +10589,7 @@
                                         </p:attrNameLst>
                                       </p:cBhvr>
                                       <p:to>
-                                        <a:srgbClr val="5F5F5F"/>
+                                        <a:srgbClr val="C0C0C0"/>
                                       </p:to>
                                     </p:animClr>
                                   </p:subTnLst>
@@ -10652,7 +10652,7 @@
                                         </p:attrNameLst>
                                       </p:cBhvr>
                                       <p:to>
-                                        <a:srgbClr val="5F5F5F"/>
+                                        <a:srgbClr val="C0C0C0"/>
                                       </p:to>
                                     </p:animClr>
                                   </p:subTnLst>
@@ -10715,7 +10715,7 @@
                                         </p:attrNameLst>
                                       </p:cBhvr>
                                       <p:to>
-                                        <a:srgbClr val="5F5F5F"/>
+                                        <a:srgbClr val="C0C0C0"/>
                                       </p:to>
                                     </p:animClr>
                                   </p:subTnLst>
@@ -10778,7 +10778,7 @@
                                         </p:attrNameLst>
                                       </p:cBhvr>
                                       <p:to>
-                                        <a:srgbClr val="5F5F5F"/>
+                                        <a:srgbClr val="C0C0C0"/>
                                       </p:to>
                                     </p:animClr>
                                   </p:subTnLst>
@@ -10841,7 +10841,7 @@
                                         </p:attrNameLst>
                                       </p:cBhvr>
                                       <p:to>
-                                        <a:srgbClr val="5F5F5F"/>
+                                        <a:srgbClr val="C0C0C0"/>
                                       </p:to>
                                     </p:animClr>
                                   </p:subTnLst>
@@ -10904,7 +10904,7 @@
                                         </p:attrNameLst>
                                       </p:cBhvr>
                                       <p:to>
-                                        <a:srgbClr val="5F5F5F"/>
+                                        <a:srgbClr val="C0C0C0"/>
                                       </p:to>
                                     </p:animClr>
                                   </p:subTnLst>
@@ -10967,7 +10967,7 @@
                                         </p:attrNameLst>
                                       </p:cBhvr>
                                       <p:to>
-                                        <a:srgbClr val="5F5F5F"/>
+                                        <a:srgbClr val="C0C0C0"/>
                                       </p:to>
                                     </p:animClr>
                                   </p:subTnLst>
@@ -11030,7 +11030,7 @@
                                         </p:attrNameLst>
                                       </p:cBhvr>
                                       <p:to>
-                                        <a:srgbClr val="5F5F5F"/>
+                                        <a:srgbClr val="C0C0C0"/>
                                       </p:to>
                                     </p:animClr>
                                   </p:subTnLst>
@@ -11093,7 +11093,7 @@
                                         </p:attrNameLst>
                                       </p:cBhvr>
                                       <p:to>
-                                        <a:srgbClr val="5F5F5F"/>
+                                        <a:srgbClr val="C0C0C0"/>
                                       </p:to>
                                     </p:animClr>
                                   </p:subTnLst>
@@ -11156,7 +11156,7 @@
                                         </p:attrNameLst>
                                       </p:cBhvr>
                                       <p:to>
-                                        <a:srgbClr val="5F5F5F"/>
+                                        <a:srgbClr val="C0C0C0"/>
                                       </p:to>
                                     </p:animClr>
                                   </p:subTnLst>
@@ -11237,7 +11237,7 @@
                                         </p:attrNameLst>
                                       </p:cBhvr>
                                       <p:to>
-                                        <a:srgbClr val="5F5F5F"/>
+                                        <a:srgbClr val="C0C0C0"/>
                                       </p:to>
                                     </p:animClr>
                                   </p:subTnLst>
@@ -11300,7 +11300,7 @@
                                         </p:attrNameLst>
                                       </p:cBhvr>
                                       <p:to>
-                                        <a:srgbClr val="5F5F5F"/>
+                                        <a:srgbClr val="C0C0C0"/>
                                       </p:to>
                                     </p:animClr>
                                   </p:subTnLst>
@@ -11363,7 +11363,7 @@
                                         </p:attrNameLst>
                                       </p:cBhvr>
                                       <p:to>
-                                        <a:srgbClr val="5F5F5F"/>
+                                        <a:srgbClr val="C0C0C0"/>
                                       </p:to>
                                     </p:animClr>
                                   </p:subTnLst>
@@ -11426,7 +11426,7 @@
                                         </p:attrNameLst>
                                       </p:cBhvr>
                                       <p:to>
-                                        <a:srgbClr val="5F5F5F"/>
+                                        <a:srgbClr val="C0C0C0"/>
                                       </p:to>
                                     </p:animClr>
                                   </p:subTnLst>
@@ -11489,7 +11489,7 @@
                                         </p:attrNameLst>
                                       </p:cBhvr>
                                       <p:to>
-                                        <a:srgbClr val="5F5F5F"/>
+                                        <a:srgbClr val="C0C0C0"/>
                                       </p:to>
                                     </p:animClr>
                                   </p:subTnLst>
@@ -11552,7 +11552,7 @@
                                         </p:attrNameLst>
                                       </p:cBhvr>
                                       <p:to>
-                                        <a:srgbClr val="5F5F5F"/>
+                                        <a:srgbClr val="C0C0C0"/>
                                       </p:to>
                                     </p:animClr>
                                   </p:subTnLst>
@@ -11633,7 +11633,7 @@
                                         </p:attrNameLst>
                                       </p:cBhvr>
                                       <p:to>
-                                        <a:srgbClr val="5F5F5F"/>
+                                        <a:srgbClr val="C0C0C0"/>
                                       </p:to>
                                     </p:animClr>
                                   </p:subTnLst>
@@ -11696,7 +11696,7 @@
                                         </p:attrNameLst>
                                       </p:cBhvr>
                                       <p:to>
-                                        <a:srgbClr val="5F5F5F"/>
+                                        <a:srgbClr val="C0C0C0"/>
                                       </p:to>
                                     </p:animClr>
                                   </p:subTnLst>
@@ -11759,7 +11759,7 @@
                                         </p:attrNameLst>
                                       </p:cBhvr>
                                       <p:to>
-                                        <a:srgbClr val="5F5F5F"/>
+                                        <a:srgbClr val="C0C0C0"/>
                                       </p:to>
                                     </p:animClr>
                                   </p:subTnLst>
@@ -11822,7 +11822,7 @@
                                         </p:attrNameLst>
                                       </p:cBhvr>
                                       <p:to>
-                                        <a:srgbClr val="5F5F5F"/>
+                                        <a:srgbClr val="C0C0C0"/>
                                       </p:to>
                                     </p:animClr>
                                   </p:subTnLst>
@@ -11885,7 +11885,7 @@
                                         </p:attrNameLst>
                                       </p:cBhvr>
                                       <p:to>
-                                        <a:srgbClr val="5F5F5F"/>
+                                        <a:srgbClr val="C0C0C0"/>
                                       </p:to>
                                     </p:animClr>
                                   </p:subTnLst>
@@ -11948,7 +11948,7 @@
                                         </p:attrNameLst>
                                       </p:cBhvr>
                                       <p:to>
-                                        <a:srgbClr val="5F5F5F"/>
+                                        <a:srgbClr val="C0C0C0"/>
                                       </p:to>
                                     </p:animClr>
                                   </p:subTnLst>
@@ -12011,7 +12011,7 @@
                                         </p:attrNameLst>
                                       </p:cBhvr>
                                       <p:to>
-                                        <a:srgbClr val="5F5F5F"/>
+                                        <a:srgbClr val="C0C0C0"/>
                                       </p:to>
                                     </p:animClr>
                                   </p:subTnLst>
@@ -12074,7 +12074,7 @@
                                         </p:attrNameLst>
                                       </p:cBhvr>
                                       <p:to>
-                                        <a:srgbClr val="5F5F5F"/>
+                                        <a:srgbClr val="C0C0C0"/>
                                       </p:to>
                                     </p:animClr>
                                   </p:subTnLst>
@@ -12137,7 +12137,7 @@
                                         </p:attrNameLst>
                                       </p:cBhvr>
                                       <p:to>
-                                        <a:srgbClr val="5F5F5F"/>
+                                        <a:srgbClr val="C0C0C0"/>
                                       </p:to>
                                     </p:animClr>
                                   </p:subTnLst>
@@ -12200,7 +12200,7 @@
                                         </p:attrNameLst>
                                       </p:cBhvr>
                                       <p:to>
-                                        <a:srgbClr val="5F5F5F"/>
+                                        <a:srgbClr val="C0C0C0"/>
                                       </p:to>
                                     </p:animClr>
                                   </p:subTnLst>
@@ -12263,7 +12263,7 @@
                                         </p:attrNameLst>
                                       </p:cBhvr>
                                       <p:to>
-                                        <a:srgbClr val="5F5F5F"/>
+                                        <a:srgbClr val="C0C0C0"/>
                                       </p:to>
                                     </p:animClr>
                                   </p:subTnLst>
@@ -12326,7 +12326,7 @@
                                         </p:attrNameLst>
                                       </p:cBhvr>
                                       <p:to>
-                                        <a:srgbClr val="5F5F5F"/>
+                                        <a:srgbClr val="C0C0C0"/>
                                       </p:to>
                                     </p:animClr>
                                   </p:subTnLst>
@@ -12389,7 +12389,7 @@
                                         </p:attrNameLst>
                                       </p:cBhvr>
                                       <p:to>
-                                        <a:srgbClr val="5F5F5F"/>
+                                        <a:srgbClr val="C0C0C0"/>
                                       </p:to>
                                     </p:animClr>
                                   </p:subTnLst>
@@ -13376,7 +13376,7 @@
                                         </p:attrNameLst>
                                       </p:cBhvr>
                                       <p:to>
-                                        <a:srgbClr val="5F5F5F"/>
+                                        <a:srgbClr val="C0C0C0"/>
                                       </p:to>
                                     </p:animClr>
                                   </p:subTnLst>
@@ -13439,7 +13439,7 @@
                                         </p:attrNameLst>
                                       </p:cBhvr>
                                       <p:to>
-                                        <a:srgbClr val="5F5F5F"/>
+                                        <a:srgbClr val="C0C0C0"/>
                                       </p:to>
                                     </p:animClr>
                                   </p:subTnLst>
@@ -13502,7 +13502,7 @@
                                         </p:attrNameLst>
                                       </p:cBhvr>
                                       <p:to>
-                                        <a:srgbClr val="5F5F5F"/>
+                                        <a:srgbClr val="C0C0C0"/>
                                       </p:to>
                                     </p:animClr>
                                   </p:subTnLst>
@@ -13565,7 +13565,7 @@
                                         </p:attrNameLst>
                                       </p:cBhvr>
                                       <p:to>
-                                        <a:srgbClr val="5F5F5F"/>
+                                        <a:srgbClr val="C0C0C0"/>
                                       </p:to>
                                     </p:animClr>
                                   </p:subTnLst>
@@ -13628,7 +13628,7 @@
                                         </p:attrNameLst>
                                       </p:cBhvr>
                                       <p:to>
-                                        <a:srgbClr val="5F5F5F"/>
+                                        <a:srgbClr val="C0C0C0"/>
                                       </p:to>
                                     </p:animClr>
                                   </p:subTnLst>
@@ -13691,7 +13691,7 @@
                                         </p:attrNameLst>
                                       </p:cBhvr>
                                       <p:to>
-                                        <a:srgbClr val="5F5F5F"/>
+                                        <a:srgbClr val="C0C0C0"/>
                                       </p:to>
                                     </p:animClr>
                                   </p:subTnLst>
@@ -13754,7 +13754,7 @@
                                         </p:attrNameLst>
                                       </p:cBhvr>
                                       <p:to>
-                                        <a:srgbClr val="5F5F5F"/>
+                                        <a:srgbClr val="C0C0C0"/>
                                       </p:to>
                                     </p:animClr>
                                   </p:subTnLst>
@@ -13817,7 +13817,7 @@
                                         </p:attrNameLst>
                                       </p:cBhvr>
                                       <p:to>
-                                        <a:srgbClr val="5F5F5F"/>
+                                        <a:srgbClr val="C0C0C0"/>
                                       </p:to>
                                     </p:animClr>
                                   </p:subTnLst>
@@ -13880,7 +13880,7 @@
                                         </p:attrNameLst>
                                       </p:cBhvr>
                                       <p:to>
-                                        <a:srgbClr val="5F5F5F"/>
+                                        <a:srgbClr val="C0C0C0"/>
                                       </p:to>
                                     </p:animClr>
                                   </p:subTnLst>
@@ -13943,7 +13943,7 @@
                                         </p:attrNameLst>
                                       </p:cBhvr>
                                       <p:to>
-                                        <a:srgbClr val="5F5F5F"/>
+                                        <a:srgbClr val="C0C0C0"/>
                                       </p:to>
                                     </p:animClr>
                                   </p:subTnLst>
@@ -14006,7 +14006,7 @@
                                         </p:attrNameLst>
                                       </p:cBhvr>
                                       <p:to>
-                                        <a:srgbClr val="5F5F5F"/>
+                                        <a:srgbClr val="C0C0C0"/>
                                       </p:to>
                                     </p:animClr>
                                   </p:subTnLst>
@@ -14069,7 +14069,7 @@
                                         </p:attrNameLst>
                                       </p:cBhvr>
                                       <p:to>
-                                        <a:srgbClr val="5F5F5F"/>
+                                        <a:srgbClr val="C0C0C0"/>
                                       </p:to>
                                     </p:animClr>
                                   </p:subTnLst>
@@ -14132,7 +14132,7 @@
                                         </p:attrNameLst>
                                       </p:cBhvr>
                                       <p:to>
-                                        <a:srgbClr val="5F5F5F"/>
+                                        <a:srgbClr val="C0C0C0"/>
                                       </p:to>
                                     </p:animClr>
                                   </p:subTnLst>
@@ -14195,7 +14195,7 @@
                                         </p:attrNameLst>
                                       </p:cBhvr>
                                       <p:to>
-                                        <a:srgbClr val="5F5F5F"/>
+                                        <a:srgbClr val="C0C0C0"/>
                                       </p:to>
                                     </p:animClr>
                                   </p:subTnLst>
@@ -14258,7 +14258,7 @@
                                         </p:attrNameLst>
                                       </p:cBhvr>
                                       <p:to>
-                                        <a:srgbClr val="5F5F5F"/>
+                                        <a:srgbClr val="C0C0C0"/>
                                       </p:to>
                                     </p:animClr>
                                   </p:subTnLst>
@@ -14321,7 +14321,7 @@
                                         </p:attrNameLst>
                                       </p:cBhvr>
                                       <p:to>
-                                        <a:srgbClr val="5F5F5F"/>
+                                        <a:srgbClr val="C0C0C0"/>
                                       </p:to>
                                     </p:animClr>
                                   </p:subTnLst>
@@ -14384,7 +14384,7 @@
                                         </p:attrNameLst>
                                       </p:cBhvr>
                                       <p:to>
-                                        <a:srgbClr val="5F5F5F"/>
+                                        <a:srgbClr val="C0C0C0"/>
                                       </p:to>
                                     </p:animClr>
                                   </p:subTnLst>
@@ -14447,7 +14447,7 @@
                                         </p:attrNameLst>
                                       </p:cBhvr>
                                       <p:to>
-                                        <a:srgbClr val="5F5F5F"/>
+                                        <a:srgbClr val="C0C0C0"/>
                                       </p:to>
                                     </p:animClr>
                                   </p:subTnLst>
@@ -15784,21 +15784,7 @@
                 <a:latin typeface="Helvetica World" panose="020B0500040000020004" pitchFamily="34" charset="0"/>
                 <a:cs typeface="Helvetica World" panose="020B0500040000020004" pitchFamily="34" charset="0"/>
               </a:rPr>
-              <a:t> renders in file as partial -		                    </a:t>
-            </a:r>
-            <a:r>
-              <a:rPr lang="en-US" sz="1400" dirty="0">
-                <a:latin typeface="Helvetica World" panose="020B0500040000020004" pitchFamily="34" charset="0"/>
-                <a:cs typeface="Helvetica World" panose="020B0500040000020004" pitchFamily="34" charset="0"/>
-              </a:rPr>
-              <a:t>file will </a:t>
-            </a:r>
-            <a:r>
-              <a:rPr lang="en-US" sz="1400" dirty="0">
-                <a:latin typeface="Helvetica World" panose="020B0500040000020004" pitchFamily="34" charset="0"/>
-                <a:cs typeface="Helvetica World" panose="020B0500040000020004" pitchFamily="34" charset="0"/>
-              </a:rPr>
-              <a:t>NOT compile on it’s own!</a:t>
+              <a:t> renders in file as partial -		                    file will NOT compile on it’s own!</a:t>
             </a:r>
           </a:p>
           <a:p>
@@ -16154,7 +16140,7 @@
                                         </p:attrNameLst>
                                       </p:cBhvr>
                                       <p:to>
-                                        <a:srgbClr val="5F5F5F"/>
+                                        <a:srgbClr val="C0C0C0"/>
                                       </p:to>
                                     </p:animClr>
                                   </p:subTnLst>
@@ -16217,7 +16203,7 @@
                                         </p:attrNameLst>
                                       </p:cBhvr>
                                       <p:to>
-                                        <a:srgbClr val="5F5F5F"/>
+                                        <a:srgbClr val="C0C0C0"/>
                                       </p:to>
                                     </p:animClr>
                                   </p:subTnLst>
@@ -16280,7 +16266,7 @@
                                         </p:attrNameLst>
                                       </p:cBhvr>
                                       <p:to>
-                                        <a:srgbClr val="5F5F5F"/>
+                                        <a:srgbClr val="C0C0C0"/>
                                       </p:to>
                                     </p:animClr>
                                   </p:subTnLst>
@@ -16343,7 +16329,7 @@
                                         </p:attrNameLst>
                                       </p:cBhvr>
                                       <p:to>
-                                        <a:srgbClr val="5F5F5F"/>
+                                        <a:srgbClr val="C0C0C0"/>
                                       </p:to>
                                     </p:animClr>
                                   </p:subTnLst>
@@ -16406,7 +16392,7 @@
                                         </p:attrNameLst>
                                       </p:cBhvr>
                                       <p:to>
-                                        <a:srgbClr val="5F5F5F"/>
+                                        <a:srgbClr val="C0C0C0"/>
                                       </p:to>
                                     </p:animClr>
                                   </p:subTnLst>
@@ -16469,7 +16455,7 @@
                                         </p:attrNameLst>
                                       </p:cBhvr>
                                       <p:to>
-                                        <a:srgbClr val="5F5F5F"/>
+                                        <a:srgbClr val="C0C0C0"/>
                                       </p:to>
                                     </p:animClr>
                                   </p:subTnLst>
@@ -17504,7 +17490,7 @@
                                         </p:attrNameLst>
                                       </p:cBhvr>
                                       <p:to>
-                                        <a:srgbClr val="5F5F5F"/>
+                                        <a:srgbClr val="C0C0C0"/>
                                       </p:to>
                                     </p:animClr>
                                   </p:subTnLst>
@@ -17585,7 +17571,7 @@
                                         </p:attrNameLst>
                                       </p:cBhvr>
                                       <p:to>
-                                        <a:srgbClr val="5F5F5F"/>
+                                        <a:srgbClr val="C0C0C0"/>
                                       </p:to>
                                     </p:animClr>
                                   </p:subTnLst>
@@ -17666,7 +17652,7 @@
                                         </p:attrNameLst>
                                       </p:cBhvr>
                                       <p:to>
-                                        <a:srgbClr val="5F5F5F"/>
+                                        <a:srgbClr val="C0C0C0"/>
                                       </p:to>
                                     </p:animClr>
                                   </p:subTnLst>
@@ -17747,7 +17733,7 @@
                                         </p:attrNameLst>
                                       </p:cBhvr>
                                       <p:to>
-                                        <a:srgbClr val="5F5F5F"/>
+                                        <a:srgbClr val="C0C0C0"/>
                                       </p:to>
                                     </p:animClr>
                                   </p:subTnLst>
@@ -17828,7 +17814,7 @@
                                         </p:attrNameLst>
                                       </p:cBhvr>
                                       <p:to>
-                                        <a:srgbClr val="5F5F5F"/>
+                                        <a:srgbClr val="C0C0C0"/>
                                       </p:to>
                                     </p:animClr>
                                   </p:subTnLst>
@@ -17909,7 +17895,7 @@
                                         </p:attrNameLst>
                                       </p:cBhvr>
                                       <p:to>
-                                        <a:srgbClr val="5F5F5F"/>
+                                        <a:srgbClr val="C0C0C0"/>
                                       </p:to>
                                     </p:animClr>
                                   </p:subTnLst>
@@ -17990,7 +17976,7 @@
                                         </p:attrNameLst>
                                       </p:cBhvr>
                                       <p:to>
-                                        <a:srgbClr val="5F5F5F"/>
+                                        <a:srgbClr val="C0C0C0"/>
                                       </p:to>
                                     </p:animClr>
                                   </p:subTnLst>
@@ -18071,7 +18057,7 @@
                                         </p:attrNameLst>
                                       </p:cBhvr>
                                       <p:to>
-                                        <a:srgbClr val="5F5F5F"/>
+                                        <a:srgbClr val="C0C0C0"/>
                                       </p:to>
                                     </p:animClr>
                                   </p:subTnLst>
@@ -18152,7 +18138,7 @@
                                         </p:attrNameLst>
                                       </p:cBhvr>
                                       <p:to>
-                                        <a:srgbClr val="5F5F5F"/>
+                                        <a:srgbClr val="C0C0C0"/>
                                       </p:to>
                                     </p:animClr>
                                   </p:subTnLst>
@@ -18233,7 +18219,7 @@
                                         </p:attrNameLst>
                                       </p:cBhvr>
                                       <p:to>
-                                        <a:srgbClr val="5F5F5F"/>
+                                        <a:srgbClr val="C0C0C0"/>
                                       </p:to>
                                     </p:animClr>
                                   </p:subTnLst>
@@ -18314,7 +18300,7 @@
                                         </p:attrNameLst>
                                       </p:cBhvr>
                                       <p:to>
-                                        <a:srgbClr val="5F5F5F"/>
+                                        <a:srgbClr val="C0C0C0"/>
                                       </p:to>
                                     </p:animClr>
                                   </p:subTnLst>
@@ -18395,7 +18381,7 @@
                                         </p:attrNameLst>
                                       </p:cBhvr>
                                       <p:to>
-                                        <a:srgbClr val="5F5F5F"/>
+                                        <a:srgbClr val="C0C0C0"/>
                                       </p:to>
                                     </p:animClr>
                                   </p:subTnLst>
@@ -18476,7 +18462,7 @@
                                         </p:attrNameLst>
                                       </p:cBhvr>
                                       <p:to>
-                                        <a:srgbClr val="5F5F5F"/>
+                                        <a:srgbClr val="C0C0C0"/>
                                       </p:to>
                                     </p:animClr>
                                   </p:subTnLst>
@@ -18557,7 +18543,7 @@
                                         </p:attrNameLst>
                                       </p:cBhvr>
                                       <p:to>
-                                        <a:srgbClr val="5F5F5F"/>
+                                        <a:srgbClr val="C0C0C0"/>
                                       </p:to>
                                     </p:animClr>
                                   </p:subTnLst>
@@ -18638,7 +18624,7 @@
                                         </p:attrNameLst>
                                       </p:cBhvr>
                                       <p:to>
-                                        <a:srgbClr val="5F5F5F"/>
+                                        <a:srgbClr val="C0C0C0"/>
                                       </p:to>
                                     </p:animClr>
                                   </p:subTnLst>
@@ -19539,7 +19525,7 @@
                                         </p:attrNameLst>
                                       </p:cBhvr>
                                       <p:to>
-                                        <a:srgbClr val="5F5F5F"/>
+                                        <a:srgbClr val="C0C0C0"/>
                                       </p:to>
                                     </p:animClr>
                                   </p:subTnLst>
@@ -19620,7 +19606,7 @@
                                         </p:attrNameLst>
                                       </p:cBhvr>
                                       <p:to>
-                                        <a:srgbClr val="5F5F5F"/>
+                                        <a:srgbClr val="C0C0C0"/>
                                       </p:to>
                                     </p:animClr>
                                   </p:subTnLst>
@@ -19701,7 +19687,7 @@
                                         </p:attrNameLst>
                                       </p:cBhvr>
                                       <p:to>
-                                        <a:srgbClr val="5F5F5F"/>
+                                        <a:srgbClr val="C0C0C0"/>
                                       </p:to>
                                     </p:animClr>
                                   </p:subTnLst>
@@ -19782,7 +19768,7 @@
                                         </p:attrNameLst>
                                       </p:cBhvr>
                                       <p:to>
-                                        <a:srgbClr val="5F5F5F"/>
+                                        <a:srgbClr val="C0C0C0"/>
                                       </p:to>
                                     </p:animClr>
                                   </p:subTnLst>
@@ -19863,7 +19849,7 @@
                                         </p:attrNameLst>
                                       </p:cBhvr>
                                       <p:to>
-                                        <a:srgbClr val="5F5F5F"/>
+                                        <a:srgbClr val="C0C0C0"/>
                                       </p:to>
                                     </p:animClr>
                                   </p:subTnLst>
@@ -20343,7 +20329,7 @@
 </file>
 
 <file path=ppt/slides/slide2.xml><?xml version="1.0" encoding="utf-8"?>
-<p:sld xmlns:a="http://schemas.openxmlformats.org/drawingml/2006/main" xmlns:r="http://schemas.openxmlformats.org/officeDocument/2006/relationships" xmlns:p="http://schemas.openxmlformats.org/presentationml/2006/main">
+<p:sld xmlns:a="http://schemas.openxmlformats.org/drawingml/2006/main" xmlns:r="http://schemas.openxmlformats.org/officeDocument/2006/relationships" xmlns:p="http://schemas.openxmlformats.org/presentationml/2006/main" show="0">
   <p:cSld>
     <p:spTree>
       <p:nvGrpSpPr>
@@ -20465,7 +20451,7 @@
 </file>
 
 <file path=ppt/slides/slide3.xml><?xml version="1.0" encoding="utf-8"?>
-<p:sld xmlns:a="http://schemas.openxmlformats.org/drawingml/2006/main" xmlns:r="http://schemas.openxmlformats.org/officeDocument/2006/relationships" xmlns:p="http://schemas.openxmlformats.org/presentationml/2006/main">
+<p:sld xmlns:a="http://schemas.openxmlformats.org/drawingml/2006/main" xmlns:r="http://schemas.openxmlformats.org/officeDocument/2006/relationships" xmlns:p="http://schemas.openxmlformats.org/presentationml/2006/main" show="0">
   <p:cSld>
     <p:spTree>
       <p:nvGrpSpPr>
@@ -21703,7 +21689,7 @@
                                         </p:attrNameLst>
                                       </p:cBhvr>
                                       <p:to>
-                                        <a:srgbClr val="5F5F5F"/>
+                                        <a:srgbClr val="C0C0C0"/>
                                       </p:to>
                                     </p:animClr>
                                   </p:subTnLst>
@@ -21784,7 +21770,7 @@
                                         </p:attrNameLst>
                                       </p:cBhvr>
                                       <p:to>
-                                        <a:srgbClr val="5F5F5F"/>
+                                        <a:srgbClr val="C0C0C0"/>
                                       </p:to>
                                     </p:animClr>
                                   </p:subTnLst>
@@ -21865,7 +21851,7 @@
                                         </p:attrNameLst>
                                       </p:cBhvr>
                                       <p:to>
-                                        <a:srgbClr val="5F5F5F"/>
+                                        <a:srgbClr val="C0C0C0"/>
                                       </p:to>
                                     </p:animClr>
                                   </p:subTnLst>
@@ -21946,7 +21932,7 @@
                                         </p:attrNameLst>
                                       </p:cBhvr>
                                       <p:to>
-                                        <a:srgbClr val="5F5F5F"/>
+                                        <a:srgbClr val="C0C0C0"/>
                                       </p:to>
                                     </p:animClr>
                                   </p:subTnLst>
@@ -22027,7 +22013,7 @@
                                         </p:attrNameLst>
                                       </p:cBhvr>
                                       <p:to>
-                                        <a:srgbClr val="5F5F5F"/>
+                                        <a:srgbClr val="C0C0C0"/>
                                       </p:to>
                                     </p:animClr>
                                   </p:subTnLst>
@@ -22108,7 +22094,7 @@
                                         </p:attrNameLst>
                                       </p:cBhvr>
                                       <p:to>
-                                        <a:srgbClr val="5F5F5F"/>
+                                        <a:srgbClr val="C0C0C0"/>
                                       </p:to>
                                     </p:animClr>
                                   </p:subTnLst>
@@ -22189,7 +22175,7 @@
                                         </p:attrNameLst>
                                       </p:cBhvr>
                                       <p:to>
-                                        <a:srgbClr val="5F5F5F"/>
+                                        <a:srgbClr val="C0C0C0"/>
                                       </p:to>
                                     </p:animClr>
                                   </p:subTnLst>
@@ -22270,7 +22256,7 @@
                                         </p:attrNameLst>
                                       </p:cBhvr>
                                       <p:to>
-                                        <a:srgbClr val="5F5F5F"/>
+                                        <a:srgbClr val="C0C0C0"/>
                                       </p:to>
                                     </p:animClr>
                                   </p:subTnLst>
@@ -22351,7 +22337,7 @@
                                         </p:attrNameLst>
                                       </p:cBhvr>
                                       <p:to>
-                                        <a:srgbClr val="5F5F5F"/>
+                                        <a:srgbClr val="C0C0C0"/>
                                       </p:to>
                                     </p:animClr>
                                   </p:subTnLst>
@@ -22432,7 +22418,7 @@
                                         </p:attrNameLst>
                                       </p:cBhvr>
                                       <p:to>
-                                        <a:srgbClr val="5F5F5F"/>
+                                        <a:srgbClr val="C0C0C0"/>
                                       </p:to>
                                     </p:animClr>
                                   </p:subTnLst>
@@ -22513,7 +22499,7 @@
                                         </p:attrNameLst>
                                       </p:cBhvr>
                                       <p:to>
-                                        <a:srgbClr val="5F5F5F"/>
+                                        <a:srgbClr val="C0C0C0"/>
                                       </p:to>
                                     </p:animClr>
                                   </p:subTnLst>
@@ -22594,7 +22580,7 @@
                                         </p:attrNameLst>
                                       </p:cBhvr>
                                       <p:to>
-                                        <a:srgbClr val="5F5F5F"/>
+                                        <a:srgbClr val="C0C0C0"/>
                                       </p:to>
                                     </p:animClr>
                                   </p:subTnLst>
@@ -23117,7 +23103,7 @@
                                         </p:attrNameLst>
                                       </p:cBhvr>
                                       <p:to>
-                                        <a:srgbClr val="5F5F5F"/>
+                                        <a:srgbClr val="C0C0C0"/>
                                       </p:to>
                                     </p:animClr>
                                   </p:subTnLst>
@@ -23198,7 +23184,7 @@
                                         </p:attrNameLst>
                                       </p:cBhvr>
                                       <p:to>
-                                        <a:srgbClr val="5F5F5F"/>
+                                        <a:srgbClr val="C0C0C0"/>
                                       </p:to>
                                     </p:animClr>
                                   </p:subTnLst>
@@ -23279,7 +23265,7 @@
                                         </p:attrNameLst>
                                       </p:cBhvr>
                                       <p:to>
-                                        <a:srgbClr val="5F5F5F"/>
+                                        <a:srgbClr val="C0C0C0"/>
                                       </p:to>
                                     </p:animClr>
                                   </p:subTnLst>
@@ -23360,7 +23346,7 @@
                                         </p:attrNameLst>
                                       </p:cBhvr>
                                       <p:to>
-                                        <a:srgbClr val="5F5F5F"/>
+                                        <a:srgbClr val="C0C0C0"/>
                                       </p:to>
                                     </p:animClr>
                                   </p:subTnLst>
@@ -23441,7 +23427,7 @@
                                         </p:attrNameLst>
                                       </p:cBhvr>
                                       <p:to>
-                                        <a:srgbClr val="5F5F5F"/>
+                                        <a:srgbClr val="C0C0C0"/>
                                       </p:to>
                                     </p:animClr>
                                   </p:subTnLst>
@@ -23522,7 +23508,7 @@
                                         </p:attrNameLst>
                                       </p:cBhvr>
                                       <p:to>
-                                        <a:srgbClr val="5F5F5F"/>
+                                        <a:srgbClr val="C0C0C0"/>
                                       </p:to>
                                     </p:animClr>
                                   </p:subTnLst>
@@ -24355,7 +24341,7 @@
                                         </p:attrNameLst>
                                       </p:cBhvr>
                                       <p:to>
-                                        <a:srgbClr val="5F5F5F"/>
+                                        <a:srgbClr val="C0C0C0"/>
                                       </p:to>
                                     </p:animClr>
                                   </p:subTnLst>
@@ -24418,7 +24404,7 @@
                                         </p:attrNameLst>
                                       </p:cBhvr>
                                       <p:to>
-                                        <a:srgbClr val="5F5F5F"/>
+                                        <a:srgbClr val="C0C0C0"/>
                                       </p:to>
                                     </p:animClr>
                                   </p:subTnLst>
@@ -24481,7 +24467,7 @@
                                         </p:attrNameLst>
                                       </p:cBhvr>
                                       <p:to>
-                                        <a:srgbClr val="5F5F5F"/>
+                                        <a:srgbClr val="C0C0C0"/>
                                       </p:to>
                                     </p:animClr>
                                   </p:subTnLst>
@@ -24544,7 +24530,7 @@
                                         </p:attrNameLst>
                                       </p:cBhvr>
                                       <p:to>
-                                        <a:srgbClr val="5F5F5F"/>
+                                        <a:srgbClr val="C0C0C0"/>
                                       </p:to>
                                     </p:animClr>
                                   </p:subTnLst>
@@ -24607,7 +24593,7 @@
                                         </p:attrNameLst>
                                       </p:cBhvr>
                                       <p:to>
-                                        <a:srgbClr val="5F5F5F"/>
+                                        <a:srgbClr val="C0C0C0"/>
                                       </p:to>
                                     </p:animClr>
                                   </p:subTnLst>
@@ -24670,7 +24656,7 @@
                                         </p:attrNameLst>
                                       </p:cBhvr>
                                       <p:to>
-                                        <a:srgbClr val="5F5F5F"/>
+                                        <a:srgbClr val="C0C0C0"/>
                                       </p:to>
                                     </p:animClr>
                                   </p:subTnLst>
@@ -24733,7 +24719,7 @@
                                         </p:attrNameLst>
                                       </p:cBhvr>
                                       <p:to>
-                                        <a:srgbClr val="5F5F5F"/>
+                                        <a:srgbClr val="C0C0C0"/>
                                       </p:to>
                                     </p:animClr>
                                   </p:subTnLst>
@@ -24796,7 +24782,7 @@
                                         </p:attrNameLst>
                                       </p:cBhvr>
                                       <p:to>
-                                        <a:srgbClr val="5F5F5F"/>
+                                        <a:srgbClr val="C0C0C0"/>
                                       </p:to>
                                     </p:animClr>
                                   </p:subTnLst>
@@ -24877,7 +24863,7 @@
                                         </p:attrNameLst>
                                       </p:cBhvr>
                                       <p:to>
-                                        <a:srgbClr val="5F5F5F"/>
+                                        <a:srgbClr val="C0C0C0"/>
                                       </p:to>
                                     </p:animClr>
                                   </p:subTnLst>
@@ -24940,7 +24926,7 @@
                                         </p:attrNameLst>
                                       </p:cBhvr>
                                       <p:to>
-                                        <a:srgbClr val="5F5F5F"/>
+                                        <a:srgbClr val="C0C0C0"/>
                                       </p:to>
                                     </p:animClr>
                                   </p:subTnLst>
@@ -25003,7 +24989,7 @@
                                         </p:attrNameLst>
                                       </p:cBhvr>
                                       <p:to>
-                                        <a:srgbClr val="5F5F5F"/>
+                                        <a:srgbClr val="C0C0C0"/>
                                       </p:to>
                                     </p:animClr>
                                   </p:subTnLst>
@@ -25066,7 +25052,7 @@
                                         </p:attrNameLst>
                                       </p:cBhvr>
                                       <p:to>
-                                        <a:srgbClr val="5F5F5F"/>
+                                        <a:srgbClr val="C0C0C0"/>
                                       </p:to>
                                     </p:animClr>
                                   </p:subTnLst>
@@ -25129,7 +25115,7 @@
                                         </p:attrNameLst>
                                       </p:cBhvr>
                                       <p:to>
-                                        <a:srgbClr val="5F5F5F"/>
+                                        <a:srgbClr val="C0C0C0"/>
                                       </p:to>
                                     </p:animClr>
                                   </p:subTnLst>
@@ -25192,7 +25178,7 @@
                                         </p:attrNameLst>
                                       </p:cBhvr>
                                       <p:to>
-                                        <a:srgbClr val="5F5F5F"/>
+                                        <a:srgbClr val="C0C0C0"/>
                                       </p:to>
                                     </p:animClr>
                                   </p:subTnLst>
@@ -25255,7 +25241,7 @@
                                         </p:attrNameLst>
                                       </p:cBhvr>
                                       <p:to>
-                                        <a:srgbClr val="5F5F5F"/>
+                                        <a:srgbClr val="C0C0C0"/>
                                       </p:to>
                                     </p:animClr>
                                   </p:subTnLst>
@@ -25318,7 +25304,7 @@
                                         </p:attrNameLst>
                                       </p:cBhvr>
                                       <p:to>
-                                        <a:srgbClr val="5F5F5F"/>
+                                        <a:srgbClr val="C0C0C0"/>
                                       </p:to>
                                     </p:animClr>
                                   </p:subTnLst>
@@ -26618,7 +26604,7 @@
                                         </p:attrNameLst>
                                       </p:cBhvr>
                                       <p:to>
-                                        <a:srgbClr val="5F5F5F"/>
+                                        <a:srgbClr val="C0C0C0"/>
                                       </p:to>
                                     </p:animClr>
                                   </p:subTnLst>
@@ -26681,7 +26667,7 @@
                                         </p:attrNameLst>
                                       </p:cBhvr>
                                       <p:to>
-                                        <a:srgbClr val="5F5F5F"/>
+                                        <a:srgbClr val="C0C0C0"/>
                                       </p:to>
                                     </p:animClr>
                                   </p:subTnLst>
@@ -26744,7 +26730,7 @@
                                         </p:attrNameLst>
                                       </p:cBhvr>
                                       <p:to>
-                                        <a:srgbClr val="5F5F5F"/>
+                                        <a:srgbClr val="C0C0C0"/>
                                       </p:to>
                                     </p:animClr>
                                   </p:subTnLst>
@@ -26807,7 +26793,7 @@
                                         </p:attrNameLst>
                                       </p:cBhvr>
                                       <p:to>
-                                        <a:srgbClr val="5F5F5F"/>
+                                        <a:srgbClr val="C0C0C0"/>
                                       </p:to>
                                     </p:animClr>
                                   </p:subTnLst>
@@ -26870,7 +26856,7 @@
                                         </p:attrNameLst>
                                       </p:cBhvr>
                                       <p:to>
-                                        <a:srgbClr val="5F5F5F"/>
+                                        <a:srgbClr val="C0C0C0"/>
                                       </p:to>
                                     </p:animClr>
                                   </p:subTnLst>
@@ -26933,7 +26919,7 @@
                                         </p:attrNameLst>
                                       </p:cBhvr>
                                       <p:to>
-                                        <a:srgbClr val="5F5F5F"/>
+                                        <a:srgbClr val="C0C0C0"/>
                                       </p:to>
                                     </p:animClr>
                                   </p:subTnLst>
@@ -26996,7 +26982,7 @@
                                         </p:attrNameLst>
                                       </p:cBhvr>
                                       <p:to>
-                                        <a:srgbClr val="5F5F5F"/>
+                                        <a:srgbClr val="C0C0C0"/>
                                       </p:to>
                                     </p:animClr>
                                   </p:subTnLst>
@@ -27059,7 +27045,7 @@
                                         </p:attrNameLst>
                                       </p:cBhvr>
                                       <p:to>
-                                        <a:srgbClr val="5F5F5F"/>
+                                        <a:srgbClr val="C0C0C0"/>
                                       </p:to>
                                     </p:animClr>
                                   </p:subTnLst>
@@ -27122,7 +27108,7 @@
                                         </p:attrNameLst>
                                       </p:cBhvr>
                                       <p:to>
-                                        <a:srgbClr val="5F5F5F"/>
+                                        <a:srgbClr val="C0C0C0"/>
                                       </p:to>
                                     </p:animClr>
                                   </p:subTnLst>
@@ -27185,7 +27171,7 @@
                                         </p:attrNameLst>
                                       </p:cBhvr>
                                       <p:to>
-                                        <a:srgbClr val="5F5F5F"/>
+                                        <a:srgbClr val="C0C0C0"/>
                                       </p:to>
                                     </p:animClr>
                                   </p:subTnLst>
@@ -27248,7 +27234,7 @@
                                         </p:attrNameLst>
                                       </p:cBhvr>
                                       <p:to>
-                                        <a:srgbClr val="5F5F5F"/>
+                                        <a:srgbClr val="C0C0C0"/>
                                       </p:to>
                                     </p:animClr>
                                   </p:subTnLst>
@@ -27311,7 +27297,7 @@
                                         </p:attrNameLst>
                                       </p:cBhvr>
                                       <p:to>
-                                        <a:srgbClr val="5F5F5F"/>
+                                        <a:srgbClr val="C0C0C0"/>
                                       </p:to>
                                     </p:animClr>
                                   </p:subTnLst>
@@ -27392,7 +27378,7 @@
                                         </p:attrNameLst>
                                       </p:cBhvr>
                                       <p:to>
-                                        <a:srgbClr val="5F5F5F"/>
+                                        <a:srgbClr val="C0C0C0"/>
                                       </p:to>
                                     </p:animClr>
                                   </p:subTnLst>
@@ -27455,7 +27441,7 @@
                                         </p:attrNameLst>
                                       </p:cBhvr>
                                       <p:to>
-                                        <a:srgbClr val="5F5F5F"/>
+                                        <a:srgbClr val="C0C0C0"/>
                                       </p:to>
                                     </p:animClr>
                                   </p:subTnLst>
@@ -27518,7 +27504,7 @@
                                         </p:attrNameLst>
                                       </p:cBhvr>
                                       <p:to>
-                                        <a:srgbClr val="5F5F5F"/>
+                                        <a:srgbClr val="C0C0C0"/>
                                       </p:to>
                                     </p:animClr>
                                   </p:subTnLst>
@@ -27581,7 +27567,7 @@
                                         </p:attrNameLst>
                                       </p:cBhvr>
                                       <p:to>
-                                        <a:srgbClr val="5F5F5F"/>
+                                        <a:srgbClr val="C0C0C0"/>
                                       </p:to>
                                     </p:animClr>
                                   </p:subTnLst>
@@ -27644,7 +27630,7 @@
                                         </p:attrNameLst>
                                       </p:cBhvr>
                                       <p:to>
-                                        <a:srgbClr val="5F5F5F"/>
+                                        <a:srgbClr val="C0C0C0"/>
                                       </p:to>
                                     </p:animClr>
                                   </p:subTnLst>
@@ -27707,7 +27693,7 @@
                                         </p:attrNameLst>
                                       </p:cBhvr>
                                       <p:to>
-                                        <a:srgbClr val="5F5F5F"/>
+                                        <a:srgbClr val="C0C0C0"/>
                                       </p:to>
                                     </p:animClr>
                                   </p:subTnLst>
@@ -27770,7 +27756,7 @@
                                         </p:attrNameLst>
                                       </p:cBhvr>
                                       <p:to>
-                                        <a:srgbClr val="5F5F5F"/>
+                                        <a:srgbClr val="C0C0C0"/>
                                       </p:to>
                                     </p:animClr>
                                   </p:subTnLst>
@@ -27833,7 +27819,7 @@
                                         </p:attrNameLst>
                                       </p:cBhvr>
                                       <p:to>
-                                        <a:srgbClr val="5F5F5F"/>
+                                        <a:srgbClr val="C0C0C0"/>
                                       </p:to>
                                     </p:animClr>
                                   </p:subTnLst>

</xml_diff>

<commit_message>
Updated link to demo in presentation.
</commit_message>
<xml_diff>
--- a/Presentation.pptx
+++ b/Presentation.pptx
@@ -244,7 +244,7 @@
           <a:p>
             <a:fld id="{F1E7F302-49C3-4BD7-94C0-CFE016F79F0F}" type="datetimeFigureOut">
               <a:rPr lang="sv-SE" smtClean="0"/>
-              <a:t>2017-02-22</a:t>
+              <a:t>2017-02-23</a:t>
             </a:fld>
             <a:endParaRPr lang="sv-SE"/>
           </a:p>
@@ -1429,7 +1429,7 @@
           <a:p>
             <a:fld id="{C706582F-A7DF-4EE7-AB3D-B13882602CD1}" type="datetimeFigureOut">
               <a:rPr lang="sv-SE" smtClean="0"/>
-              <a:t>2017-02-22</a:t>
+              <a:t>2017-02-23</a:t>
             </a:fld>
             <a:endParaRPr lang="sv-SE"/>
           </a:p>
@@ -1609,7 +1609,7 @@
           <a:p>
             <a:fld id="{C706582F-A7DF-4EE7-AB3D-B13882602CD1}" type="datetimeFigureOut">
               <a:rPr lang="sv-SE" smtClean="0"/>
-              <a:t>2017-02-22</a:t>
+              <a:t>2017-02-23</a:t>
             </a:fld>
             <a:endParaRPr lang="sv-SE"/>
           </a:p>
@@ -1799,7 +1799,7 @@
           <a:p>
             <a:fld id="{C706582F-A7DF-4EE7-AB3D-B13882602CD1}" type="datetimeFigureOut">
               <a:rPr lang="sv-SE" smtClean="0"/>
-              <a:t>2017-02-22</a:t>
+              <a:t>2017-02-23</a:t>
             </a:fld>
             <a:endParaRPr lang="sv-SE"/>
           </a:p>
@@ -1979,7 +1979,7 @@
           <a:p>
             <a:fld id="{C706582F-A7DF-4EE7-AB3D-B13882602CD1}" type="datetimeFigureOut">
               <a:rPr lang="sv-SE" smtClean="0"/>
-              <a:t>2017-02-22</a:t>
+              <a:t>2017-02-23</a:t>
             </a:fld>
             <a:endParaRPr lang="sv-SE"/>
           </a:p>
@@ -2236,7 +2236,7 @@
           <a:p>
             <a:fld id="{C706582F-A7DF-4EE7-AB3D-B13882602CD1}" type="datetimeFigureOut">
               <a:rPr lang="sv-SE" smtClean="0"/>
-              <a:t>2017-02-22</a:t>
+              <a:t>2017-02-23</a:t>
             </a:fld>
             <a:endParaRPr lang="sv-SE"/>
           </a:p>
@@ -2477,7 +2477,7 @@
           <a:p>
             <a:fld id="{C706582F-A7DF-4EE7-AB3D-B13882602CD1}" type="datetimeFigureOut">
               <a:rPr lang="sv-SE" smtClean="0"/>
-              <a:t>2017-02-22</a:t>
+              <a:t>2017-02-23</a:t>
             </a:fld>
             <a:endParaRPr lang="sv-SE"/>
           </a:p>
@@ -2853,7 +2853,7 @@
           <a:p>
             <a:fld id="{C706582F-A7DF-4EE7-AB3D-B13882602CD1}" type="datetimeFigureOut">
               <a:rPr lang="sv-SE" smtClean="0"/>
-              <a:t>2017-02-22</a:t>
+              <a:t>2017-02-23</a:t>
             </a:fld>
             <a:endParaRPr lang="sv-SE"/>
           </a:p>
@@ -2982,7 +2982,7 @@
           <a:p>
             <a:fld id="{C706582F-A7DF-4EE7-AB3D-B13882602CD1}" type="datetimeFigureOut">
               <a:rPr lang="sv-SE" smtClean="0"/>
-              <a:t>2017-02-22</a:t>
+              <a:t>2017-02-23</a:t>
             </a:fld>
             <a:endParaRPr lang="sv-SE"/>
           </a:p>
@@ -3089,7 +3089,7 @@
           <a:p>
             <a:fld id="{C706582F-A7DF-4EE7-AB3D-B13882602CD1}" type="datetimeFigureOut">
               <a:rPr lang="sv-SE" smtClean="0"/>
-              <a:t>2017-02-22</a:t>
+              <a:t>2017-02-23</a:t>
             </a:fld>
             <a:endParaRPr lang="sv-SE"/>
           </a:p>
@@ -3376,7 +3376,7 @@
           <a:p>
             <a:fld id="{C706582F-A7DF-4EE7-AB3D-B13882602CD1}" type="datetimeFigureOut">
               <a:rPr lang="sv-SE" smtClean="0"/>
-              <a:t>2017-02-22</a:t>
+              <a:t>2017-02-23</a:t>
             </a:fld>
             <a:endParaRPr lang="sv-SE"/>
           </a:p>
@@ -3640,7 +3640,7 @@
           <a:p>
             <a:fld id="{C706582F-A7DF-4EE7-AB3D-B13882602CD1}" type="datetimeFigureOut">
               <a:rPr lang="sv-SE" smtClean="0"/>
-              <a:t>2017-02-22</a:t>
+              <a:t>2017-02-23</a:t>
             </a:fld>
             <a:endParaRPr lang="sv-SE"/>
           </a:p>
@@ -3863,7 +3863,7 @@
           <a:p>
             <a:fld id="{C706582F-A7DF-4EE7-AB3D-B13882602CD1}" type="datetimeFigureOut">
               <a:rPr lang="sv-SE" smtClean="0"/>
-              <a:t>2017-02-22</a:t>
+              <a:t>2017-02-23</a:t>
             </a:fld>
             <a:endParaRPr lang="sv-SE"/>
           </a:p>
@@ -18744,66 +18744,6 @@
       </p:grpSpPr>
       <p:sp>
         <p:nvSpPr>
-          <p:cNvPr id="10" name="Rubrik 1"/>
-          <p:cNvSpPr txBox="1">
-            <a:spLocks/>
-          </p:cNvSpPr>
-          <p:nvPr/>
-        </p:nvSpPr>
-        <p:spPr>
-          <a:xfrm>
-            <a:off x="2577142" y="5163360"/>
-            <a:ext cx="7037717" cy="502137"/>
-          </a:xfrm>
-          <a:prstGeom prst="rect">
-            <a:avLst/>
-          </a:prstGeom>
-        </p:spPr>
-        <p:txBody>
-          <a:bodyPr vert="horz" lIns="91440" tIns="45720" rIns="91440" bIns="45720" rtlCol="0" anchor="b">
-            <a:normAutofit lnSpcReduction="10000"/>
-          </a:bodyPr>
-          <a:lstStyle>
-            <a:lvl1pPr algn="ctr" defTabSz="914400" rtl="0" eaLnBrk="1" latinLnBrk="0" hangingPunct="1">
-              <a:lnSpc>
-                <a:spcPct val="90000"/>
-              </a:lnSpc>
-              <a:spcBef>
-                <a:spcPct val="0"/>
-              </a:spcBef>
-              <a:buNone/>
-              <a:defRPr sz="6000" kern="1200">
-                <a:solidFill>
-                  <a:schemeClr val="tx1"/>
-                </a:solidFill>
-                <a:latin typeface="+mj-lt"/>
-                <a:ea typeface="+mj-ea"/>
-                <a:cs typeface="+mj-cs"/>
-              </a:defRPr>
-            </a:lvl1pPr>
-          </a:lstStyle>
-          <a:p>
-            <a:r>
-              <a:rPr lang="sv-SE" sz="3200" dirty="0">
-                <a:latin typeface="HelveticaRounded LT Std Bd" panose="020F0804030503020204"/>
-                <a:hlinkClick r:id="rId2"/>
-              </a:rPr>
-              <a:t>http://tinyurl.com/swetugg-sass</a:t>
-            </a:r>
-            <a:r>
-              <a:rPr lang="sv-SE" sz="3200" dirty="0">
-                <a:latin typeface="HelveticaRounded LT Std Bd" panose="020F0804030503020204"/>
-              </a:rPr>
-              <a:t> </a:t>
-            </a:r>
-            <a:endParaRPr lang="en-US" sz="3200" dirty="0">
-              <a:latin typeface="HelveticaRounded LT Std Bd" panose="020F0804030503020204"/>
-            </a:endParaRPr>
-          </a:p>
-        </p:txBody>
-      </p:sp>
-      <p:sp>
-        <p:nvSpPr>
           <p:cNvPr id="11" name="Rubrik 1"/>
           <p:cNvSpPr txBox="1">
             <a:spLocks/>
@@ -19120,7 +19060,7 @@
           <p:nvPr/>
         </p:nvPicPr>
         <p:blipFill>
-          <a:blip r:embed="rId3" cstate="print">
+          <a:blip r:embed="rId2" cstate="print">
             <a:extLst>
               <a:ext uri="{28A0092B-C50C-407E-A947-70E740481C1C}">
                 <a14:useLocalDpi xmlns:a14="http://schemas.microsoft.com/office/drawing/2010/main" val="0"/>
@@ -19150,7 +19090,7 @@
           <p:nvPr/>
         </p:nvPicPr>
         <p:blipFill>
-          <a:blip r:embed="rId4" cstate="print">
+          <a:blip r:embed="rId3" cstate="print">
             <a:extLst>
               <a:ext uri="{28A0092B-C50C-407E-A947-70E740481C1C}">
                 <a14:useLocalDpi xmlns:a14="http://schemas.microsoft.com/office/drawing/2010/main" val="0"/>
@@ -19171,6 +19111,60 @@
           </a:prstGeom>
         </p:spPr>
       </p:pic>
+      <p:sp>
+        <p:nvSpPr>
+          <p:cNvPr id="12" name="Rubrik 1"/>
+          <p:cNvSpPr txBox="1">
+            <a:spLocks/>
+          </p:cNvSpPr>
+          <p:nvPr/>
+        </p:nvSpPr>
+        <p:spPr>
+          <a:xfrm>
+            <a:off x="2577142" y="5163360"/>
+            <a:ext cx="7037717" cy="502137"/>
+          </a:xfrm>
+          <a:prstGeom prst="rect">
+            <a:avLst/>
+          </a:prstGeom>
+        </p:spPr>
+        <p:txBody>
+          <a:bodyPr vert="horz" lIns="91440" tIns="45720" rIns="91440" bIns="45720" rtlCol="0" anchor="b">
+            <a:normAutofit lnSpcReduction="10000"/>
+          </a:bodyPr>
+          <a:lstStyle>
+            <a:lvl1pPr algn="ctr" defTabSz="914400" rtl="0" eaLnBrk="1" latinLnBrk="0" hangingPunct="1">
+              <a:lnSpc>
+                <a:spcPct val="90000"/>
+              </a:lnSpc>
+              <a:spcBef>
+                <a:spcPct val="0"/>
+              </a:spcBef>
+              <a:buNone/>
+              <a:defRPr sz="6000" kern="1200">
+                <a:solidFill>
+                  <a:schemeClr val="tx1"/>
+                </a:solidFill>
+                <a:latin typeface="+mj-lt"/>
+                <a:ea typeface="+mj-ea"/>
+                <a:cs typeface="+mj-cs"/>
+              </a:defRPr>
+            </a:lvl1pPr>
+          </a:lstStyle>
+          <a:p>
+            <a:r>
+              <a:rPr lang="sv-SE" sz="3200" dirty="0">
+                <a:latin typeface="HelveticaRounded LT Std Bd" panose="020F0804030503020204"/>
+                <a:hlinkClick r:id="rId4"/>
+              </a:rPr>
+              <a:t>http://jobb.stellanlindell.se/sass/</a:t>
+            </a:r>
+            <a:endParaRPr lang="en-US" sz="3200" dirty="0">
+              <a:latin typeface="HelveticaRounded LT Std Bd" panose="020F0804030503020204"/>
+            </a:endParaRPr>
+          </a:p>
+        </p:txBody>
+      </p:sp>
     </p:spTree>
     <p:extLst>
       <p:ext uri="{BB962C8B-B14F-4D97-AF65-F5344CB8AC3E}">
@@ -19323,21 +19317,7 @@
                 <a:latin typeface="Helvetica World" panose="020B0500040000020004" pitchFamily="34" charset="0"/>
                 <a:cs typeface="Helvetica World" panose="020B0500040000020004" pitchFamily="34" charset="0"/>
               </a:rPr>
-              <a:t>Live-Reload for SASS, JavaScript and HTML </a:t>
-            </a:r>
-            <a:r>
-              <a:rPr lang="en-US" sz="2400">
-                <a:latin typeface="Helvetica World" panose="020B0500040000020004" pitchFamily="34" charset="0"/>
-                <a:cs typeface="Helvetica World" panose="020B0500040000020004" pitchFamily="34" charset="0"/>
-              </a:rPr>
-              <a:t>– even remote </a:t>
-            </a:r>
-            <a:r>
-              <a:rPr lang="en-US" sz="2400" dirty="0">
-                <a:latin typeface="Helvetica World" panose="020B0500040000020004" pitchFamily="34" charset="0"/>
-                <a:cs typeface="Helvetica World" panose="020B0500040000020004" pitchFamily="34" charset="0"/>
-              </a:rPr>
-              <a:t>(mobile).</a:t>
+              <a:t>Live-Reload for SASS, JavaScript and HTML – even remote (mobile).</a:t>
             </a:r>
           </a:p>
           <a:p>
@@ -19412,13 +19392,7 @@
                 <a:latin typeface="HelveticaRounded LT Std Bd" panose="020F0804030503020204"/>
                 <a:hlinkClick r:id="rId2"/>
               </a:rPr>
-              <a:t>http://tinyurl.com/swetugg-sass</a:t>
-            </a:r>
-            <a:r>
-              <a:rPr lang="sv-SE" sz="3200" dirty="0">
-                <a:latin typeface="HelveticaRounded LT Std Bd" panose="020F0804030503020204"/>
-              </a:rPr>
-              <a:t> </a:t>
+              <a:t>http://jobb.stellanlindell.se/sass/</a:t>
             </a:r>
             <a:endParaRPr lang="en-US" sz="3200" dirty="0">
               <a:latin typeface="HelveticaRounded LT Std Bd" panose="020F0804030503020204"/>
@@ -29033,6 +29007,12 @@
 </file>
 
 <file path=customXml/item1.xml><?xml version="1.0" encoding="utf-8"?>
+<p:properties xmlns:p="http://schemas.microsoft.com/office/2006/metadata/properties" xmlns:xsi="http://www.w3.org/2001/XMLSchema-instance" xmlns:pc="http://schemas.microsoft.com/office/infopath/2007/PartnerControls">
+  <documentManagement/>
+</p:properties>
+</file>
+
+<file path=customXml/item2.xml><?xml version="1.0" encoding="utf-8"?>
 <?mso-contentType ?>
 <FormTemplates xmlns="http://schemas.microsoft.com/sharepoint/v3/contenttype/forms">
   <Display>DocumentLibraryForm</Display>
@@ -29041,25 +29021,7 @@
 </FormTemplates>
 </file>
 
-<file path=customXml/item2.xml><?xml version="1.0" encoding="utf-8"?>
-<p:properties xmlns:p="http://schemas.microsoft.com/office/2006/metadata/properties" xmlns:xsi="http://www.w3.org/2001/XMLSchema-instance" xmlns:pc="http://schemas.microsoft.com/office/infopath/2007/PartnerControls">
-  <documentManagement/>
-</p:properties>
-</file>
-
 <file path=customXml/item3.xml><?xml version="1.0" encoding="utf-8"?>
-<Control xmlns="http://schemas.microsoft.com/VisualStudio/2011/storyboarding/control">
-  <Id Name="c3dcc9d7-e839-4c41-b311-c9546161c8f2" Revision="1" Stencil="System.MyShapes" StencilVersion="1.0"/>
-</Control>
-</file>
-
-<file path=customXml/item4.xml><?xml version="1.0" encoding="utf-8"?>
-<Control xmlns="http://schemas.microsoft.com/VisualStudio/2011/storyboarding/control">
-  <Id Name="c3dcc9d7-e839-4c41-b311-c9546161c8f2" Revision="1" Stencil="System.MyShapes" StencilVersion="1.0"/>
-</Control>
-</file>
-
-<file path=customXml/item5.xml><?xml version="1.0" encoding="utf-8"?>
 <ct:contentTypeSchema xmlns:ct="http://schemas.microsoft.com/office/2006/metadata/contentType" xmlns:ma="http://schemas.microsoft.com/office/2006/metadata/properties/metaAttributes" ct:_="" ma:_="" ma:contentTypeName="dokument" ma:contentTypeID="0x010100AFF099DBE91EAB4C94C5395218CA7FE2" ma:contentTypeVersion="0" ma:contentTypeDescription="Skapa ett nytt dokument." ma:contentTypeScope="" ma:versionID="363f93a6a111d938e62f110fc5037985">
   <xsd:schema xmlns:xsd="http://www.w3.org/2001/XMLSchema" xmlns:xs="http://www.w3.org/2001/XMLSchema" xmlns:p="http://schemas.microsoft.com/office/2006/metadata/properties" targetNamespace="http://schemas.microsoft.com/office/2006/metadata/properties" ma:root="true" ma:fieldsID="4e525e7b53ac5e77a4a17ea96ec83fa5">
     <xsd:element name="properties">
@@ -29173,15 +29135,19 @@
 </ct:contentTypeSchema>
 </file>
 
-<file path=customXml/itemProps1.xml><?xml version="1.0" encoding="utf-8"?>
-<ds:datastoreItem xmlns:ds="http://schemas.openxmlformats.org/officeDocument/2006/customXml" ds:itemID="{AC626530-7C4B-40F5-BEEE-44F53847AB17}">
-  <ds:schemaRefs>
-    <ds:schemaRef ds:uri="http://schemas.microsoft.com/sharepoint/v3/contenttype/forms"/>
-  </ds:schemaRefs>
-</ds:datastoreItem>
+<file path=customXml/item4.xml><?xml version="1.0" encoding="utf-8"?>
+<Control xmlns="http://schemas.microsoft.com/VisualStudio/2011/storyboarding/control">
+  <Id Name="c3dcc9d7-e839-4c41-b311-c9546161c8f2" Revision="1" Stencil="System.MyShapes" StencilVersion="1.0"/>
+</Control>
 </file>
 
-<file path=customXml/itemProps2.xml><?xml version="1.0" encoding="utf-8"?>
+<file path=customXml/item5.xml><?xml version="1.0" encoding="utf-8"?>
+<Control xmlns="http://schemas.microsoft.com/VisualStudio/2011/storyboarding/control">
+  <Id Name="c3dcc9d7-e839-4c41-b311-c9546161c8f2" Revision="1" Stencil="System.MyShapes" StencilVersion="1.0"/>
+</Control>
+</file>
+
+<file path=customXml/itemProps1.xml><?xml version="1.0" encoding="utf-8"?>
 <ds:datastoreItem xmlns:ds="http://schemas.openxmlformats.org/officeDocument/2006/customXml" ds:itemID="{434FA947-7C31-410D-8361-56745DB88B49}">
   <ds:schemaRefs>
     <ds:schemaRef ds:uri="http://schemas.microsoft.com/office/2006/documentManagement/types"/>
@@ -29196,10 +29162,26 @@
 </ds:datastoreItem>
 </file>
 
+<file path=customXml/itemProps2.xml><?xml version="1.0" encoding="utf-8"?>
+<ds:datastoreItem xmlns:ds="http://schemas.openxmlformats.org/officeDocument/2006/customXml" ds:itemID="{AC626530-7C4B-40F5-BEEE-44F53847AB17}">
+  <ds:schemaRefs>
+    <ds:schemaRef ds:uri="http://schemas.microsoft.com/sharepoint/v3/contenttype/forms"/>
+  </ds:schemaRefs>
+</ds:datastoreItem>
+</file>
+
 <file path=customXml/itemProps3.xml><?xml version="1.0" encoding="utf-8"?>
-<ds:datastoreItem xmlns:ds="http://schemas.openxmlformats.org/officeDocument/2006/customXml" ds:itemID="{4159E012-FAA6-467D-8797-E79D11212C39}">
+<ds:datastoreItem xmlns:ds="http://schemas.openxmlformats.org/officeDocument/2006/customXml" ds:itemID="{BB6542C7-CBA1-4D74-BA73-D5AD91212997}">
   <ds:schemaRefs>
-    <ds:schemaRef ds:uri="http://schemas.microsoft.com/VisualStudio/2011/storyboarding/control"/>
+    <ds:schemaRef ds:uri="http://schemas.microsoft.com/office/2006/metadata/contentType"/>
+    <ds:schemaRef ds:uri="http://schemas.microsoft.com/office/2006/metadata/properties/metaAttributes"/>
+    <ds:schemaRef ds:uri="http://www.w3.org/2001/XMLSchema"/>
+    <ds:schemaRef ds:uri="http://schemas.microsoft.com/office/2006/metadata/properties"/>
+    <ds:schemaRef ds:uri="http://schemas.openxmlformats.org/package/2006/metadata/core-properties"/>
+    <ds:schemaRef ds:uri="http://purl.org/dc/elements/1.1/"/>
+    <ds:schemaRef ds:uri="http://purl.org/dc/terms/"/>
+    <ds:schemaRef ds:uri="http://schemas.microsoft.com/internal/obd"/>
+    <ds:schemaRef ds:uri="http://schemas.microsoft.com/office/infopath/2007/PartnerControls"/>
   </ds:schemaRefs>
 </ds:datastoreItem>
 </file>
@@ -29213,17 +29195,9 @@
 </file>
 
 <file path=customXml/itemProps5.xml><?xml version="1.0" encoding="utf-8"?>
-<ds:datastoreItem xmlns:ds="http://schemas.openxmlformats.org/officeDocument/2006/customXml" ds:itemID="{BB6542C7-CBA1-4D74-BA73-D5AD91212997}">
+<ds:datastoreItem xmlns:ds="http://schemas.openxmlformats.org/officeDocument/2006/customXml" ds:itemID="{4159E012-FAA6-467D-8797-E79D11212C39}">
   <ds:schemaRefs>
-    <ds:schemaRef ds:uri="http://schemas.microsoft.com/office/2006/metadata/contentType"/>
-    <ds:schemaRef ds:uri="http://schemas.microsoft.com/office/2006/metadata/properties/metaAttributes"/>
-    <ds:schemaRef ds:uri="http://www.w3.org/2001/XMLSchema"/>
-    <ds:schemaRef ds:uri="http://schemas.microsoft.com/office/2006/metadata/properties"/>
-    <ds:schemaRef ds:uri="http://schemas.openxmlformats.org/package/2006/metadata/core-properties"/>
-    <ds:schemaRef ds:uri="http://purl.org/dc/elements/1.1/"/>
-    <ds:schemaRef ds:uri="http://purl.org/dc/terms/"/>
-    <ds:schemaRef ds:uri="http://schemas.microsoft.com/internal/obd"/>
-    <ds:schemaRef ds:uri="http://schemas.microsoft.com/office/infopath/2007/PartnerControls"/>
+    <ds:schemaRef ds:uri="http://schemas.microsoft.com/VisualStudio/2011/storyboarding/control"/>
   </ds:schemaRefs>
 </ds:datastoreItem>
 </file>
</xml_diff>